<commit_message>
Added boxplot to replace min plot
</commit_message>
<xml_diff>
--- a/FinalReport_Team_Bengio.pptx
+++ b/FinalReport_Team_Bengio.pptx
@@ -128,11 +128,6 @@
   <p:extLst>
     <p:ext uri="{EFAFB233-063F-42B5-8137-9DF3F51BA10A}">
       <p15:sldGuideLst xmlns:p15="http://schemas.microsoft.com/office/powerpoint/2012/main">
-        <p15:guide id="1" orient="horz" pos="1080" userDrawn="1">
-          <p15:clr>
-            <a:srgbClr val="A4A3A4"/>
-          </p15:clr>
-        </p15:guide>
         <p15:guide id="2" pos="5280" userDrawn="1">
           <p15:clr>
             <a:srgbClr val="A4A3A4"/>
@@ -256,7 +251,7 @@
           <a:p>
             <a:fld id="{8691FFE1-0C4A-4976-B4DD-704F9FCB903D}" type="datetimeFigureOut">
               <a:rPr lang="en-US" smtClean="0"/>
-              <a:t>6/19/2017</a:t>
+              <a:t>6/20/2017</a:t>
             </a:fld>
             <a:endParaRPr lang="en-US"/>
           </a:p>
@@ -433,7 +428,7 @@
           <a:p>
             <a:fld id="{5BDD007C-BA52-4E5D-A46A-23301A480D2B}" type="datetimeFigureOut">
               <a:rPr lang="en-US" smtClean="0"/>
-              <a:t>6/19/2017</a:t>
+              <a:t>6/20/2017</a:t>
             </a:fld>
             <a:endParaRPr lang="en-US"/>
           </a:p>
@@ -2508,7 +2503,7 @@
           <a:p>
             <a:fld id="{5584D41E-ECCD-469A-A688-027E915CB521}" type="datetime1">
               <a:rPr lang="en-US" smtClean="0"/>
-              <a:t>6/19/2017</a:t>
+              <a:t>6/20/2017</a:t>
             </a:fld>
             <a:endParaRPr lang="en-US" dirty="0"/>
           </a:p>
@@ -2818,7 +2813,7 @@
           <a:p>
             <a:fld id="{37FEC672-057D-467E-BA4C-CC8A47D984EF}" type="datetime1">
               <a:rPr lang="en-US" smtClean="0"/>
-              <a:t>6/19/2017</a:t>
+              <a:t>6/20/2017</a:t>
             </a:fld>
             <a:endParaRPr lang="en-US" dirty="0"/>
           </a:p>
@@ -3261,7 +3256,7 @@
           <a:p>
             <a:fld id="{29367DF6-E5E3-489A-B126-195C5069A6F3}" type="datetime1">
               <a:rPr lang="en-US" smtClean="0"/>
-              <a:t>6/19/2017</a:t>
+              <a:t>6/20/2017</a:t>
             </a:fld>
             <a:endParaRPr lang="en-US" dirty="0"/>
           </a:p>
@@ -3571,7 +3566,7 @@
           <a:p>
             <a:fld id="{9B31C6C6-9DE9-456B-AED9-726F033DF690}" type="datetime1">
               <a:rPr lang="en-US" smtClean="0"/>
-              <a:t>6/19/2017</a:t>
+              <a:t>6/20/2017</a:t>
             </a:fld>
             <a:endParaRPr lang="en-US" dirty="0"/>
           </a:p>
@@ -3960,7 +3955,7 @@
           <a:p>
             <a:fld id="{D5BEEA30-5A4A-4762-8F67-CF7471431EAC}" type="datetime1">
               <a:rPr lang="en-US" smtClean="0"/>
-              <a:t>6/19/2017</a:t>
+              <a:t>6/20/2017</a:t>
             </a:fld>
             <a:endParaRPr lang="en-US" dirty="0"/>
           </a:p>
@@ -4126,7 +4121,7 @@
           <a:p>
             <a:fld id="{383E5AC3-809B-4088-B8DA-0699C9AC2539}" type="datetime1">
               <a:rPr lang="en-US" smtClean="0"/>
-              <a:t>6/19/2017</a:t>
+              <a:t>6/20/2017</a:t>
             </a:fld>
             <a:endParaRPr lang="en-US" dirty="0"/>
           </a:p>
@@ -4301,7 +4296,7 @@
           <a:p>
             <a:fld id="{232710CB-3BDD-4633-BD7F-4610F5B446FE}" type="datetime1">
               <a:rPr lang="en-US" smtClean="0"/>
-              <a:t>6/19/2017</a:t>
+              <a:t>6/20/2017</a:t>
             </a:fld>
             <a:endParaRPr lang="en-US" dirty="0"/>
           </a:p>
@@ -4473,7 +4468,7 @@
           <a:p>
             <a:fld id="{D68BBBC4-48BB-40C7-8573-BE257AC89E63}" type="datetime1">
               <a:rPr lang="en-US" smtClean="0"/>
-              <a:t>6/19/2017</a:t>
+              <a:t>6/20/2017</a:t>
             </a:fld>
             <a:endParaRPr lang="en-US" dirty="0"/>
           </a:p>
@@ -4924,7 +4919,7 @@
           <a:p>
             <a:fld id="{02C7217F-CE63-45E6-8375-59B10C747384}" type="datetime1">
               <a:rPr lang="en-US" smtClean="0"/>
-              <a:t>6/19/2017</a:t>
+              <a:t>6/20/2017</a:t>
             </a:fld>
             <a:endParaRPr lang="en-US" dirty="0"/>
           </a:p>
@@ -5293,7 +5288,7 @@
           <a:p>
             <a:fld id="{31D10638-02D3-4D63-BF78-1DA4765062DA}" type="datetime1">
               <a:rPr lang="en-US" smtClean="0"/>
-              <a:t>6/19/2017</a:t>
+              <a:t>6/20/2017</a:t>
             </a:fld>
             <a:endParaRPr lang="en-US" dirty="0"/>
           </a:p>
@@ -5412,7 +5407,7 @@
           <a:p>
             <a:fld id="{41B9CB85-5CA8-4486-904C-0B697A1E77C0}" type="datetime1">
               <a:rPr lang="en-US" smtClean="0"/>
-              <a:t>6/19/2017</a:t>
+              <a:t>6/20/2017</a:t>
             </a:fld>
             <a:endParaRPr lang="en-US" dirty="0"/>
           </a:p>
@@ -5503,7 +5498,7 @@
           <a:p>
             <a:fld id="{FB853D0A-05D4-4C41-BFB2-5F79004EB7DD}" type="datetime1">
               <a:rPr lang="en-US" smtClean="0"/>
-              <a:t>6/19/2017</a:t>
+              <a:t>6/20/2017</a:t>
             </a:fld>
             <a:endParaRPr lang="en-US" dirty="0"/>
           </a:p>
@@ -5754,7 +5749,7 @@
           <a:p>
             <a:fld id="{C341C2EE-EBFF-49DF-8B0E-1582029F3458}" type="datetime1">
               <a:rPr lang="en-US" smtClean="0"/>
-              <a:t>6/19/2017</a:t>
+              <a:t>6/20/2017</a:t>
             </a:fld>
             <a:endParaRPr lang="en-US" dirty="0"/>
           </a:p>
@@ -6012,7 +6007,7 @@
           <a:p>
             <a:fld id="{EF2F2483-1DD5-49A6-8D3E-B45317D7588A}" type="datetime1">
               <a:rPr lang="en-US" smtClean="0"/>
-              <a:t>6/19/2017</a:t>
+              <a:t>6/20/2017</a:t>
             </a:fld>
             <a:endParaRPr lang="en-US" dirty="0"/>
           </a:p>
@@ -6758,7 +6753,7 @@
           <a:p>
             <a:fld id="{52767998-3159-4C71-ABFF-AA9298230A46}" type="datetime1">
               <a:rPr lang="en-US" smtClean="0"/>
-              <a:t>6/19/2017</a:t>
+              <a:t>6/20/2017</a:t>
             </a:fld>
             <a:endParaRPr lang="en-US" dirty="0"/>
           </a:p>
@@ -16031,8 +16026,8 @@
           </a:fontRef>
         </p:style>
       </p:cxnSp>
-      <mc:AlternateContent xmlns:mc="http://schemas.openxmlformats.org/markup-compatibility/2006">
-        <mc:Choice xmlns:a14="http://schemas.microsoft.com/office/drawing/2010/main" Requires="a14">
+      <mc:AlternateContent xmlns:mc="http://schemas.openxmlformats.org/markup-compatibility/2006" xmlns:a14="http://schemas.microsoft.com/office/drawing/2010/main">
+        <mc:Choice Requires="a14">
           <p:sp>
             <p:nvSpPr>
               <p:cNvPr id="18" name="TextBox 17">
@@ -16082,7 +16077,7 @@
             </p:txBody>
           </p:sp>
         </mc:Choice>
-        <mc:Fallback>
+        <mc:Fallback xmlns="">
           <p:sp>
             <p:nvSpPr>
               <p:cNvPr id="18" name="TextBox 17">
@@ -16127,8 +16122,8 @@
           </p:sp>
         </mc:Fallback>
       </mc:AlternateContent>
-      <mc:AlternateContent xmlns:mc="http://schemas.openxmlformats.org/markup-compatibility/2006">
-        <mc:Choice xmlns:a14="http://schemas.microsoft.com/office/drawing/2010/main" Requires="a14">
+      <mc:AlternateContent xmlns:mc="http://schemas.openxmlformats.org/markup-compatibility/2006" xmlns:a14="http://schemas.microsoft.com/office/drawing/2010/main">
+        <mc:Choice Requires="a14">
           <p:sp>
             <p:nvSpPr>
               <p:cNvPr id="49" name="TextBox 48">
@@ -16201,7 +16196,7 @@
             </p:txBody>
           </p:sp>
         </mc:Choice>
-        <mc:Fallback>
+        <mc:Fallback xmlns="">
           <p:sp>
             <p:nvSpPr>
               <p:cNvPr id="49" name="TextBox 48">
@@ -16293,8 +16288,8 @@
           </a:fontRef>
         </p:style>
       </p:cxnSp>
-      <mc:AlternateContent xmlns:mc="http://schemas.openxmlformats.org/markup-compatibility/2006">
-        <mc:Choice xmlns:a14="http://schemas.microsoft.com/office/drawing/2010/main" Requires="a14">
+      <mc:AlternateContent xmlns:mc="http://schemas.openxmlformats.org/markup-compatibility/2006" xmlns:a14="http://schemas.microsoft.com/office/drawing/2010/main">
+        <mc:Choice Requires="a14">
           <p:sp>
             <p:nvSpPr>
               <p:cNvPr id="62" name="TextBox 61">
@@ -16467,7 +16462,7 @@
             </p:txBody>
           </p:sp>
         </mc:Choice>
-        <mc:Fallback>
+        <mc:Fallback xmlns="">
           <p:sp>
             <p:nvSpPr>
               <p:cNvPr id="62" name="TextBox 61">
@@ -16512,8 +16507,8 @@
           </p:sp>
         </mc:Fallback>
       </mc:AlternateContent>
-      <mc:AlternateContent xmlns:mc="http://schemas.openxmlformats.org/markup-compatibility/2006">
-        <mc:Choice xmlns:a14="http://schemas.microsoft.com/office/drawing/2010/main" Requires="a14">
+      <mc:AlternateContent xmlns:mc="http://schemas.openxmlformats.org/markup-compatibility/2006" xmlns:a14="http://schemas.microsoft.com/office/drawing/2010/main">
+        <mc:Choice Requires="a14">
           <p:sp>
             <p:nvSpPr>
               <p:cNvPr id="44" name="TextBox 43">
@@ -16661,7 +16656,7 @@
             </p:txBody>
           </p:sp>
         </mc:Choice>
-        <mc:Fallback>
+        <mc:Fallback xmlns="">
           <p:sp>
             <p:nvSpPr>
               <p:cNvPr id="44" name="TextBox 43">
@@ -17860,8 +17855,8 @@
           </a:fontRef>
         </p:style>
       </p:cxnSp>
-      <mc:AlternateContent xmlns:mc="http://schemas.openxmlformats.org/markup-compatibility/2006">
-        <mc:Choice xmlns:a14="http://schemas.microsoft.com/office/drawing/2010/main" Requires="a14">
+      <mc:AlternateContent xmlns:mc="http://schemas.openxmlformats.org/markup-compatibility/2006" xmlns:a14="http://schemas.microsoft.com/office/drawing/2010/main">
+        <mc:Choice Requires="a14">
           <p:sp>
             <p:nvSpPr>
               <p:cNvPr id="18" name="TextBox 17">
@@ -17911,7 +17906,7 @@
             </p:txBody>
           </p:sp>
         </mc:Choice>
-        <mc:Fallback>
+        <mc:Fallback xmlns="">
           <p:sp>
             <p:nvSpPr>
               <p:cNvPr id="18" name="TextBox 17">
@@ -17956,8 +17951,8 @@
           </p:sp>
         </mc:Fallback>
       </mc:AlternateContent>
-      <mc:AlternateContent xmlns:mc="http://schemas.openxmlformats.org/markup-compatibility/2006">
-        <mc:Choice xmlns:a14="http://schemas.microsoft.com/office/drawing/2010/main" Requires="a14">
+      <mc:AlternateContent xmlns:mc="http://schemas.openxmlformats.org/markup-compatibility/2006" xmlns:a14="http://schemas.microsoft.com/office/drawing/2010/main">
+        <mc:Choice Requires="a14">
           <p:sp>
             <p:nvSpPr>
               <p:cNvPr id="49" name="TextBox 48">
@@ -18030,7 +18025,7 @@
             </p:txBody>
           </p:sp>
         </mc:Choice>
-        <mc:Fallback>
+        <mc:Fallback xmlns="">
           <p:sp>
             <p:nvSpPr>
               <p:cNvPr id="49" name="TextBox 48">
@@ -20994,8 +20989,8 @@
           </a:prstGeom>
         </p:spPr>
       </p:pic>
-      <mc:AlternateContent xmlns:mc="http://schemas.openxmlformats.org/markup-compatibility/2006">
-        <mc:Choice xmlns:a14="http://schemas.microsoft.com/office/drawing/2010/main" Requires="a14">
+      <mc:AlternateContent xmlns:mc="http://schemas.openxmlformats.org/markup-compatibility/2006" xmlns:a14="http://schemas.microsoft.com/office/drawing/2010/main">
+        <mc:Choice Requires="a14">
           <p:sp>
             <p:nvSpPr>
               <p:cNvPr id="19" name="TextBox 18">
@@ -21067,7 +21062,7 @@
             </p:txBody>
           </p:sp>
         </mc:Choice>
-        <mc:Fallback>
+        <mc:Fallback xmlns="">
           <p:sp>
             <p:nvSpPr>
               <p:cNvPr id="19" name="TextBox 18">
@@ -21145,8 +21140,8 @@
           </a:ln>
         </p:spPr>
       </p:pic>
-      <mc:AlternateContent xmlns:mc="http://schemas.openxmlformats.org/markup-compatibility/2006">
-        <mc:Choice xmlns:a14="http://schemas.microsoft.com/office/drawing/2010/main" Requires="a14">
+      <mc:AlternateContent xmlns:mc="http://schemas.openxmlformats.org/markup-compatibility/2006" xmlns:a14="http://schemas.microsoft.com/office/drawing/2010/main">
+        <mc:Choice Requires="a14">
           <p:sp>
             <p:nvSpPr>
               <p:cNvPr id="14" name="TextBox 13">
@@ -21309,7 +21304,7 @@
             </p:txBody>
           </p:sp>
         </mc:Choice>
-        <mc:Fallback>
+        <mc:Fallback xmlns="">
           <p:sp>
             <p:nvSpPr>
               <p:cNvPr id="14" name="TextBox 13">
@@ -21401,8 +21396,8 @@
           </a:fontRef>
         </p:style>
       </p:cxnSp>
-      <mc:AlternateContent xmlns:mc="http://schemas.openxmlformats.org/markup-compatibility/2006">
-        <mc:Choice xmlns:a14="http://schemas.microsoft.com/office/drawing/2010/main" Requires="a14">
+      <mc:AlternateContent xmlns:mc="http://schemas.openxmlformats.org/markup-compatibility/2006" xmlns:a14="http://schemas.microsoft.com/office/drawing/2010/main">
+        <mc:Choice Requires="a14">
           <p:sp>
             <p:nvSpPr>
               <p:cNvPr id="9" name="TextBox 8">
@@ -21492,7 +21487,7 @@
             </p:txBody>
           </p:sp>
         </mc:Choice>
-        <mc:Fallback>
+        <mc:Fallback xmlns="">
           <p:sp>
             <p:nvSpPr>
               <p:cNvPr id="9" name="TextBox 8">
@@ -23527,6 +23522,309 @@
           <a:chExt cx="0" cy="0"/>
         </a:xfrm>
       </p:grpSpPr>
+      <p:grpSp>
+        <p:nvGrpSpPr>
+          <p:cNvPr id="22" name="Group 21">
+            <a:extLst>
+              <a:ext uri="{FF2B5EF4-FFF2-40B4-BE49-F238E27FC236}">
+                <a16:creationId xmlns:a16="http://schemas.microsoft.com/office/drawing/2014/main" id="{04114C74-6EAB-4B12-ACD3-E53E5248AAA6}"/>
+              </a:ext>
+            </a:extLst>
+          </p:cNvPr>
+          <p:cNvGrpSpPr/>
+          <p:nvPr/>
+        </p:nvGrpSpPr>
+        <p:grpSpPr>
+          <a:xfrm>
+            <a:off x="552450" y="1002268"/>
+            <a:ext cx="10719616" cy="5855732"/>
+            <a:chOff x="769910" y="2187768"/>
+            <a:chExt cx="10719616" cy="5855732"/>
+          </a:xfrm>
+        </p:grpSpPr>
+        <p:pic>
+          <p:nvPicPr>
+            <p:cNvPr id="9" name="Picture 8">
+              <a:extLst>
+                <a:ext uri="{FF2B5EF4-FFF2-40B4-BE49-F238E27FC236}">
+                  <a16:creationId xmlns:a16="http://schemas.microsoft.com/office/drawing/2014/main" id="{76C4745A-B389-449C-92B2-1E10749E743C}"/>
+                </a:ext>
+              </a:extLst>
+            </p:cNvPr>
+            <p:cNvPicPr>
+              <a:picLocks noChangeAspect="1"/>
+            </p:cNvPicPr>
+            <p:nvPr/>
+          </p:nvPicPr>
+          <p:blipFill>
+            <a:blip r:embed="rId3"/>
+            <a:stretch>
+              <a:fillRect/>
+            </a:stretch>
+          </p:blipFill>
+          <p:spPr>
+            <a:xfrm>
+              <a:off x="769910" y="2316404"/>
+              <a:ext cx="10708476" cy="5727096"/>
+            </a:xfrm>
+            <a:prstGeom prst="rect">
+              <a:avLst/>
+            </a:prstGeom>
+          </p:spPr>
+        </p:pic>
+        <p:sp>
+          <p:nvSpPr>
+            <p:cNvPr id="7" name="TextBox 6">
+              <a:extLst>
+                <a:ext uri="{FF2B5EF4-FFF2-40B4-BE49-F238E27FC236}">
+                  <a16:creationId xmlns:a16="http://schemas.microsoft.com/office/drawing/2014/main" id="{A1CB4040-B930-4C77-85A7-14277601F045}"/>
+                </a:ext>
+              </a:extLst>
+            </p:cNvPr>
+            <p:cNvSpPr txBox="1"/>
+            <p:nvPr/>
+          </p:nvSpPr>
+          <p:spPr>
+            <a:xfrm flipH="1">
+              <a:off x="1428350" y="2187768"/>
+              <a:ext cx="10061176" cy="369332"/>
+            </a:xfrm>
+            <a:prstGeom prst="rect">
+              <a:avLst/>
+            </a:prstGeom>
+            <a:solidFill>
+              <a:schemeClr val="bg1"/>
+            </a:solidFill>
+          </p:spPr>
+          <p:txBody>
+            <a:bodyPr wrap="square" rtlCol="0">
+              <a:spAutoFit/>
+            </a:bodyPr>
+            <a:lstStyle/>
+            <a:p>
+              <a:pPr algn="ctr"/>
+              <a:r>
+                <a:rPr lang="en-US" dirty="0"/>
+                <a:t>Boxplot of metric for the 10 letters with 16 principle components</a:t>
+              </a:r>
+            </a:p>
+          </p:txBody>
+        </p:sp>
+        <p:cxnSp>
+          <p:nvCxnSpPr>
+            <p:cNvPr id="13" name="Straight Connector 12">
+              <a:extLst>
+                <a:ext uri="{FF2B5EF4-FFF2-40B4-BE49-F238E27FC236}">
+                  <a16:creationId xmlns:a16="http://schemas.microsoft.com/office/drawing/2014/main" id="{FAE9083E-9AE0-4ADB-A366-68C48294E971}"/>
+                </a:ext>
+              </a:extLst>
+            </p:cNvPr>
+            <p:cNvCxnSpPr/>
+            <p:nvPr/>
+          </p:nvCxnSpPr>
+          <p:spPr>
+            <a:xfrm>
+              <a:off x="6438900" y="2583532"/>
+              <a:ext cx="0" cy="4863863"/>
+            </a:xfrm>
+            <a:prstGeom prst="line">
+              <a:avLst/>
+            </a:prstGeom>
+            <a:noFill/>
+            <a:ln w="38100">
+              <a:solidFill>
+                <a:srgbClr val="0070C0"/>
+              </a:solidFill>
+            </a:ln>
+          </p:spPr>
+          <p:style>
+            <a:lnRef idx="2">
+              <a:schemeClr val="accent1">
+                <a:shade val="50000"/>
+              </a:schemeClr>
+            </a:lnRef>
+            <a:fillRef idx="1">
+              <a:schemeClr val="accent1"/>
+            </a:fillRef>
+            <a:effectRef idx="0">
+              <a:schemeClr val="accent1"/>
+            </a:effectRef>
+            <a:fontRef idx="minor">
+              <a:schemeClr val="lt1"/>
+            </a:fontRef>
+          </p:style>
+        </p:cxnSp>
+        <p:sp>
+          <p:nvSpPr>
+            <p:cNvPr id="10" name="Rectangle 9">
+              <a:extLst>
+                <a:ext uri="{FF2B5EF4-FFF2-40B4-BE49-F238E27FC236}">
+                  <a16:creationId xmlns:a16="http://schemas.microsoft.com/office/drawing/2014/main" id="{15F41219-5081-4320-AA15-A4523E7FD80A}"/>
+                </a:ext>
+              </a:extLst>
+            </p:cNvPr>
+            <p:cNvSpPr/>
+            <p:nvPr/>
+          </p:nvSpPr>
+          <p:spPr>
+            <a:xfrm>
+              <a:off x="1428350" y="2583532"/>
+              <a:ext cx="9925450" cy="4863863"/>
+            </a:xfrm>
+            <a:prstGeom prst="rect">
+              <a:avLst/>
+            </a:prstGeom>
+            <a:noFill/>
+            <a:ln w="38100">
+              <a:solidFill>
+                <a:srgbClr val="0070C0"/>
+              </a:solidFill>
+            </a:ln>
+          </p:spPr>
+          <p:style>
+            <a:lnRef idx="2">
+              <a:schemeClr val="accent1">
+                <a:shade val="50000"/>
+              </a:schemeClr>
+            </a:lnRef>
+            <a:fillRef idx="1">
+              <a:schemeClr val="accent1"/>
+            </a:fillRef>
+            <a:effectRef idx="0">
+              <a:schemeClr val="accent1"/>
+            </a:effectRef>
+            <a:fontRef idx="minor">
+              <a:schemeClr val="lt1"/>
+            </a:fontRef>
+          </p:style>
+          <p:txBody>
+            <a:bodyPr rtlCol="0" anchor="ctr"/>
+            <a:lstStyle/>
+            <a:p>
+              <a:pPr algn="ctr"/>
+              <a:endParaRPr lang="en-US"/>
+            </a:p>
+          </p:txBody>
+        </p:sp>
+        <p:cxnSp>
+          <p:nvCxnSpPr>
+            <p:cNvPr id="12" name="Straight Connector 11">
+              <a:extLst>
+                <a:ext uri="{FF2B5EF4-FFF2-40B4-BE49-F238E27FC236}">
+                  <a16:creationId xmlns:a16="http://schemas.microsoft.com/office/drawing/2014/main" id="{B83E3D3C-92F3-412F-822C-30C8140EA2D5}"/>
+                </a:ext>
+              </a:extLst>
+            </p:cNvPr>
+            <p:cNvCxnSpPr/>
+            <p:nvPr/>
+          </p:nvCxnSpPr>
+          <p:spPr>
+            <a:xfrm>
+              <a:off x="3924300" y="2583532"/>
+              <a:ext cx="0" cy="4863863"/>
+            </a:xfrm>
+            <a:prstGeom prst="line">
+              <a:avLst/>
+            </a:prstGeom>
+            <a:noFill/>
+            <a:ln w="38100">
+              <a:solidFill>
+                <a:srgbClr val="0070C0"/>
+              </a:solidFill>
+            </a:ln>
+          </p:spPr>
+          <p:style>
+            <a:lnRef idx="2">
+              <a:schemeClr val="accent1">
+                <a:shade val="50000"/>
+              </a:schemeClr>
+            </a:lnRef>
+            <a:fillRef idx="1">
+              <a:schemeClr val="accent1"/>
+            </a:fillRef>
+            <a:effectRef idx="0">
+              <a:schemeClr val="accent1"/>
+            </a:effectRef>
+            <a:fontRef idx="minor">
+              <a:schemeClr val="lt1"/>
+            </a:fontRef>
+          </p:style>
+        </p:cxnSp>
+        <p:cxnSp>
+          <p:nvCxnSpPr>
+            <p:cNvPr id="14" name="Straight Connector 13">
+              <a:extLst>
+                <a:ext uri="{FF2B5EF4-FFF2-40B4-BE49-F238E27FC236}">
+                  <a16:creationId xmlns:a16="http://schemas.microsoft.com/office/drawing/2014/main" id="{DA139436-6896-45B8-9AE8-1945DFAEACCF}"/>
+                </a:ext>
+              </a:extLst>
+            </p:cNvPr>
+            <p:cNvCxnSpPr/>
+            <p:nvPr/>
+          </p:nvCxnSpPr>
+          <p:spPr>
+            <a:xfrm>
+              <a:off x="8896350" y="2583532"/>
+              <a:ext cx="0" cy="4863863"/>
+            </a:xfrm>
+            <a:prstGeom prst="line">
+              <a:avLst/>
+            </a:prstGeom>
+            <a:noFill/>
+            <a:ln w="38100">
+              <a:solidFill>
+                <a:srgbClr val="0070C0"/>
+              </a:solidFill>
+            </a:ln>
+          </p:spPr>
+          <p:style>
+            <a:lnRef idx="2">
+              <a:schemeClr val="accent1">
+                <a:shade val="50000"/>
+              </a:schemeClr>
+            </a:lnRef>
+            <a:fillRef idx="1">
+              <a:schemeClr val="accent1"/>
+            </a:fillRef>
+            <a:effectRef idx="0">
+              <a:schemeClr val="accent1"/>
+            </a:effectRef>
+            <a:fontRef idx="minor">
+              <a:schemeClr val="lt1"/>
+            </a:fontRef>
+          </p:style>
+        </p:cxnSp>
+      </p:grpSp>
+      <p:pic>
+        <p:nvPicPr>
+          <p:cNvPr id="17" name="Picture 16">
+            <a:extLst>
+              <a:ext uri="{FF2B5EF4-FFF2-40B4-BE49-F238E27FC236}">
+                <a16:creationId xmlns:a16="http://schemas.microsoft.com/office/drawing/2014/main" id="{25C8FD40-B5E6-4183-9B2B-470B470CCE54}"/>
+              </a:ext>
+            </a:extLst>
+          </p:cNvPr>
+          <p:cNvPicPr>
+            <a:picLocks noChangeAspect="1"/>
+          </p:cNvPicPr>
+          <p:nvPr/>
+        </p:nvPicPr>
+        <p:blipFill>
+          <a:blip r:embed="rId4"/>
+          <a:stretch>
+            <a:fillRect/>
+          </a:stretch>
+        </p:blipFill>
+        <p:spPr>
+          <a:xfrm>
+            <a:off x="2813192" y="964892"/>
+            <a:ext cx="6190110" cy="5624157"/>
+          </a:xfrm>
+          <a:prstGeom prst="rect">
+            <a:avLst/>
+          </a:prstGeom>
+        </p:spPr>
+      </p:pic>
       <p:sp>
         <p:nvSpPr>
           <p:cNvPr id="2" name="Title 1">
@@ -23552,7 +23850,7 @@
         </p:spPr>
         <p:txBody>
           <a:bodyPr vert="horz" lIns="91440" tIns="45720" rIns="91440" bIns="45720" rtlCol="0" anchor="t">
-            <a:normAutofit fontScale="90000"/>
+            <a:normAutofit fontScale="97500"/>
           </a:bodyPr>
           <a:lstStyle>
             <a:lvl1pPr algn="l" defTabSz="457200" rtl="0" eaLnBrk="1" latinLnBrk="0" hangingPunct="1">
@@ -23633,48 +23931,27 @@
                   <a:srgbClr val="002060"/>
                 </a:solidFill>
               </a:rPr>
-              <a:t>Results: Worse Case Performance for 16 Principle Components</a:t>
+              <a:t>Results: </a:t>
             </a:r>
-          </a:p>
-          <a:p>
-            <a:endParaRPr lang="en-US" dirty="0">
-              <a:solidFill>
-                <a:srgbClr val="002060"/>
-              </a:solidFill>
-            </a:endParaRPr>
+            <a:r>
+              <a:rPr lang="en-US" dirty="0" err="1">
+                <a:solidFill>
+                  <a:srgbClr val="002060"/>
+                </a:solidFill>
+              </a:rPr>
+              <a:t>Measuement</a:t>
+            </a:r>
+            <a:r>
+              <a:rPr lang="en-US" dirty="0">
+                <a:solidFill>
+                  <a:srgbClr val="002060"/>
+                </a:solidFill>
+              </a:rPr>
+              <a:t> Comparison with Box Plot</a:t>
+            </a:r>
           </a:p>
         </p:txBody>
       </p:sp>
-      <p:pic>
-        <p:nvPicPr>
-          <p:cNvPr id="6" name="Picture 5">
-            <a:extLst>
-              <a:ext uri="{FF2B5EF4-FFF2-40B4-BE49-F238E27FC236}">
-                <a16:creationId xmlns:a16="http://schemas.microsoft.com/office/drawing/2014/main" id="{D2182FCA-0A45-4DDF-8AB2-4A00AAE7D739}"/>
-              </a:ext>
-            </a:extLst>
-          </p:cNvPr>
-          <p:cNvPicPr>
-            <a:picLocks noChangeAspect="1"/>
-          </p:cNvPicPr>
-          <p:nvPr/>
-        </p:nvPicPr>
-        <p:blipFill>
-          <a:blip r:embed="rId3"/>
-          <a:stretch>
-            <a:fillRect/>
-          </a:stretch>
-        </p:blipFill>
-        <p:spPr>
-          <a:xfrm>
-            <a:off x="1295400" y="1065605"/>
-            <a:ext cx="8801100" cy="5489648"/>
-          </a:xfrm>
-          <a:prstGeom prst="rect">
-            <a:avLst/>
-          </a:prstGeom>
-        </p:spPr>
-      </p:pic>
       <p:sp>
         <p:nvSpPr>
           <p:cNvPr id="5" name="Slide Number Placeholder 4">
@@ -23705,43 +23982,6 @@
           </a:p>
         </p:txBody>
       </p:sp>
-      <p:sp>
-        <p:nvSpPr>
-          <p:cNvPr id="7" name="TextBox 6">
-            <a:extLst>
-              <a:ext uri="{FF2B5EF4-FFF2-40B4-BE49-F238E27FC236}">
-                <a16:creationId xmlns:a16="http://schemas.microsoft.com/office/drawing/2014/main" id="{A1CB4040-B930-4C77-85A7-14277601F045}"/>
-              </a:ext>
-            </a:extLst>
-          </p:cNvPr>
-          <p:cNvSpPr txBox="1"/>
-          <p:nvPr/>
-        </p:nvSpPr>
-        <p:spPr>
-          <a:xfrm flipH="1">
-            <a:off x="1809750" y="1002268"/>
-            <a:ext cx="8286750" cy="369332"/>
-          </a:xfrm>
-          <a:prstGeom prst="rect">
-            <a:avLst/>
-          </a:prstGeom>
-          <a:solidFill>
-            <a:schemeClr val="bg1"/>
-          </a:solidFill>
-        </p:spPr>
-        <p:txBody>
-          <a:bodyPr wrap="square" rtlCol="0">
-            <a:spAutoFit/>
-          </a:bodyPr>
-          <a:lstStyle/>
-          <a:p>
-            <a:r>
-              <a:rPr lang="en-US" dirty="0"/>
-              <a:t>Minimum value of metric among the 10 labels for 16 principle components</a:t>
-            </a:r>
-          </a:p>
-        </p:txBody>
-      </p:sp>
     </p:spTree>
     <p:extLst>
       <p:ext uri="{BB962C8B-B14F-4D97-AF65-F5344CB8AC3E}">
@@ -23752,6 +23992,177 @@
   <p:clrMapOvr>
     <a:masterClrMapping/>
   </p:clrMapOvr>
+  <p:timing>
+    <p:tnLst>
+      <p:par>
+        <p:cTn id="1" dur="indefinite" restart="never" nodeType="tmRoot">
+          <p:childTnLst>
+            <p:seq concurrent="1" nextAc="seek">
+              <p:cTn id="2" dur="indefinite" nodeType="mainSeq">
+                <p:childTnLst>
+                  <p:par>
+                    <p:cTn id="3" fill="hold">
+                      <p:stCondLst>
+                        <p:cond delay="indefinite"/>
+                      </p:stCondLst>
+                      <p:childTnLst>
+                        <p:par>
+                          <p:cTn id="4" fill="hold">
+                            <p:stCondLst>
+                              <p:cond delay="0"/>
+                            </p:stCondLst>
+                            <p:childTnLst>
+                              <p:par>
+                                <p:cTn id="5" presetID="10" presetClass="entr" presetSubtype="0" fill="hold" nodeType="clickEffect">
+                                  <p:stCondLst>
+                                    <p:cond delay="0"/>
+                                  </p:stCondLst>
+                                  <p:childTnLst>
+                                    <p:set>
+                                      <p:cBhvr>
+                                        <p:cTn id="6" dur="1" fill="hold">
+                                          <p:stCondLst>
+                                            <p:cond delay="0"/>
+                                          </p:stCondLst>
+                                        </p:cTn>
+                                        <p:tgtEl>
+                                          <p:spTgt spid="17"/>
+                                        </p:tgtEl>
+                                        <p:attrNameLst>
+                                          <p:attrName>style.visibility</p:attrName>
+                                        </p:attrNameLst>
+                                      </p:cBhvr>
+                                      <p:to>
+                                        <p:strVal val="visible"/>
+                                      </p:to>
+                                    </p:set>
+                                    <p:animEffect transition="in" filter="fade">
+                                      <p:cBhvr>
+                                        <p:cTn id="7" dur="500"/>
+                                        <p:tgtEl>
+                                          <p:spTgt spid="17"/>
+                                        </p:tgtEl>
+                                      </p:cBhvr>
+                                    </p:animEffect>
+                                  </p:childTnLst>
+                                </p:cTn>
+                              </p:par>
+                            </p:childTnLst>
+                          </p:cTn>
+                        </p:par>
+                      </p:childTnLst>
+                    </p:cTn>
+                  </p:par>
+                  <p:par>
+                    <p:cTn id="8" fill="hold">
+                      <p:stCondLst>
+                        <p:cond delay="indefinite"/>
+                      </p:stCondLst>
+                      <p:childTnLst>
+                        <p:par>
+                          <p:cTn id="9" fill="hold">
+                            <p:stCondLst>
+                              <p:cond delay="0"/>
+                            </p:stCondLst>
+                            <p:childTnLst>
+                              <p:par>
+                                <p:cTn id="10" presetID="10" presetClass="entr" presetSubtype="0" fill="hold" nodeType="clickEffect">
+                                  <p:stCondLst>
+                                    <p:cond delay="0"/>
+                                  </p:stCondLst>
+                                  <p:childTnLst>
+                                    <p:set>
+                                      <p:cBhvr>
+                                        <p:cTn id="11" dur="1" fill="hold">
+                                          <p:stCondLst>
+                                            <p:cond delay="0"/>
+                                          </p:stCondLst>
+                                        </p:cTn>
+                                        <p:tgtEl>
+                                          <p:spTgt spid="22"/>
+                                        </p:tgtEl>
+                                        <p:attrNameLst>
+                                          <p:attrName>style.visibility</p:attrName>
+                                        </p:attrNameLst>
+                                      </p:cBhvr>
+                                      <p:to>
+                                        <p:strVal val="visible"/>
+                                      </p:to>
+                                    </p:set>
+                                    <p:animEffect transition="in" filter="fade">
+                                      <p:cBhvr>
+                                        <p:cTn id="12" dur="500"/>
+                                        <p:tgtEl>
+                                          <p:spTgt spid="22"/>
+                                        </p:tgtEl>
+                                      </p:cBhvr>
+                                    </p:animEffect>
+                                  </p:childTnLst>
+                                </p:cTn>
+                              </p:par>
+                              <p:par>
+                                <p:cTn id="13" presetID="10" presetClass="exit" presetSubtype="0" fill="hold" nodeType="withEffect">
+                                  <p:stCondLst>
+                                    <p:cond delay="0"/>
+                                  </p:stCondLst>
+                                  <p:childTnLst>
+                                    <p:animEffect transition="out" filter="fade">
+                                      <p:cBhvr>
+                                        <p:cTn id="14" dur="500"/>
+                                        <p:tgtEl>
+                                          <p:spTgt spid="17"/>
+                                        </p:tgtEl>
+                                      </p:cBhvr>
+                                    </p:animEffect>
+                                    <p:set>
+                                      <p:cBhvr>
+                                        <p:cTn id="15" dur="1" fill="hold">
+                                          <p:stCondLst>
+                                            <p:cond delay="499"/>
+                                          </p:stCondLst>
+                                        </p:cTn>
+                                        <p:tgtEl>
+                                          <p:spTgt spid="17"/>
+                                        </p:tgtEl>
+                                        <p:attrNameLst>
+                                          <p:attrName>style.visibility</p:attrName>
+                                        </p:attrNameLst>
+                                      </p:cBhvr>
+                                      <p:to>
+                                        <p:strVal val="hidden"/>
+                                      </p:to>
+                                    </p:set>
+                                  </p:childTnLst>
+                                </p:cTn>
+                              </p:par>
+                            </p:childTnLst>
+                          </p:cTn>
+                        </p:par>
+                      </p:childTnLst>
+                    </p:cTn>
+                  </p:par>
+                </p:childTnLst>
+              </p:cTn>
+              <p:prevCondLst>
+                <p:cond evt="onPrev" delay="0">
+                  <p:tgtEl>
+                    <p:sldTgt/>
+                  </p:tgtEl>
+                </p:cond>
+              </p:prevCondLst>
+              <p:nextCondLst>
+                <p:cond evt="onNext" delay="0">
+                  <p:tgtEl>
+                    <p:sldTgt/>
+                  </p:tgtEl>
+                </p:cond>
+              </p:nextCondLst>
+            </p:seq>
+          </p:childTnLst>
+        </p:cTn>
+      </p:par>
+    </p:tnLst>
+  </p:timing>
 </p:sld>
 </file>
 

</xml_diff>

<commit_message>
reordered the box plot
</commit_message>
<xml_diff>
--- a/FinalReport_Team_Bengio.pptx
+++ b/FinalReport_Team_Bengio.pptx
@@ -129,6 +129,11 @@
     <p:ext uri="{EFAFB233-063F-42B5-8137-9DF3F51BA10A}">
       <p15:sldGuideLst xmlns:p15="http://schemas.microsoft.com/office/powerpoint/2012/main">
         <p15:guide id="2" pos="5280" userDrawn="1">
+          <p15:clr>
+            <a:srgbClr val="A4A3A4"/>
+          </p15:clr>
+        </p15:guide>
+        <p15:guide id="3" orient="horz" pos="2160">
           <p15:clr>
             <a:srgbClr val="A4A3A4"/>
           </p15:clr>
@@ -23522,12 +23527,42 @@
           <a:chExt cx="0" cy="0"/>
         </a:xfrm>
       </p:grpSpPr>
+      <p:pic>
+        <p:nvPicPr>
+          <p:cNvPr id="16" name="Picture 15">
+            <a:extLst>
+              <a:ext uri="{FF2B5EF4-FFF2-40B4-BE49-F238E27FC236}">
+                <a16:creationId xmlns:a16="http://schemas.microsoft.com/office/drawing/2014/main" id="{75044DBC-9455-41CC-91D8-EA3508CC5869}"/>
+              </a:ext>
+            </a:extLst>
+          </p:cNvPr>
+          <p:cNvPicPr>
+            <a:picLocks noChangeAspect="1"/>
+          </p:cNvPicPr>
+          <p:nvPr/>
+        </p:nvPicPr>
+        <p:blipFill>
+          <a:blip r:embed="rId3"/>
+          <a:stretch>
+            <a:fillRect/>
+          </a:stretch>
+        </p:blipFill>
+        <p:spPr>
+          <a:xfrm>
+            <a:off x="3463432" y="993437"/>
+            <a:ext cx="5366551" cy="5455010"/>
+          </a:xfrm>
+          <a:prstGeom prst="rect">
+            <a:avLst/>
+          </a:prstGeom>
+        </p:spPr>
+      </p:pic>
       <p:grpSp>
         <p:nvGrpSpPr>
-          <p:cNvPr id="22" name="Group 21">
+          <p:cNvPr id="27" name="Group 26">
             <a:extLst>
               <a:ext uri="{FF2B5EF4-FFF2-40B4-BE49-F238E27FC236}">
-                <a16:creationId xmlns:a16="http://schemas.microsoft.com/office/drawing/2014/main" id="{04114C74-6EAB-4B12-ACD3-E53E5248AAA6}"/>
+                <a16:creationId xmlns:a16="http://schemas.microsoft.com/office/drawing/2014/main" id="{0649C811-8FC9-44B4-8F1D-013E85A748DD}"/>
               </a:ext>
             </a:extLst>
           </p:cNvPr>
@@ -23536,18 +23571,18 @@
         </p:nvGrpSpPr>
         <p:grpSpPr>
           <a:xfrm>
-            <a:off x="552450" y="1002268"/>
-            <a:ext cx="10719616" cy="5855732"/>
-            <a:chOff x="769910" y="2187768"/>
-            <a:chExt cx="10719616" cy="5855732"/>
+            <a:off x="552450" y="1085850"/>
+            <a:ext cx="10719616" cy="5733053"/>
+            <a:chOff x="552450" y="1085850"/>
+            <a:chExt cx="10719616" cy="5733053"/>
           </a:xfrm>
         </p:grpSpPr>
         <p:pic>
           <p:nvPicPr>
-            <p:cNvPr id="9" name="Picture 8">
+            <p:cNvPr id="4" name="Picture 3">
               <a:extLst>
                 <a:ext uri="{FF2B5EF4-FFF2-40B4-BE49-F238E27FC236}">
-                  <a16:creationId xmlns:a16="http://schemas.microsoft.com/office/drawing/2014/main" id="{76C4745A-B389-449C-92B2-1E10749E743C}"/>
+                  <a16:creationId xmlns:a16="http://schemas.microsoft.com/office/drawing/2014/main" id="{393BD330-B0D0-4624-977B-59F8F69B16B9}"/>
                 </a:ext>
               </a:extLst>
             </p:cNvPr>
@@ -23557,103 +23592,21 @@
             <p:nvPr/>
           </p:nvPicPr>
           <p:blipFill>
-            <a:blip r:embed="rId3"/>
+            <a:blip r:embed="rId4"/>
             <a:stretch>
               <a:fillRect/>
             </a:stretch>
           </p:blipFill>
           <p:spPr>
             <a:xfrm>
-              <a:off x="769910" y="2316404"/>
-              <a:ext cx="10708476" cy="5727096"/>
+              <a:off x="552450" y="1085850"/>
+              <a:ext cx="10719616" cy="5733053"/>
             </a:xfrm>
             <a:prstGeom prst="rect">
               <a:avLst/>
             </a:prstGeom>
           </p:spPr>
         </p:pic>
-        <p:sp>
-          <p:nvSpPr>
-            <p:cNvPr id="7" name="TextBox 6">
-              <a:extLst>
-                <a:ext uri="{FF2B5EF4-FFF2-40B4-BE49-F238E27FC236}">
-                  <a16:creationId xmlns:a16="http://schemas.microsoft.com/office/drawing/2014/main" id="{A1CB4040-B930-4C77-85A7-14277601F045}"/>
-                </a:ext>
-              </a:extLst>
-            </p:cNvPr>
-            <p:cNvSpPr txBox="1"/>
-            <p:nvPr/>
-          </p:nvSpPr>
-          <p:spPr>
-            <a:xfrm flipH="1">
-              <a:off x="1428350" y="2187768"/>
-              <a:ext cx="10061176" cy="369332"/>
-            </a:xfrm>
-            <a:prstGeom prst="rect">
-              <a:avLst/>
-            </a:prstGeom>
-            <a:solidFill>
-              <a:schemeClr val="bg1"/>
-            </a:solidFill>
-          </p:spPr>
-          <p:txBody>
-            <a:bodyPr wrap="square" rtlCol="0">
-              <a:spAutoFit/>
-            </a:bodyPr>
-            <a:lstStyle/>
-            <a:p>
-              <a:pPr algn="ctr"/>
-              <a:r>
-                <a:rPr lang="en-US" dirty="0"/>
-                <a:t>Boxplot of metric for the 10 letters with 16 principle components</a:t>
-              </a:r>
-            </a:p>
-          </p:txBody>
-        </p:sp>
-        <p:cxnSp>
-          <p:nvCxnSpPr>
-            <p:cNvPr id="13" name="Straight Connector 12">
-              <a:extLst>
-                <a:ext uri="{FF2B5EF4-FFF2-40B4-BE49-F238E27FC236}">
-                  <a16:creationId xmlns:a16="http://schemas.microsoft.com/office/drawing/2014/main" id="{FAE9083E-9AE0-4ADB-A366-68C48294E971}"/>
-                </a:ext>
-              </a:extLst>
-            </p:cNvPr>
-            <p:cNvCxnSpPr/>
-            <p:nvPr/>
-          </p:nvCxnSpPr>
-          <p:spPr>
-            <a:xfrm>
-              <a:off x="6438900" y="2583532"/>
-              <a:ext cx="0" cy="4863863"/>
-            </a:xfrm>
-            <a:prstGeom prst="line">
-              <a:avLst/>
-            </a:prstGeom>
-            <a:noFill/>
-            <a:ln w="38100">
-              <a:solidFill>
-                <a:srgbClr val="0070C0"/>
-              </a:solidFill>
-            </a:ln>
-          </p:spPr>
-          <p:style>
-            <a:lnRef idx="2">
-              <a:schemeClr val="accent1">
-                <a:shade val="50000"/>
-              </a:schemeClr>
-            </a:lnRef>
-            <a:fillRef idx="1">
-              <a:schemeClr val="accent1"/>
-            </a:fillRef>
-            <a:effectRef idx="0">
-              <a:schemeClr val="accent1"/>
-            </a:effectRef>
-            <a:fontRef idx="minor">
-              <a:schemeClr val="lt1"/>
-            </a:fontRef>
-          </p:style>
-        </p:cxnSp>
         <p:sp>
           <p:nvSpPr>
             <p:cNvPr id="10" name="Rectangle 9">
@@ -23668,7 +23621,7 @@
           </p:nvSpPr>
           <p:spPr>
             <a:xfrm>
-              <a:off x="1428350" y="2583532"/>
+              <a:off x="1210890" y="1398032"/>
               <a:ext cx="9925450" cy="4863863"/>
             </a:xfrm>
             <a:prstGeom prst="rect">
@@ -23706,125 +23659,7 @@
             </a:p>
           </p:txBody>
         </p:sp>
-        <p:cxnSp>
-          <p:nvCxnSpPr>
-            <p:cNvPr id="12" name="Straight Connector 11">
-              <a:extLst>
-                <a:ext uri="{FF2B5EF4-FFF2-40B4-BE49-F238E27FC236}">
-                  <a16:creationId xmlns:a16="http://schemas.microsoft.com/office/drawing/2014/main" id="{B83E3D3C-92F3-412F-822C-30C8140EA2D5}"/>
-                </a:ext>
-              </a:extLst>
-            </p:cNvPr>
-            <p:cNvCxnSpPr/>
-            <p:nvPr/>
-          </p:nvCxnSpPr>
-          <p:spPr>
-            <a:xfrm>
-              <a:off x="3924300" y="2583532"/>
-              <a:ext cx="0" cy="4863863"/>
-            </a:xfrm>
-            <a:prstGeom prst="line">
-              <a:avLst/>
-            </a:prstGeom>
-            <a:noFill/>
-            <a:ln w="38100">
-              <a:solidFill>
-                <a:srgbClr val="0070C0"/>
-              </a:solidFill>
-            </a:ln>
-          </p:spPr>
-          <p:style>
-            <a:lnRef idx="2">
-              <a:schemeClr val="accent1">
-                <a:shade val="50000"/>
-              </a:schemeClr>
-            </a:lnRef>
-            <a:fillRef idx="1">
-              <a:schemeClr val="accent1"/>
-            </a:fillRef>
-            <a:effectRef idx="0">
-              <a:schemeClr val="accent1"/>
-            </a:effectRef>
-            <a:fontRef idx="minor">
-              <a:schemeClr val="lt1"/>
-            </a:fontRef>
-          </p:style>
-        </p:cxnSp>
-        <p:cxnSp>
-          <p:nvCxnSpPr>
-            <p:cNvPr id="14" name="Straight Connector 13">
-              <a:extLst>
-                <a:ext uri="{FF2B5EF4-FFF2-40B4-BE49-F238E27FC236}">
-                  <a16:creationId xmlns:a16="http://schemas.microsoft.com/office/drawing/2014/main" id="{DA139436-6896-45B8-9AE8-1945DFAEACCF}"/>
-                </a:ext>
-              </a:extLst>
-            </p:cNvPr>
-            <p:cNvCxnSpPr/>
-            <p:nvPr/>
-          </p:nvCxnSpPr>
-          <p:spPr>
-            <a:xfrm>
-              <a:off x="8896350" y="2583532"/>
-              <a:ext cx="0" cy="4863863"/>
-            </a:xfrm>
-            <a:prstGeom prst="line">
-              <a:avLst/>
-            </a:prstGeom>
-            <a:noFill/>
-            <a:ln w="38100">
-              <a:solidFill>
-                <a:srgbClr val="0070C0"/>
-              </a:solidFill>
-            </a:ln>
-          </p:spPr>
-          <p:style>
-            <a:lnRef idx="2">
-              <a:schemeClr val="accent1">
-                <a:shade val="50000"/>
-              </a:schemeClr>
-            </a:lnRef>
-            <a:fillRef idx="1">
-              <a:schemeClr val="accent1"/>
-            </a:fillRef>
-            <a:effectRef idx="0">
-              <a:schemeClr val="accent1"/>
-            </a:effectRef>
-            <a:fontRef idx="minor">
-              <a:schemeClr val="lt1"/>
-            </a:fontRef>
-          </p:style>
-        </p:cxnSp>
       </p:grpSp>
-      <p:pic>
-        <p:nvPicPr>
-          <p:cNvPr id="17" name="Picture 16">
-            <a:extLst>
-              <a:ext uri="{FF2B5EF4-FFF2-40B4-BE49-F238E27FC236}">
-                <a16:creationId xmlns:a16="http://schemas.microsoft.com/office/drawing/2014/main" id="{25C8FD40-B5E6-4183-9B2B-470B470CCE54}"/>
-              </a:ext>
-            </a:extLst>
-          </p:cNvPr>
-          <p:cNvPicPr>
-            <a:picLocks noChangeAspect="1"/>
-          </p:cNvPicPr>
-          <p:nvPr/>
-        </p:nvPicPr>
-        <p:blipFill>
-          <a:blip r:embed="rId4"/>
-          <a:stretch>
-            <a:fillRect/>
-          </a:stretch>
-        </p:blipFill>
-        <p:spPr>
-          <a:xfrm>
-            <a:off x="2813192" y="964892"/>
-            <a:ext cx="6190110" cy="5624157"/>
-          </a:xfrm>
-          <a:prstGeom prst="rect">
-            <a:avLst/>
-          </a:prstGeom>
-        </p:spPr>
-      </p:pic>
       <p:sp>
         <p:nvSpPr>
           <p:cNvPr id="2" name="Title 1">
@@ -23931,23 +23766,7 @@
                   <a:srgbClr val="002060"/>
                 </a:solidFill>
               </a:rPr>
-              <a:t>Results: </a:t>
-            </a:r>
-            <a:r>
-              <a:rPr lang="en-US" dirty="0" err="1">
-                <a:solidFill>
-                  <a:srgbClr val="002060"/>
-                </a:solidFill>
-              </a:rPr>
-              <a:t>Measuement</a:t>
-            </a:r>
-            <a:r>
-              <a:rPr lang="en-US" dirty="0">
-                <a:solidFill>
-                  <a:srgbClr val="002060"/>
-                </a:solidFill>
-              </a:rPr>
-              <a:t> Comparison with Box Plot</a:t>
+              <a:t>Results: Performance Comparison with Box Plot at 16 PC</a:t>
             </a:r>
           </a:p>
         </p:txBody>
@@ -23982,6 +23801,197 @@
           </a:p>
         </p:txBody>
       </p:sp>
+      <p:grpSp>
+        <p:nvGrpSpPr>
+          <p:cNvPr id="28" name="Group 27">
+            <a:extLst>
+              <a:ext uri="{FF2B5EF4-FFF2-40B4-BE49-F238E27FC236}">
+                <a16:creationId xmlns:a16="http://schemas.microsoft.com/office/drawing/2014/main" id="{1AA134A0-7FAC-44C7-ADD1-1AB80686D524}"/>
+              </a:ext>
+            </a:extLst>
+          </p:cNvPr>
+          <p:cNvGrpSpPr/>
+          <p:nvPr/>
+        </p:nvGrpSpPr>
+        <p:grpSpPr>
+          <a:xfrm>
+            <a:off x="1242714" y="971550"/>
+            <a:ext cx="10061176" cy="5259627"/>
+            <a:chOff x="1242714" y="971550"/>
+            <a:chExt cx="10061176" cy="5259627"/>
+          </a:xfrm>
+        </p:grpSpPr>
+        <p:sp>
+          <p:nvSpPr>
+            <p:cNvPr id="7" name="TextBox 6">
+              <a:extLst>
+                <a:ext uri="{FF2B5EF4-FFF2-40B4-BE49-F238E27FC236}">
+                  <a16:creationId xmlns:a16="http://schemas.microsoft.com/office/drawing/2014/main" id="{A1CB4040-B930-4C77-85A7-14277601F045}"/>
+                </a:ext>
+              </a:extLst>
+            </p:cNvPr>
+            <p:cNvSpPr txBox="1"/>
+            <p:nvPr/>
+          </p:nvSpPr>
+          <p:spPr>
+            <a:xfrm flipH="1">
+              <a:off x="1242714" y="971550"/>
+              <a:ext cx="10061176" cy="369332"/>
+            </a:xfrm>
+            <a:prstGeom prst="rect">
+              <a:avLst/>
+            </a:prstGeom>
+            <a:solidFill>
+              <a:schemeClr val="bg1"/>
+            </a:solidFill>
+          </p:spPr>
+          <p:txBody>
+            <a:bodyPr wrap="square" rtlCol="0">
+              <a:spAutoFit/>
+            </a:bodyPr>
+            <a:lstStyle/>
+            <a:p>
+              <a:pPr algn="ctr"/>
+              <a:r>
+                <a:rPr lang="en-US" dirty="0"/>
+                <a:t>Boxplot of metric for the 10 letters with 16 principle components</a:t>
+              </a:r>
+            </a:p>
+          </p:txBody>
+        </p:sp>
+        <p:cxnSp>
+          <p:nvCxnSpPr>
+            <p:cNvPr id="13" name="Straight Connector 12">
+              <a:extLst>
+                <a:ext uri="{FF2B5EF4-FFF2-40B4-BE49-F238E27FC236}">
+                  <a16:creationId xmlns:a16="http://schemas.microsoft.com/office/drawing/2014/main" id="{FAE9083E-9AE0-4ADB-A366-68C48294E971}"/>
+                </a:ext>
+              </a:extLst>
+            </p:cNvPr>
+            <p:cNvCxnSpPr/>
+            <p:nvPr/>
+          </p:nvCxnSpPr>
+          <p:spPr>
+            <a:xfrm>
+              <a:off x="6253264" y="1367314"/>
+              <a:ext cx="0" cy="4863863"/>
+            </a:xfrm>
+            <a:prstGeom prst="line">
+              <a:avLst/>
+            </a:prstGeom>
+            <a:noFill/>
+            <a:ln w="38100">
+              <a:solidFill>
+                <a:srgbClr val="0070C0"/>
+              </a:solidFill>
+            </a:ln>
+          </p:spPr>
+          <p:style>
+            <a:lnRef idx="2">
+              <a:schemeClr val="accent1">
+                <a:shade val="50000"/>
+              </a:schemeClr>
+            </a:lnRef>
+            <a:fillRef idx="1">
+              <a:schemeClr val="accent1"/>
+            </a:fillRef>
+            <a:effectRef idx="0">
+              <a:schemeClr val="accent1"/>
+            </a:effectRef>
+            <a:fontRef idx="minor">
+              <a:schemeClr val="lt1"/>
+            </a:fontRef>
+          </p:style>
+        </p:cxnSp>
+        <p:cxnSp>
+          <p:nvCxnSpPr>
+            <p:cNvPr id="12" name="Straight Connector 11">
+              <a:extLst>
+                <a:ext uri="{FF2B5EF4-FFF2-40B4-BE49-F238E27FC236}">
+                  <a16:creationId xmlns:a16="http://schemas.microsoft.com/office/drawing/2014/main" id="{B83E3D3C-92F3-412F-822C-30C8140EA2D5}"/>
+                </a:ext>
+              </a:extLst>
+            </p:cNvPr>
+            <p:cNvCxnSpPr/>
+            <p:nvPr/>
+          </p:nvCxnSpPr>
+          <p:spPr>
+            <a:xfrm>
+              <a:off x="3738664" y="1367314"/>
+              <a:ext cx="0" cy="4863863"/>
+            </a:xfrm>
+            <a:prstGeom prst="line">
+              <a:avLst/>
+            </a:prstGeom>
+            <a:noFill/>
+            <a:ln w="38100">
+              <a:solidFill>
+                <a:srgbClr val="0070C0"/>
+              </a:solidFill>
+            </a:ln>
+          </p:spPr>
+          <p:style>
+            <a:lnRef idx="2">
+              <a:schemeClr val="accent1">
+                <a:shade val="50000"/>
+              </a:schemeClr>
+            </a:lnRef>
+            <a:fillRef idx="1">
+              <a:schemeClr val="accent1"/>
+            </a:fillRef>
+            <a:effectRef idx="0">
+              <a:schemeClr val="accent1"/>
+            </a:effectRef>
+            <a:fontRef idx="minor">
+              <a:schemeClr val="lt1"/>
+            </a:fontRef>
+          </p:style>
+        </p:cxnSp>
+        <p:cxnSp>
+          <p:nvCxnSpPr>
+            <p:cNvPr id="14" name="Straight Connector 13">
+              <a:extLst>
+                <a:ext uri="{FF2B5EF4-FFF2-40B4-BE49-F238E27FC236}">
+                  <a16:creationId xmlns:a16="http://schemas.microsoft.com/office/drawing/2014/main" id="{DA139436-6896-45B8-9AE8-1945DFAEACCF}"/>
+                </a:ext>
+              </a:extLst>
+            </p:cNvPr>
+            <p:cNvCxnSpPr/>
+            <p:nvPr/>
+          </p:nvCxnSpPr>
+          <p:spPr>
+            <a:xfrm>
+              <a:off x="8710714" y="1365487"/>
+              <a:ext cx="0" cy="4863863"/>
+            </a:xfrm>
+            <a:prstGeom prst="line">
+              <a:avLst/>
+            </a:prstGeom>
+            <a:noFill/>
+            <a:ln w="38100">
+              <a:solidFill>
+                <a:srgbClr val="0070C0"/>
+              </a:solidFill>
+            </a:ln>
+          </p:spPr>
+          <p:style>
+            <a:lnRef idx="2">
+              <a:schemeClr val="accent1">
+                <a:shade val="50000"/>
+              </a:schemeClr>
+            </a:lnRef>
+            <a:fillRef idx="1">
+              <a:schemeClr val="accent1"/>
+            </a:fillRef>
+            <a:effectRef idx="0">
+              <a:schemeClr val="accent1"/>
+            </a:effectRef>
+            <a:fontRef idx="minor">
+              <a:schemeClr val="lt1"/>
+            </a:fontRef>
+          </p:style>
+        </p:cxnSp>
+      </p:grpSp>
     </p:spTree>
     <p:extLst>
       <p:ext uri="{BB962C8B-B14F-4D97-AF65-F5344CB8AC3E}">
@@ -24026,7 +24036,7 @@
                                           </p:stCondLst>
                                         </p:cTn>
                                         <p:tgtEl>
-                                          <p:spTgt spid="17"/>
+                                          <p:spTgt spid="16"/>
                                         </p:tgtEl>
                                         <p:attrNameLst>
                                           <p:attrName>style.visibility</p:attrName>
@@ -24040,7 +24050,7 @@
                                       <p:cBhvr>
                                         <p:cTn id="7" dur="500"/>
                                         <p:tgtEl>
-                                          <p:spTgt spid="17"/>
+                                          <p:spTgt spid="16"/>
                                         </p:tgtEl>
                                       </p:cBhvr>
                                     </p:animEffect>
@@ -24066,20 +24076,55 @@
                             </p:stCondLst>
                             <p:childTnLst>
                               <p:par>
-                                <p:cTn id="10" presetID="10" presetClass="entr" presetSubtype="0" fill="hold" nodeType="clickEffect">
+                                <p:cTn id="10" presetID="10" presetClass="exit" presetSubtype="0" fill="hold" nodeType="clickEffect">
+                                  <p:stCondLst>
+                                    <p:cond delay="0"/>
+                                  </p:stCondLst>
+                                  <p:childTnLst>
+                                    <p:animEffect transition="out" filter="fade">
+                                      <p:cBhvr>
+                                        <p:cTn id="11" dur="500"/>
+                                        <p:tgtEl>
+                                          <p:spTgt spid="16"/>
+                                        </p:tgtEl>
+                                      </p:cBhvr>
+                                    </p:animEffect>
+                                    <p:set>
+                                      <p:cBhvr>
+                                        <p:cTn id="12" dur="1" fill="hold">
+                                          <p:stCondLst>
+                                            <p:cond delay="499"/>
+                                          </p:stCondLst>
+                                        </p:cTn>
+                                        <p:tgtEl>
+                                          <p:spTgt spid="16"/>
+                                        </p:tgtEl>
+                                        <p:attrNameLst>
+                                          <p:attrName>style.visibility</p:attrName>
+                                        </p:attrNameLst>
+                                      </p:cBhvr>
+                                      <p:to>
+                                        <p:strVal val="hidden"/>
+                                      </p:to>
+                                    </p:set>
+                                  </p:childTnLst>
+                                </p:cTn>
+                              </p:par>
+                              <p:par>
+                                <p:cTn id="13" presetID="10" presetClass="entr" presetSubtype="0" fill="hold" nodeType="withEffect">
                                   <p:stCondLst>
                                     <p:cond delay="0"/>
                                   </p:stCondLst>
                                   <p:childTnLst>
                                     <p:set>
                                       <p:cBhvr>
-                                        <p:cTn id="11" dur="1" fill="hold">
+                                        <p:cTn id="14" dur="1" fill="hold">
                                           <p:stCondLst>
                                             <p:cond delay="0"/>
                                           </p:stCondLst>
                                         </p:cTn>
                                         <p:tgtEl>
-                                          <p:spTgt spid="22"/>
+                                          <p:spTgt spid="27"/>
                                         </p:tgtEl>
                                         <p:attrNameLst>
                                           <p:attrName>style.visibility</p:attrName>
@@ -24091,9 +24136,9 @@
                                     </p:set>
                                     <p:animEffect transition="in" filter="fade">
                                       <p:cBhvr>
-                                        <p:cTn id="12" dur="500"/>
+                                        <p:cTn id="15" dur="500"/>
                                         <p:tgtEl>
-                                          <p:spTgt spid="22"/>
+                                          <p:spTgt spid="27"/>
                                         </p:tgtEl>
                                       </p:cBhvr>
                                     </p:animEffect>
@@ -24101,37 +24146,37 @@
                                 </p:cTn>
                               </p:par>
                               <p:par>
-                                <p:cTn id="13" presetID="10" presetClass="exit" presetSubtype="0" fill="hold" nodeType="withEffect">
+                                <p:cTn id="16" presetID="10" presetClass="entr" presetSubtype="0" fill="hold" nodeType="withEffect">
                                   <p:stCondLst>
                                     <p:cond delay="0"/>
                                   </p:stCondLst>
                                   <p:childTnLst>
-                                    <p:animEffect transition="out" filter="fade">
-                                      <p:cBhvr>
-                                        <p:cTn id="14" dur="500"/>
-                                        <p:tgtEl>
-                                          <p:spTgt spid="17"/>
-                                        </p:tgtEl>
-                                      </p:cBhvr>
-                                    </p:animEffect>
                                     <p:set>
                                       <p:cBhvr>
-                                        <p:cTn id="15" dur="1" fill="hold">
+                                        <p:cTn id="17" dur="1" fill="hold">
                                           <p:stCondLst>
-                                            <p:cond delay="499"/>
+                                            <p:cond delay="0"/>
                                           </p:stCondLst>
                                         </p:cTn>
                                         <p:tgtEl>
-                                          <p:spTgt spid="17"/>
+                                          <p:spTgt spid="28"/>
                                         </p:tgtEl>
                                         <p:attrNameLst>
                                           <p:attrName>style.visibility</p:attrName>
                                         </p:attrNameLst>
                                       </p:cBhvr>
                                       <p:to>
-                                        <p:strVal val="hidden"/>
+                                        <p:strVal val="visible"/>
                                       </p:to>
                                     </p:set>
+                                    <p:animEffect transition="in" filter="fade">
+                                      <p:cBhvr>
+                                        <p:cTn id="18" dur="500"/>
+                                        <p:tgtEl>
+                                          <p:spTgt spid="28"/>
+                                        </p:tgtEl>
+                                      </p:cBhvr>
+                                    </p:animEffect>
                                   </p:childTnLst>
                                 </p:cTn>
                               </p:par>

</xml_diff>

<commit_message>
Corrected spelling of principal
</commit_message>
<xml_diff>
--- a/FinalReport_Team_Bengio.pptx
+++ b/FinalReport_Team_Bengio.pptx
@@ -189,7 +189,7 @@
           <p:cNvPr id="2" name="Header Placeholder 1">
             <a:extLst>
               <a:ext uri="{FF2B5EF4-FFF2-40B4-BE49-F238E27FC236}">
-                <a16:creationId xmlns:a16="http://schemas.microsoft.com/office/drawing/2014/main" id="{27EF4775-AD35-41B2-88B0-64A2DA4D7CC3}"/>
+                <a16:creationId xmlns:a16="http://schemas.microsoft.com/office/drawing/2014/main" xmlns="" id="{27EF4775-AD35-41B2-88B0-64A2DA4D7CC3}"/>
               </a:ext>
             </a:extLst>
           </p:cNvPr>
@@ -226,7 +226,7 @@
           <p:cNvPr id="3" name="Date Placeholder 2">
             <a:extLst>
               <a:ext uri="{FF2B5EF4-FFF2-40B4-BE49-F238E27FC236}">
-                <a16:creationId xmlns:a16="http://schemas.microsoft.com/office/drawing/2014/main" id="{2ADE11AC-244E-4519-A3F3-843E036AE852}"/>
+                <a16:creationId xmlns:a16="http://schemas.microsoft.com/office/drawing/2014/main" xmlns="" id="{2ADE11AC-244E-4519-A3F3-843E036AE852}"/>
               </a:ext>
             </a:extLst>
           </p:cNvPr>
@@ -256,7 +256,7 @@
           <a:p>
             <a:fld id="{8691FFE1-0C4A-4976-B4DD-704F9FCB903D}" type="datetimeFigureOut">
               <a:rPr lang="en-US" smtClean="0"/>
-              <a:t>6/20/2017</a:t>
+              <a:t>6/21/2017</a:t>
             </a:fld>
             <a:endParaRPr lang="en-US"/>
           </a:p>
@@ -267,7 +267,7 @@
           <p:cNvPr id="4" name="Footer Placeholder 3">
             <a:extLst>
               <a:ext uri="{FF2B5EF4-FFF2-40B4-BE49-F238E27FC236}">
-                <a16:creationId xmlns:a16="http://schemas.microsoft.com/office/drawing/2014/main" id="{7C4A3E00-1FC7-430B-B8C4-C511868F37E4}"/>
+                <a16:creationId xmlns:a16="http://schemas.microsoft.com/office/drawing/2014/main" xmlns="" id="{7C4A3E00-1FC7-430B-B8C4-C511868F37E4}"/>
               </a:ext>
             </a:extLst>
           </p:cNvPr>
@@ -304,7 +304,7 @@
           <p:cNvPr id="5" name="Slide Number Placeholder 4">
             <a:extLst>
               <a:ext uri="{FF2B5EF4-FFF2-40B4-BE49-F238E27FC236}">
-                <a16:creationId xmlns:a16="http://schemas.microsoft.com/office/drawing/2014/main" id="{E1FEDF45-CD80-47DE-88E6-F472D3ED7152}"/>
+                <a16:creationId xmlns:a16="http://schemas.microsoft.com/office/drawing/2014/main" xmlns="" id="{E1FEDF45-CD80-47DE-88E6-F472D3ED7152}"/>
               </a:ext>
             </a:extLst>
           </p:cNvPr>
@@ -433,7 +433,7 @@
           <a:p>
             <a:fld id="{5BDD007C-BA52-4E5D-A46A-23301A480D2B}" type="datetimeFigureOut">
               <a:rPr lang="en-US" smtClean="0"/>
-              <a:t>6/20/2017</a:t>
+              <a:t>6/21/2017</a:t>
             </a:fld>
             <a:endParaRPr lang="en-US"/>
           </a:p>
@@ -2269,7 +2269,7 @@
           <p:cNvPr id="18" name="Slide Number Placeholder 5">
             <a:extLst>
               <a:ext uri="{FF2B5EF4-FFF2-40B4-BE49-F238E27FC236}">
-                <a16:creationId xmlns:a16="http://schemas.microsoft.com/office/drawing/2014/main" id="{F7E597E2-118F-47DF-9A03-1F5A2C0A8857}"/>
+                <a16:creationId xmlns:a16="http://schemas.microsoft.com/office/drawing/2014/main" xmlns="" id="{F7E597E2-118F-47DF-9A03-1F5A2C0A8857}"/>
               </a:ext>
             </a:extLst>
           </p:cNvPr>
@@ -2508,7 +2508,7 @@
           <a:p>
             <a:fld id="{5584D41E-ECCD-469A-A688-027E915CB521}" type="datetime1">
               <a:rPr lang="en-US" smtClean="0"/>
-              <a:t>6/20/2017</a:t>
+              <a:t>6/21/2017</a:t>
             </a:fld>
             <a:endParaRPr lang="en-US" dirty="0"/>
           </a:p>
@@ -2818,7 +2818,7 @@
           <a:p>
             <a:fld id="{37FEC672-057D-467E-BA4C-CC8A47D984EF}" type="datetime1">
               <a:rPr lang="en-US" smtClean="0"/>
-              <a:t>6/20/2017</a:t>
+              <a:t>6/21/2017</a:t>
             </a:fld>
             <a:endParaRPr lang="en-US" dirty="0"/>
           </a:p>
@@ -2938,7 +2938,7 @@
           <p:cNvPr id="10" name="Slide Number Placeholder 5">
             <a:extLst>
               <a:ext uri="{FF2B5EF4-FFF2-40B4-BE49-F238E27FC236}">
-                <a16:creationId xmlns:a16="http://schemas.microsoft.com/office/drawing/2014/main" id="{E56CF6C3-1900-43CB-8E33-D8CBE7D39EDE}"/>
+                <a16:creationId xmlns:a16="http://schemas.microsoft.com/office/drawing/2014/main" xmlns="" id="{E56CF6C3-1900-43CB-8E33-D8CBE7D39EDE}"/>
               </a:ext>
             </a:extLst>
           </p:cNvPr>
@@ -3261,7 +3261,7 @@
           <a:p>
             <a:fld id="{29367DF6-E5E3-489A-B126-195C5069A6F3}" type="datetime1">
               <a:rPr lang="en-US" smtClean="0"/>
-              <a:t>6/20/2017</a:t>
+              <a:t>6/21/2017</a:t>
             </a:fld>
             <a:endParaRPr lang="en-US" dirty="0"/>
           </a:p>
@@ -3571,7 +3571,7 @@
           <a:p>
             <a:fld id="{9B31C6C6-9DE9-456B-AED9-726F033DF690}" type="datetime1">
               <a:rPr lang="en-US" smtClean="0"/>
-              <a:t>6/20/2017</a:t>
+              <a:t>6/21/2017</a:t>
             </a:fld>
             <a:endParaRPr lang="en-US" dirty="0"/>
           </a:p>
@@ -3960,7 +3960,7 @@
           <a:p>
             <a:fld id="{D5BEEA30-5A4A-4762-8F67-CF7471431EAC}" type="datetime1">
               <a:rPr lang="en-US" smtClean="0"/>
-              <a:t>6/20/2017</a:t>
+              <a:t>6/21/2017</a:t>
             </a:fld>
             <a:endParaRPr lang="en-US" dirty="0"/>
           </a:p>
@@ -4126,7 +4126,7 @@
           <a:p>
             <a:fld id="{383E5AC3-809B-4088-B8DA-0699C9AC2539}" type="datetime1">
               <a:rPr lang="en-US" smtClean="0"/>
-              <a:t>6/20/2017</a:t>
+              <a:t>6/21/2017</a:t>
             </a:fld>
             <a:endParaRPr lang="en-US" dirty="0"/>
           </a:p>
@@ -4301,7 +4301,7 @@
           <a:p>
             <a:fld id="{232710CB-3BDD-4633-BD7F-4610F5B446FE}" type="datetime1">
               <a:rPr lang="en-US" smtClean="0"/>
-              <a:t>6/20/2017</a:t>
+              <a:t>6/21/2017</a:t>
             </a:fld>
             <a:endParaRPr lang="en-US" dirty="0"/>
           </a:p>
@@ -4473,7 +4473,7 @@
           <a:p>
             <a:fld id="{D68BBBC4-48BB-40C7-8573-BE257AC89E63}" type="datetime1">
               <a:rPr lang="en-US" smtClean="0"/>
-              <a:t>6/20/2017</a:t>
+              <a:t>6/21/2017</a:t>
             </a:fld>
             <a:endParaRPr lang="en-US" dirty="0"/>
           </a:p>
@@ -4704,7 +4704,7 @@
           <p:cNvPr id="7" name="Slide Number Placeholder 5">
             <a:extLst>
               <a:ext uri="{FF2B5EF4-FFF2-40B4-BE49-F238E27FC236}">
-                <a16:creationId xmlns:a16="http://schemas.microsoft.com/office/drawing/2014/main" id="{EB3DD466-D729-4677-9DC7-EEFB05BF9FDC}"/>
+                <a16:creationId xmlns:a16="http://schemas.microsoft.com/office/drawing/2014/main" xmlns="" id="{EB3DD466-D729-4677-9DC7-EEFB05BF9FDC}"/>
               </a:ext>
             </a:extLst>
           </p:cNvPr>
@@ -4924,7 +4924,7 @@
           <a:p>
             <a:fld id="{02C7217F-CE63-45E6-8375-59B10C747384}" type="datetime1">
               <a:rPr lang="en-US" smtClean="0"/>
-              <a:t>6/20/2017</a:t>
+              <a:t>6/21/2017</a:t>
             </a:fld>
             <a:endParaRPr lang="en-US" dirty="0"/>
           </a:p>
@@ -5293,7 +5293,7 @@
           <a:p>
             <a:fld id="{31D10638-02D3-4D63-BF78-1DA4765062DA}" type="datetime1">
               <a:rPr lang="en-US" smtClean="0"/>
-              <a:t>6/20/2017</a:t>
+              <a:t>6/21/2017</a:t>
             </a:fld>
             <a:endParaRPr lang="en-US" dirty="0"/>
           </a:p>
@@ -5412,7 +5412,7 @@
           <a:p>
             <a:fld id="{41B9CB85-5CA8-4486-904C-0B697A1E77C0}" type="datetime1">
               <a:rPr lang="en-US" smtClean="0"/>
-              <a:t>6/20/2017</a:t>
+              <a:t>6/21/2017</a:t>
             </a:fld>
             <a:endParaRPr lang="en-US" dirty="0"/>
           </a:p>
@@ -5503,7 +5503,7 @@
           <a:p>
             <a:fld id="{FB853D0A-05D4-4C41-BFB2-5F79004EB7DD}" type="datetime1">
               <a:rPr lang="en-US" smtClean="0"/>
-              <a:t>6/20/2017</a:t>
+              <a:t>6/21/2017</a:t>
             </a:fld>
             <a:endParaRPr lang="en-US" dirty="0"/>
           </a:p>
@@ -5754,7 +5754,7 @@
           <a:p>
             <a:fld id="{C341C2EE-EBFF-49DF-8B0E-1582029F3458}" type="datetime1">
               <a:rPr lang="en-US" smtClean="0"/>
-              <a:t>6/20/2017</a:t>
+              <a:t>6/21/2017</a:t>
             </a:fld>
             <a:endParaRPr lang="en-US" dirty="0"/>
           </a:p>
@@ -6012,7 +6012,7 @@
           <a:p>
             <a:fld id="{EF2F2483-1DD5-49A6-8D3E-B45317D7588A}" type="datetime1">
               <a:rPr lang="en-US" smtClean="0"/>
-              <a:t>6/20/2017</a:t>
+              <a:t>6/21/2017</a:t>
             </a:fld>
             <a:endParaRPr lang="en-US" dirty="0"/>
           </a:p>
@@ -6758,7 +6758,7 @@
           <a:p>
             <a:fld id="{52767998-3159-4C71-ABFF-AA9298230A46}" type="datetime1">
               <a:rPr lang="en-US" smtClean="0"/>
-              <a:t>6/20/2017</a:t>
+              <a:t>6/21/2017</a:t>
             </a:fld>
             <a:endParaRPr lang="en-US" dirty="0"/>
           </a:p>
@@ -7284,7 +7284,7 @@
           <p:cNvPr id="2" name="Title 1">
             <a:extLst>
               <a:ext uri="{FF2B5EF4-FFF2-40B4-BE49-F238E27FC236}">
-                <a16:creationId xmlns:a16="http://schemas.microsoft.com/office/drawing/2014/main" id="{12C8D476-DF9A-440D-9445-5A222E615C18}"/>
+                <a16:creationId xmlns:a16="http://schemas.microsoft.com/office/drawing/2014/main" xmlns="" id="{12C8D476-DF9A-440D-9445-5A222E615C18}"/>
               </a:ext>
             </a:extLst>
           </p:cNvPr>
@@ -7337,7 +7337,7 @@
           <p:cNvPr id="3" name="Subtitle 2">
             <a:extLst>
               <a:ext uri="{FF2B5EF4-FFF2-40B4-BE49-F238E27FC236}">
-                <a16:creationId xmlns:a16="http://schemas.microsoft.com/office/drawing/2014/main" id="{A53D7FE4-8842-4712-A350-A365C67D161F}"/>
+                <a16:creationId xmlns:a16="http://schemas.microsoft.com/office/drawing/2014/main" xmlns="" id="{A53D7FE4-8842-4712-A350-A365C67D161F}"/>
               </a:ext>
             </a:extLst>
           </p:cNvPr>
@@ -7408,7 +7408,7 @@
           <p:cNvPr id="21" name="Picture 20">
             <a:extLst>
               <a:ext uri="{FF2B5EF4-FFF2-40B4-BE49-F238E27FC236}">
-                <a16:creationId xmlns:a16="http://schemas.microsoft.com/office/drawing/2014/main" id="{1F8EE730-898B-4039-BAC3-D603895B728D}"/>
+                <a16:creationId xmlns:a16="http://schemas.microsoft.com/office/drawing/2014/main" xmlns="" id="{1F8EE730-898B-4039-BAC3-D603895B728D}"/>
               </a:ext>
             </a:extLst>
           </p:cNvPr>
@@ -7438,7 +7438,7 @@
           <p:cNvPr id="5" name="Title 1">
             <a:extLst>
               <a:ext uri="{FF2B5EF4-FFF2-40B4-BE49-F238E27FC236}">
-                <a16:creationId xmlns:a16="http://schemas.microsoft.com/office/drawing/2014/main" id="{F11C875C-9CAA-4838-BBDD-43705F932F58}"/>
+                <a16:creationId xmlns:a16="http://schemas.microsoft.com/office/drawing/2014/main" xmlns="" id="{F11C875C-9CAA-4838-BBDD-43705F932F58}"/>
               </a:ext>
             </a:extLst>
           </p:cNvPr>
@@ -7556,7 +7556,7 @@
           <p:cNvPr id="19" name="Rectangle 18">
             <a:extLst>
               <a:ext uri="{FF2B5EF4-FFF2-40B4-BE49-F238E27FC236}">
-                <a16:creationId xmlns:a16="http://schemas.microsoft.com/office/drawing/2014/main" id="{BF98BCEA-D55A-4113-B873-849012A84EFC}"/>
+                <a16:creationId xmlns:a16="http://schemas.microsoft.com/office/drawing/2014/main" xmlns="" id="{BF98BCEA-D55A-4113-B873-849012A84EFC}"/>
               </a:ext>
             </a:extLst>
           </p:cNvPr>
@@ -7614,7 +7614,7 @@
           <p:cNvPr id="4" name="Slide Number Placeholder 3">
             <a:extLst>
               <a:ext uri="{FF2B5EF4-FFF2-40B4-BE49-F238E27FC236}">
-                <a16:creationId xmlns:a16="http://schemas.microsoft.com/office/drawing/2014/main" id="{F84FDF19-CDD8-49D9-8864-6D3392CDB04B}"/>
+                <a16:creationId xmlns:a16="http://schemas.microsoft.com/office/drawing/2014/main" xmlns="" id="{F84FDF19-CDD8-49D9-8864-6D3392CDB04B}"/>
               </a:ext>
             </a:extLst>
           </p:cNvPr>
@@ -7806,7 +7806,7 @@
           <p:cNvPr id="5" name="Title 1">
             <a:extLst>
               <a:ext uri="{FF2B5EF4-FFF2-40B4-BE49-F238E27FC236}">
-                <a16:creationId xmlns:a16="http://schemas.microsoft.com/office/drawing/2014/main" id="{F11C875C-9CAA-4838-BBDD-43705F932F58}"/>
+                <a16:creationId xmlns:a16="http://schemas.microsoft.com/office/drawing/2014/main" xmlns="" id="{F11C875C-9CAA-4838-BBDD-43705F932F58}"/>
               </a:ext>
             </a:extLst>
           </p:cNvPr>
@@ -7924,7 +7924,7 @@
           <p:cNvPr id="4" name="Picture 3">
             <a:extLst>
               <a:ext uri="{FF2B5EF4-FFF2-40B4-BE49-F238E27FC236}">
-                <a16:creationId xmlns:a16="http://schemas.microsoft.com/office/drawing/2014/main" id="{7B393A30-7610-4901-951C-32DBC3375DB3}"/>
+                <a16:creationId xmlns:a16="http://schemas.microsoft.com/office/drawing/2014/main" xmlns="" id="{7B393A30-7610-4901-951C-32DBC3375DB3}"/>
               </a:ext>
             </a:extLst>
           </p:cNvPr>
@@ -7954,7 +7954,7 @@
           <p:cNvPr id="13" name="Group 12">
             <a:extLst>
               <a:ext uri="{FF2B5EF4-FFF2-40B4-BE49-F238E27FC236}">
-                <a16:creationId xmlns:a16="http://schemas.microsoft.com/office/drawing/2014/main" id="{E7CC4D30-929F-40A5-A394-7A5DF51AE9F6}"/>
+                <a16:creationId xmlns:a16="http://schemas.microsoft.com/office/drawing/2014/main" xmlns="" id="{E7CC4D30-929F-40A5-A394-7A5DF51AE9F6}"/>
               </a:ext>
             </a:extLst>
           </p:cNvPr>
@@ -7974,7 +7974,7 @@
             <p:cNvPr id="10" name="Oval 9">
               <a:extLst>
                 <a:ext uri="{FF2B5EF4-FFF2-40B4-BE49-F238E27FC236}">
-                  <a16:creationId xmlns:a16="http://schemas.microsoft.com/office/drawing/2014/main" id="{A61665EE-7087-437A-ADDC-2A23001C1E19}"/>
+                  <a16:creationId xmlns:a16="http://schemas.microsoft.com/office/drawing/2014/main" xmlns="" id="{A61665EE-7087-437A-ADDC-2A23001C1E19}"/>
                 </a:ext>
               </a:extLst>
             </p:cNvPr>
@@ -8033,7 +8033,7 @@
             <p:cNvPr id="12" name="Speech Bubble: Rectangle with Corners Rounded 11">
               <a:extLst>
                 <a:ext uri="{FF2B5EF4-FFF2-40B4-BE49-F238E27FC236}">
-                  <a16:creationId xmlns:a16="http://schemas.microsoft.com/office/drawing/2014/main" id="{8E74D0FC-7C2F-49D1-BFC6-E151E676CD54}"/>
+                  <a16:creationId xmlns:a16="http://schemas.microsoft.com/office/drawing/2014/main" xmlns="" id="{8E74D0FC-7C2F-49D1-BFC6-E151E676CD54}"/>
                 </a:ext>
               </a:extLst>
             </p:cNvPr>
@@ -8094,7 +8094,7 @@
           <p:cNvPr id="21" name="Group 20">
             <a:extLst>
               <a:ext uri="{FF2B5EF4-FFF2-40B4-BE49-F238E27FC236}">
-                <a16:creationId xmlns:a16="http://schemas.microsoft.com/office/drawing/2014/main" id="{2016CB66-0B0E-4159-87DF-7177CC09E36B}"/>
+                <a16:creationId xmlns:a16="http://schemas.microsoft.com/office/drawing/2014/main" xmlns="" id="{2016CB66-0B0E-4159-87DF-7177CC09E36B}"/>
               </a:ext>
             </a:extLst>
           </p:cNvPr>
@@ -8114,7 +8114,7 @@
             <p:cNvPr id="15" name="Oval 14">
               <a:extLst>
                 <a:ext uri="{FF2B5EF4-FFF2-40B4-BE49-F238E27FC236}">
-                  <a16:creationId xmlns:a16="http://schemas.microsoft.com/office/drawing/2014/main" id="{6517D2BB-E709-4022-934B-2181AF478D1D}"/>
+                  <a16:creationId xmlns:a16="http://schemas.microsoft.com/office/drawing/2014/main" xmlns="" id="{6517D2BB-E709-4022-934B-2181AF478D1D}"/>
                 </a:ext>
               </a:extLst>
             </p:cNvPr>
@@ -8173,7 +8173,7 @@
             <p:cNvPr id="16" name="Speech Bubble: Rectangle with Corners Rounded 15">
               <a:extLst>
                 <a:ext uri="{FF2B5EF4-FFF2-40B4-BE49-F238E27FC236}">
-                  <a16:creationId xmlns:a16="http://schemas.microsoft.com/office/drawing/2014/main" id="{1F45A44D-462B-4E24-8C55-A55422487F8E}"/>
+                  <a16:creationId xmlns:a16="http://schemas.microsoft.com/office/drawing/2014/main" xmlns="" id="{1F45A44D-462B-4E24-8C55-A55422487F8E}"/>
                 </a:ext>
               </a:extLst>
             </p:cNvPr>
@@ -8234,7 +8234,7 @@
           <p:cNvPr id="22" name="Group 21">
             <a:extLst>
               <a:ext uri="{FF2B5EF4-FFF2-40B4-BE49-F238E27FC236}">
-                <a16:creationId xmlns:a16="http://schemas.microsoft.com/office/drawing/2014/main" id="{F8B6916F-E023-4EF3-BFC6-61AC5E4DABBE}"/>
+                <a16:creationId xmlns:a16="http://schemas.microsoft.com/office/drawing/2014/main" xmlns="" id="{F8B6916F-E023-4EF3-BFC6-61AC5E4DABBE}"/>
               </a:ext>
             </a:extLst>
           </p:cNvPr>
@@ -8254,7 +8254,7 @@
             <p:cNvPr id="17" name="Oval 16">
               <a:extLst>
                 <a:ext uri="{FF2B5EF4-FFF2-40B4-BE49-F238E27FC236}">
-                  <a16:creationId xmlns:a16="http://schemas.microsoft.com/office/drawing/2014/main" id="{63521CBF-F26F-4019-901A-ED7D225C4FC4}"/>
+                  <a16:creationId xmlns:a16="http://schemas.microsoft.com/office/drawing/2014/main" xmlns="" id="{63521CBF-F26F-4019-901A-ED7D225C4FC4}"/>
                 </a:ext>
               </a:extLst>
             </p:cNvPr>
@@ -8313,7 +8313,7 @@
             <p:cNvPr id="18" name="Speech Bubble: Rectangle with Corners Rounded 17">
               <a:extLst>
                 <a:ext uri="{FF2B5EF4-FFF2-40B4-BE49-F238E27FC236}">
-                  <a16:creationId xmlns:a16="http://schemas.microsoft.com/office/drawing/2014/main" id="{1ECADFA8-18A3-4F84-BB13-625E50AC8E45}"/>
+                  <a16:creationId xmlns:a16="http://schemas.microsoft.com/office/drawing/2014/main" xmlns="" id="{1ECADFA8-18A3-4F84-BB13-625E50AC8E45}"/>
                 </a:ext>
               </a:extLst>
             </p:cNvPr>
@@ -8382,7 +8382,7 @@
           <p:cNvPr id="23" name="Group 22">
             <a:extLst>
               <a:ext uri="{FF2B5EF4-FFF2-40B4-BE49-F238E27FC236}">
-                <a16:creationId xmlns:a16="http://schemas.microsoft.com/office/drawing/2014/main" id="{4054503E-1722-4A7A-A377-4F993D284459}"/>
+                <a16:creationId xmlns:a16="http://schemas.microsoft.com/office/drawing/2014/main" xmlns="" id="{4054503E-1722-4A7A-A377-4F993D284459}"/>
               </a:ext>
             </a:extLst>
           </p:cNvPr>
@@ -8402,7 +8402,7 @@
             <p:cNvPr id="19" name="Oval 18">
               <a:extLst>
                 <a:ext uri="{FF2B5EF4-FFF2-40B4-BE49-F238E27FC236}">
-                  <a16:creationId xmlns:a16="http://schemas.microsoft.com/office/drawing/2014/main" id="{2E0B18F7-FEAD-4032-A208-470DBB5AB3B5}"/>
+                  <a16:creationId xmlns:a16="http://schemas.microsoft.com/office/drawing/2014/main" xmlns="" id="{2E0B18F7-FEAD-4032-A208-470DBB5AB3B5}"/>
                 </a:ext>
               </a:extLst>
             </p:cNvPr>
@@ -8461,7 +8461,7 @@
             <p:cNvPr id="20" name="Speech Bubble: Rectangle with Corners Rounded 19">
               <a:extLst>
                 <a:ext uri="{FF2B5EF4-FFF2-40B4-BE49-F238E27FC236}">
-                  <a16:creationId xmlns:a16="http://schemas.microsoft.com/office/drawing/2014/main" id="{CED676FD-EBB7-4CA0-A69D-CBE1E899F856}"/>
+                  <a16:creationId xmlns:a16="http://schemas.microsoft.com/office/drawing/2014/main" xmlns="" id="{CED676FD-EBB7-4CA0-A69D-CBE1E899F856}"/>
                 </a:ext>
               </a:extLst>
             </p:cNvPr>
@@ -8538,7 +8538,7 @@
           <p:cNvPr id="6" name="Slide Number Placeholder 5">
             <a:extLst>
               <a:ext uri="{FF2B5EF4-FFF2-40B4-BE49-F238E27FC236}">
-                <a16:creationId xmlns:a16="http://schemas.microsoft.com/office/drawing/2014/main" id="{FF735714-8A59-42AC-9461-94886EC0B19B}"/>
+                <a16:creationId xmlns:a16="http://schemas.microsoft.com/office/drawing/2014/main" xmlns="" id="{FF735714-8A59-42AC-9461-94886EC0B19B}"/>
               </a:ext>
             </a:extLst>
           </p:cNvPr>
@@ -8886,7 +8886,7 @@
           <p:cNvPr id="4" name="Title 1">
             <a:extLst>
               <a:ext uri="{FF2B5EF4-FFF2-40B4-BE49-F238E27FC236}">
-                <a16:creationId xmlns:a16="http://schemas.microsoft.com/office/drawing/2014/main" id="{94B69BDE-2E3C-4D3D-ADDB-96B638AF3FF7}"/>
+                <a16:creationId xmlns:a16="http://schemas.microsoft.com/office/drawing/2014/main" xmlns="" id="{94B69BDE-2E3C-4D3D-ADDB-96B638AF3FF7}"/>
               </a:ext>
             </a:extLst>
           </p:cNvPr>
@@ -9004,7 +9004,7 @@
           <p:cNvPr id="6" name="Content Placeholder 5">
             <a:extLst>
               <a:ext uri="{FF2B5EF4-FFF2-40B4-BE49-F238E27FC236}">
-                <a16:creationId xmlns:a16="http://schemas.microsoft.com/office/drawing/2014/main" id="{8AC93AEF-1C0F-4B94-80B8-E9BCF056E8C3}"/>
+                <a16:creationId xmlns:a16="http://schemas.microsoft.com/office/drawing/2014/main" xmlns="" id="{8AC93AEF-1C0F-4B94-80B8-E9BCF056E8C3}"/>
               </a:ext>
             </a:extLst>
           </p:cNvPr>
@@ -9160,7 +9160,7 @@
           <p:cNvPr id="5" name="Slide Number Placeholder 4">
             <a:extLst>
               <a:ext uri="{FF2B5EF4-FFF2-40B4-BE49-F238E27FC236}">
-                <a16:creationId xmlns:a16="http://schemas.microsoft.com/office/drawing/2014/main" id="{DCDB03CD-D0F1-4CAC-AAF1-B8B2D0EE8164}"/>
+                <a16:creationId xmlns:a16="http://schemas.microsoft.com/office/drawing/2014/main" xmlns="" id="{DCDB03CD-D0F1-4CAC-AAF1-B8B2D0EE8164}"/>
               </a:ext>
             </a:extLst>
           </p:cNvPr>
@@ -9220,7 +9220,7 @@
           <p:cNvPr id="4" name="Title 3">
             <a:extLst>
               <a:ext uri="{FF2B5EF4-FFF2-40B4-BE49-F238E27FC236}">
-                <a16:creationId xmlns:a16="http://schemas.microsoft.com/office/drawing/2014/main" id="{2A23610F-3ED1-4163-9E2C-C143B76FA000}"/>
+                <a16:creationId xmlns:a16="http://schemas.microsoft.com/office/drawing/2014/main" xmlns="" id="{2A23610F-3ED1-4163-9E2C-C143B76FA000}"/>
               </a:ext>
             </a:extLst>
           </p:cNvPr>
@@ -9237,6 +9237,10 @@
           <a:lstStyle/>
           <a:p>
             <a:pPr algn="ctr"/>
+            <a:r>
+              <a:rPr lang="en-US" dirty="0"/>
+              <a:t/>
+            </a:r>
             <a:br>
               <a:rPr lang="en-US" dirty="0"/>
             </a:br>
@@ -9253,7 +9257,7 @@
           <p:cNvPr id="6" name="Slide Number Placeholder 5">
             <a:extLst>
               <a:ext uri="{FF2B5EF4-FFF2-40B4-BE49-F238E27FC236}">
-                <a16:creationId xmlns:a16="http://schemas.microsoft.com/office/drawing/2014/main" id="{B2C876A0-C60B-4A17-B217-A09108C31EE5}"/>
+                <a16:creationId xmlns:a16="http://schemas.microsoft.com/office/drawing/2014/main" xmlns="" id="{B2C876A0-C60B-4A17-B217-A09108C31EE5}"/>
               </a:ext>
             </a:extLst>
           </p:cNvPr>
@@ -9329,7 +9333,7 @@
           <p:cNvPr id="3" name="Title 1">
             <a:extLst>
               <a:ext uri="{FF2B5EF4-FFF2-40B4-BE49-F238E27FC236}">
-                <a16:creationId xmlns:a16="http://schemas.microsoft.com/office/drawing/2014/main" id="{022C0EF2-32B3-443D-804C-08EF1ADB4E25}"/>
+                <a16:creationId xmlns:a16="http://schemas.microsoft.com/office/drawing/2014/main" xmlns="" id="{022C0EF2-32B3-443D-804C-08EF1ADB4E25}"/>
               </a:ext>
             </a:extLst>
           </p:cNvPr>
@@ -9447,7 +9451,7 @@
           <p:cNvPr id="5" name="Picture 4">
             <a:extLst>
               <a:ext uri="{FF2B5EF4-FFF2-40B4-BE49-F238E27FC236}">
-                <a16:creationId xmlns:a16="http://schemas.microsoft.com/office/drawing/2014/main" id="{DA72E527-7FB9-4702-831C-15AB0A63E38E}"/>
+                <a16:creationId xmlns:a16="http://schemas.microsoft.com/office/drawing/2014/main" xmlns="" id="{DA72E527-7FB9-4702-831C-15AB0A63E38E}"/>
               </a:ext>
             </a:extLst>
           </p:cNvPr>
@@ -9477,7 +9481,7 @@
           <p:cNvPr id="7" name="Picture 6">
             <a:extLst>
               <a:ext uri="{FF2B5EF4-FFF2-40B4-BE49-F238E27FC236}">
-                <a16:creationId xmlns:a16="http://schemas.microsoft.com/office/drawing/2014/main" id="{7290D52D-29B7-42BC-8ABD-8494C1989189}"/>
+                <a16:creationId xmlns:a16="http://schemas.microsoft.com/office/drawing/2014/main" xmlns="" id="{7290D52D-29B7-42BC-8ABD-8494C1989189}"/>
               </a:ext>
             </a:extLst>
           </p:cNvPr>
@@ -9507,7 +9511,7 @@
           <p:cNvPr id="8" name="TextBox 7">
             <a:extLst>
               <a:ext uri="{FF2B5EF4-FFF2-40B4-BE49-F238E27FC236}">
-                <a16:creationId xmlns:a16="http://schemas.microsoft.com/office/drawing/2014/main" id="{79A5C341-84F7-4C44-9944-892AFCAB25F8}"/>
+                <a16:creationId xmlns:a16="http://schemas.microsoft.com/office/drawing/2014/main" xmlns="" id="{79A5C341-84F7-4C44-9944-892AFCAB25F8}"/>
               </a:ext>
             </a:extLst>
           </p:cNvPr>
@@ -9550,7 +9554,7 @@
           <p:cNvPr id="9" name="TextBox 8">
             <a:extLst>
               <a:ext uri="{FF2B5EF4-FFF2-40B4-BE49-F238E27FC236}">
-                <a16:creationId xmlns:a16="http://schemas.microsoft.com/office/drawing/2014/main" id="{CEF91413-B775-4086-85A8-CCA76A13B789}"/>
+                <a16:creationId xmlns:a16="http://schemas.microsoft.com/office/drawing/2014/main" xmlns="" id="{CEF91413-B775-4086-85A8-CCA76A13B789}"/>
               </a:ext>
             </a:extLst>
           </p:cNvPr>
@@ -9586,7 +9590,7 @@
           <p:cNvPr id="6" name="Slide Number Placeholder 5">
             <a:extLst>
               <a:ext uri="{FF2B5EF4-FFF2-40B4-BE49-F238E27FC236}">
-                <a16:creationId xmlns:a16="http://schemas.microsoft.com/office/drawing/2014/main" id="{A705F972-01FC-4B84-BD27-C892119BCFDE}"/>
+                <a16:creationId xmlns:a16="http://schemas.microsoft.com/office/drawing/2014/main" xmlns="" id="{A705F972-01FC-4B84-BD27-C892119BCFDE}"/>
               </a:ext>
             </a:extLst>
           </p:cNvPr>
@@ -9646,7 +9650,7 @@
           <p:cNvPr id="5" name="Title 1">
             <a:extLst>
               <a:ext uri="{FF2B5EF4-FFF2-40B4-BE49-F238E27FC236}">
-                <a16:creationId xmlns:a16="http://schemas.microsoft.com/office/drawing/2014/main" id="{F11C875C-9CAA-4838-BBDD-43705F932F58}"/>
+                <a16:creationId xmlns:a16="http://schemas.microsoft.com/office/drawing/2014/main" xmlns="" id="{F11C875C-9CAA-4838-BBDD-43705F932F58}"/>
               </a:ext>
             </a:extLst>
           </p:cNvPr>
@@ -9764,7 +9768,7 @@
           <p:cNvPr id="16" name="Picture 15">
             <a:extLst>
               <a:ext uri="{FF2B5EF4-FFF2-40B4-BE49-F238E27FC236}">
-                <a16:creationId xmlns:a16="http://schemas.microsoft.com/office/drawing/2014/main" id="{208B5D7F-598F-4998-ADF5-C24ACC061371}"/>
+                <a16:creationId xmlns:a16="http://schemas.microsoft.com/office/drawing/2014/main" xmlns="" id="{208B5D7F-598F-4998-ADF5-C24ACC061371}"/>
               </a:ext>
             </a:extLst>
           </p:cNvPr>
@@ -9794,7 +9798,7 @@
           <p:cNvPr id="3" name="Group 2">
             <a:extLst>
               <a:ext uri="{FF2B5EF4-FFF2-40B4-BE49-F238E27FC236}">
-                <a16:creationId xmlns:a16="http://schemas.microsoft.com/office/drawing/2014/main" id="{F52FCCD3-020A-456D-A0D4-9CFD872F8DC3}"/>
+                <a16:creationId xmlns:a16="http://schemas.microsoft.com/office/drawing/2014/main" xmlns="" id="{F52FCCD3-020A-456D-A0D4-9CFD872F8DC3}"/>
               </a:ext>
             </a:extLst>
           </p:cNvPr>
@@ -9814,7 +9818,7 @@
             <p:cNvPr id="2" name="Oval 1">
               <a:extLst>
                 <a:ext uri="{FF2B5EF4-FFF2-40B4-BE49-F238E27FC236}">
-                  <a16:creationId xmlns:a16="http://schemas.microsoft.com/office/drawing/2014/main" id="{9C50E7AF-0E94-412C-888A-58566B9C017F}"/>
+                  <a16:creationId xmlns:a16="http://schemas.microsoft.com/office/drawing/2014/main" xmlns="" id="{9C50E7AF-0E94-412C-888A-58566B9C017F}"/>
                 </a:ext>
               </a:extLst>
             </p:cNvPr>
@@ -9873,7 +9877,7 @@
             <p:cNvPr id="6" name="Speech Bubble: Rectangle with Corners Rounded 5">
               <a:extLst>
                 <a:ext uri="{FF2B5EF4-FFF2-40B4-BE49-F238E27FC236}">
-                  <a16:creationId xmlns:a16="http://schemas.microsoft.com/office/drawing/2014/main" id="{C2256BD9-C63F-432F-B3CA-2DACDEC582A5}"/>
+                  <a16:creationId xmlns:a16="http://schemas.microsoft.com/office/drawing/2014/main" xmlns="" id="{C2256BD9-C63F-432F-B3CA-2DACDEC582A5}"/>
                 </a:ext>
               </a:extLst>
             </p:cNvPr>
@@ -9945,7 +9949,7 @@
           <p:cNvPr id="8" name="Slide Number Placeholder 7">
             <a:extLst>
               <a:ext uri="{FF2B5EF4-FFF2-40B4-BE49-F238E27FC236}">
-                <a16:creationId xmlns:a16="http://schemas.microsoft.com/office/drawing/2014/main" id="{DF61D421-F17A-4953-A9D1-EDD58F6180A2}"/>
+                <a16:creationId xmlns:a16="http://schemas.microsoft.com/office/drawing/2014/main" xmlns="" id="{DF61D421-F17A-4953-A9D1-EDD58F6180A2}"/>
               </a:ext>
             </a:extLst>
           </p:cNvPr>
@@ -10134,7 +10138,7 @@
           <p:cNvPr id="5" name="Title 1">
             <a:extLst>
               <a:ext uri="{FF2B5EF4-FFF2-40B4-BE49-F238E27FC236}">
-                <a16:creationId xmlns:a16="http://schemas.microsoft.com/office/drawing/2014/main" id="{F11C875C-9CAA-4838-BBDD-43705F932F58}"/>
+                <a16:creationId xmlns:a16="http://schemas.microsoft.com/office/drawing/2014/main" xmlns="" id="{F11C875C-9CAA-4838-BBDD-43705F932F58}"/>
               </a:ext>
             </a:extLst>
           </p:cNvPr>
@@ -10252,7 +10256,7 @@
           <p:cNvPr id="9" name="Picture 8">
             <a:extLst>
               <a:ext uri="{FF2B5EF4-FFF2-40B4-BE49-F238E27FC236}">
-                <a16:creationId xmlns:a16="http://schemas.microsoft.com/office/drawing/2014/main" id="{E51B9CE8-A297-4A7D-ACA1-4C68ADEE4141}"/>
+                <a16:creationId xmlns:a16="http://schemas.microsoft.com/office/drawing/2014/main" xmlns="" id="{E51B9CE8-A297-4A7D-ACA1-4C68ADEE4141}"/>
               </a:ext>
             </a:extLst>
           </p:cNvPr>
@@ -10282,7 +10286,7 @@
           <p:cNvPr id="11" name="Picture 10">
             <a:extLst>
               <a:ext uri="{FF2B5EF4-FFF2-40B4-BE49-F238E27FC236}">
-                <a16:creationId xmlns:a16="http://schemas.microsoft.com/office/drawing/2014/main" id="{DFE758EF-F0C4-4FCF-9A39-B643F8D56430}"/>
+                <a16:creationId xmlns:a16="http://schemas.microsoft.com/office/drawing/2014/main" xmlns="" id="{DFE758EF-F0C4-4FCF-9A39-B643F8D56430}"/>
               </a:ext>
             </a:extLst>
           </p:cNvPr>
@@ -10312,7 +10316,7 @@
           <p:cNvPr id="12" name="Picture 11">
             <a:extLst>
               <a:ext uri="{FF2B5EF4-FFF2-40B4-BE49-F238E27FC236}">
-                <a16:creationId xmlns:a16="http://schemas.microsoft.com/office/drawing/2014/main" id="{34B71FC2-8BF2-4EB9-83F5-C1A563E448E9}"/>
+                <a16:creationId xmlns:a16="http://schemas.microsoft.com/office/drawing/2014/main" xmlns="" id="{34B71FC2-8BF2-4EB9-83F5-C1A563E448E9}"/>
               </a:ext>
             </a:extLst>
           </p:cNvPr>
@@ -10342,7 +10346,7 @@
           <p:cNvPr id="14" name="Straight Arrow Connector 13">
             <a:extLst>
               <a:ext uri="{FF2B5EF4-FFF2-40B4-BE49-F238E27FC236}">
-                <a16:creationId xmlns:a16="http://schemas.microsoft.com/office/drawing/2014/main" id="{CFD8C50A-38CC-44D7-8E6F-B0B0549AE5F6}"/>
+                <a16:creationId xmlns:a16="http://schemas.microsoft.com/office/drawing/2014/main" xmlns="" id="{CFD8C50A-38CC-44D7-8E6F-B0B0549AE5F6}"/>
               </a:ext>
             </a:extLst>
           </p:cNvPr>
@@ -10384,7 +10388,7 @@
           <p:cNvPr id="15" name="Straight Arrow Connector 14">
             <a:extLst>
               <a:ext uri="{FF2B5EF4-FFF2-40B4-BE49-F238E27FC236}">
-                <a16:creationId xmlns:a16="http://schemas.microsoft.com/office/drawing/2014/main" id="{1CBB9985-9373-4EAF-B868-461F569BF544}"/>
+                <a16:creationId xmlns:a16="http://schemas.microsoft.com/office/drawing/2014/main" xmlns="" id="{1CBB9985-9373-4EAF-B868-461F569BF544}"/>
               </a:ext>
             </a:extLst>
           </p:cNvPr>
@@ -10428,7 +10432,7 @@
           <p:cNvPr id="19" name="TextBox 18">
             <a:extLst>
               <a:ext uri="{FF2B5EF4-FFF2-40B4-BE49-F238E27FC236}">
-                <a16:creationId xmlns:a16="http://schemas.microsoft.com/office/drawing/2014/main" id="{B5A0735C-F1BD-4670-A50D-304C14AF5A46}"/>
+                <a16:creationId xmlns:a16="http://schemas.microsoft.com/office/drawing/2014/main" xmlns="" id="{B5A0735C-F1BD-4670-A50D-304C14AF5A46}"/>
               </a:ext>
             </a:extLst>
           </p:cNvPr>
@@ -10477,7 +10481,7 @@
           <p:cNvPr id="20" name="TextBox 19">
             <a:extLst>
               <a:ext uri="{FF2B5EF4-FFF2-40B4-BE49-F238E27FC236}">
-                <a16:creationId xmlns:a16="http://schemas.microsoft.com/office/drawing/2014/main" id="{5706364F-4934-4403-A28D-85C0C8BFF3B3}"/>
+                <a16:creationId xmlns:a16="http://schemas.microsoft.com/office/drawing/2014/main" xmlns="" id="{5706364F-4934-4403-A28D-85C0C8BFF3B3}"/>
               </a:ext>
             </a:extLst>
           </p:cNvPr>
@@ -10516,7 +10520,7 @@
           <p:cNvPr id="21" name="TextBox 20">
             <a:extLst>
               <a:ext uri="{FF2B5EF4-FFF2-40B4-BE49-F238E27FC236}">
-                <a16:creationId xmlns:a16="http://schemas.microsoft.com/office/drawing/2014/main" id="{441831B6-543C-4A52-8709-D1E6B1F79DF3}"/>
+                <a16:creationId xmlns:a16="http://schemas.microsoft.com/office/drawing/2014/main" xmlns="" id="{441831B6-543C-4A52-8709-D1E6B1F79DF3}"/>
               </a:ext>
             </a:extLst>
           </p:cNvPr>
@@ -10545,7 +10549,31 @@
                   <a:srgbClr val="002060"/>
                 </a:solidFill>
               </a:rPr>
-              <a:t>Evaluated Elapsed CPU time and accuracy trade-off from 1 to 50 principle components</a:t>
+              <a:t>Evaluated Elapsed CPU time and accuracy trade-off from 1 to </a:t>
+            </a:r>
+            <a:r>
+              <a:rPr lang="en-US" sz="3200">
+                <a:solidFill>
+                  <a:srgbClr val="002060"/>
+                </a:solidFill>
+              </a:rPr>
+              <a:t>50 </a:t>
+            </a:r>
+            <a:r>
+              <a:rPr lang="en-US" sz="3200" smtClean="0">
+                <a:solidFill>
+                  <a:srgbClr val="002060"/>
+                </a:solidFill>
+              </a:rPr>
+              <a:t>principal </a:t>
+            </a:r>
+            <a:r>
+              <a:rPr lang="en-US" sz="3200" dirty="0">
+                <a:solidFill>
+                  <a:srgbClr val="002060"/>
+                </a:solidFill>
+              </a:rPr>
+              <a:t>components</a:t>
             </a:r>
           </a:p>
         </p:txBody>
@@ -10555,7 +10583,7 @@
           <p:cNvPr id="4" name="Slide Number Placeholder 3">
             <a:extLst>
               <a:ext uri="{FF2B5EF4-FFF2-40B4-BE49-F238E27FC236}">
-                <a16:creationId xmlns:a16="http://schemas.microsoft.com/office/drawing/2014/main" id="{A25E451D-EFF0-4C7E-9194-591559E11F4F}"/>
+                <a16:creationId xmlns:a16="http://schemas.microsoft.com/office/drawing/2014/main" xmlns="" id="{A25E451D-EFF0-4C7E-9194-591559E11F4F}"/>
               </a:ext>
             </a:extLst>
           </p:cNvPr>
@@ -10615,7 +10643,7 @@
           <p:cNvPr id="5" name="Title 1">
             <a:extLst>
               <a:ext uri="{FF2B5EF4-FFF2-40B4-BE49-F238E27FC236}">
-                <a16:creationId xmlns:a16="http://schemas.microsoft.com/office/drawing/2014/main" id="{79722C87-A69B-4E73-87EC-6C6F8D15C4B0}"/>
+                <a16:creationId xmlns:a16="http://schemas.microsoft.com/office/drawing/2014/main" xmlns="" id="{79722C87-A69B-4E73-87EC-6C6F8D15C4B0}"/>
               </a:ext>
             </a:extLst>
           </p:cNvPr>
@@ -10652,7 +10680,7 @@
           <p:cNvPr id="8" name="Rectangle 7">
             <a:extLst>
               <a:ext uri="{FF2B5EF4-FFF2-40B4-BE49-F238E27FC236}">
-                <a16:creationId xmlns:a16="http://schemas.microsoft.com/office/drawing/2014/main" id="{43FAC0D6-D534-4F9A-9430-BDBBBED886EC}"/>
+                <a16:creationId xmlns:a16="http://schemas.microsoft.com/office/drawing/2014/main" xmlns="" id="{43FAC0D6-D534-4F9A-9430-BDBBBED886EC}"/>
               </a:ext>
             </a:extLst>
           </p:cNvPr>
@@ -10838,7 +10866,7 @@
           <p:cNvPr id="9" name="Rectangle 8">
             <a:extLst>
               <a:ext uri="{FF2B5EF4-FFF2-40B4-BE49-F238E27FC236}">
-                <a16:creationId xmlns:a16="http://schemas.microsoft.com/office/drawing/2014/main" id="{6D5A3AD8-1DA9-46C5-9172-18CC97FBB918}"/>
+                <a16:creationId xmlns:a16="http://schemas.microsoft.com/office/drawing/2014/main" xmlns="" id="{6D5A3AD8-1DA9-46C5-9172-18CC97FBB918}"/>
               </a:ext>
             </a:extLst>
           </p:cNvPr>
@@ -10920,7 +10948,7 @@
           <p:cNvPr id="10" name="Straight Arrow Connector 9">
             <a:extLst>
               <a:ext uri="{FF2B5EF4-FFF2-40B4-BE49-F238E27FC236}">
-                <a16:creationId xmlns:a16="http://schemas.microsoft.com/office/drawing/2014/main" id="{5C884956-0ABD-4C1F-B169-191EE90A9240}"/>
+                <a16:creationId xmlns:a16="http://schemas.microsoft.com/office/drawing/2014/main" xmlns="" id="{5C884956-0ABD-4C1F-B169-191EE90A9240}"/>
               </a:ext>
             </a:extLst>
           </p:cNvPr>
@@ -10967,7 +10995,7 @@
           <p:cNvPr id="11" name="Straight Arrow Connector 10">
             <a:extLst>
               <a:ext uri="{FF2B5EF4-FFF2-40B4-BE49-F238E27FC236}">
-                <a16:creationId xmlns:a16="http://schemas.microsoft.com/office/drawing/2014/main" id="{DCC33062-763C-4582-BA22-2F1D77AC32A0}"/>
+                <a16:creationId xmlns:a16="http://schemas.microsoft.com/office/drawing/2014/main" xmlns="" id="{DCC33062-763C-4582-BA22-2F1D77AC32A0}"/>
               </a:ext>
             </a:extLst>
           </p:cNvPr>
@@ -11015,7 +11043,7 @@
           <p:cNvPr id="12" name="Straight Arrow Connector 11">
             <a:extLst>
               <a:ext uri="{FF2B5EF4-FFF2-40B4-BE49-F238E27FC236}">
-                <a16:creationId xmlns:a16="http://schemas.microsoft.com/office/drawing/2014/main" id="{8609C124-D374-417A-9F43-2BC50B6C7C4C}"/>
+                <a16:creationId xmlns:a16="http://schemas.microsoft.com/office/drawing/2014/main" xmlns="" id="{8609C124-D374-417A-9F43-2BC50B6C7C4C}"/>
               </a:ext>
             </a:extLst>
           </p:cNvPr>
@@ -11062,7 +11090,7 @@
           <p:cNvPr id="14" name="Group 13">
             <a:extLst>
               <a:ext uri="{FF2B5EF4-FFF2-40B4-BE49-F238E27FC236}">
-                <a16:creationId xmlns:a16="http://schemas.microsoft.com/office/drawing/2014/main" id="{0635F6D7-A741-42C8-8CE5-A40A07460466}"/>
+                <a16:creationId xmlns:a16="http://schemas.microsoft.com/office/drawing/2014/main" xmlns="" id="{0635F6D7-A741-42C8-8CE5-A40A07460466}"/>
               </a:ext>
             </a:extLst>
           </p:cNvPr>
@@ -11082,7 +11110,7 @@
             <p:cNvPr id="15" name="Straight Arrow Connector 14">
               <a:extLst>
                 <a:ext uri="{FF2B5EF4-FFF2-40B4-BE49-F238E27FC236}">
-                  <a16:creationId xmlns:a16="http://schemas.microsoft.com/office/drawing/2014/main" id="{34B6FDFE-218E-4571-B69B-DD6A2005557C}"/>
+                  <a16:creationId xmlns:a16="http://schemas.microsoft.com/office/drawing/2014/main" xmlns="" id="{34B6FDFE-218E-4571-B69B-DD6A2005557C}"/>
                 </a:ext>
               </a:extLst>
             </p:cNvPr>
@@ -11127,7 +11155,7 @@
             <p:cNvPr id="16" name="TextBox 15">
               <a:extLst>
                 <a:ext uri="{FF2B5EF4-FFF2-40B4-BE49-F238E27FC236}">
-                  <a16:creationId xmlns:a16="http://schemas.microsoft.com/office/drawing/2014/main" id="{471F24B6-E904-403C-B1D3-98587279F277}"/>
+                  <a16:creationId xmlns:a16="http://schemas.microsoft.com/office/drawing/2014/main" xmlns="" id="{471F24B6-E904-403C-B1D3-98587279F277}"/>
                 </a:ext>
               </a:extLst>
             </p:cNvPr>
@@ -11193,7 +11221,7 @@
           <p:cNvPr id="17" name="TextBox 16">
             <a:extLst>
               <a:ext uri="{FF2B5EF4-FFF2-40B4-BE49-F238E27FC236}">
-                <a16:creationId xmlns:a16="http://schemas.microsoft.com/office/drawing/2014/main" id="{1142723A-FBA4-4B81-AE36-384A60A6D59D}"/>
+                <a16:creationId xmlns:a16="http://schemas.microsoft.com/office/drawing/2014/main" xmlns="" id="{1142723A-FBA4-4B81-AE36-384A60A6D59D}"/>
               </a:ext>
             </a:extLst>
           </p:cNvPr>
@@ -11277,7 +11305,7 @@
           <p:cNvPr id="18" name="Thought Bubble: Cloud 17">
             <a:extLst>
               <a:ext uri="{FF2B5EF4-FFF2-40B4-BE49-F238E27FC236}">
-                <a16:creationId xmlns:a16="http://schemas.microsoft.com/office/drawing/2014/main" id="{7220210C-4032-40E2-8C8F-4089B3148427}"/>
+                <a16:creationId xmlns:a16="http://schemas.microsoft.com/office/drawing/2014/main" xmlns="" id="{7220210C-4032-40E2-8C8F-4089B3148427}"/>
               </a:ext>
             </a:extLst>
           </p:cNvPr>
@@ -11336,7 +11364,7 @@
           <p:cNvPr id="19" name="Thought Bubble: Cloud 18">
             <a:extLst>
               <a:ext uri="{FF2B5EF4-FFF2-40B4-BE49-F238E27FC236}">
-                <a16:creationId xmlns:a16="http://schemas.microsoft.com/office/drawing/2014/main" id="{DAA3F5E9-9516-4B52-977E-B8915D516190}"/>
+                <a16:creationId xmlns:a16="http://schemas.microsoft.com/office/drawing/2014/main" xmlns="" id="{DAA3F5E9-9516-4B52-977E-B8915D516190}"/>
               </a:ext>
             </a:extLst>
           </p:cNvPr>
@@ -11395,7 +11423,7 @@
           <p:cNvPr id="20" name="Thought Bubble: Cloud 19">
             <a:extLst>
               <a:ext uri="{FF2B5EF4-FFF2-40B4-BE49-F238E27FC236}">
-                <a16:creationId xmlns:a16="http://schemas.microsoft.com/office/drawing/2014/main" id="{FCD1DD38-C3BC-4093-8D7B-56FEC0D4BE50}"/>
+                <a16:creationId xmlns:a16="http://schemas.microsoft.com/office/drawing/2014/main" xmlns="" id="{FCD1DD38-C3BC-4093-8D7B-56FEC0D4BE50}"/>
               </a:ext>
             </a:extLst>
           </p:cNvPr>
@@ -11454,7 +11482,7 @@
           <p:cNvPr id="21" name="Picture 20">
             <a:extLst>
               <a:ext uri="{FF2B5EF4-FFF2-40B4-BE49-F238E27FC236}">
-                <a16:creationId xmlns:a16="http://schemas.microsoft.com/office/drawing/2014/main" id="{2019D004-464C-4CD7-BE55-6A86597A7CB4}"/>
+                <a16:creationId xmlns:a16="http://schemas.microsoft.com/office/drawing/2014/main" xmlns="" id="{2019D004-464C-4CD7-BE55-6A86597A7CB4}"/>
               </a:ext>
             </a:extLst>
           </p:cNvPr>
@@ -11484,7 +11512,7 @@
           <p:cNvPr id="4" name="Slide Number Placeholder 3">
             <a:extLst>
               <a:ext uri="{FF2B5EF4-FFF2-40B4-BE49-F238E27FC236}">
-                <a16:creationId xmlns:a16="http://schemas.microsoft.com/office/drawing/2014/main" id="{8C0E9D76-D46F-47B4-A6C4-A6431BE6D82D}"/>
+                <a16:creationId xmlns:a16="http://schemas.microsoft.com/office/drawing/2014/main" xmlns="" id="{8C0E9D76-D46F-47B4-A6C4-A6431BE6D82D}"/>
               </a:ext>
             </a:extLst>
           </p:cNvPr>
@@ -12088,7 +12116,7 @@
           <p:cNvPr id="11" name="Rectangle 10">
             <a:extLst>
               <a:ext uri="{FF2B5EF4-FFF2-40B4-BE49-F238E27FC236}">
-                <a16:creationId xmlns:a16="http://schemas.microsoft.com/office/drawing/2014/main" id="{30C037EB-A097-4A95-A80A-5179B2C25D74}"/>
+                <a16:creationId xmlns:a16="http://schemas.microsoft.com/office/drawing/2014/main" xmlns="" id="{30C037EB-A097-4A95-A80A-5179B2C25D74}"/>
               </a:ext>
             </a:extLst>
           </p:cNvPr>
@@ -12171,7 +12199,7 @@
           <p:cNvPr id="16" name="TextBox 15">
             <a:extLst>
               <a:ext uri="{FF2B5EF4-FFF2-40B4-BE49-F238E27FC236}">
-                <a16:creationId xmlns:a16="http://schemas.microsoft.com/office/drawing/2014/main" id="{CF020DC6-F39F-424A-B0F5-95A58E404C95}"/>
+                <a16:creationId xmlns:a16="http://schemas.microsoft.com/office/drawing/2014/main" xmlns="" id="{CF020DC6-F39F-424A-B0F5-95A58E404C95}"/>
               </a:ext>
             </a:extLst>
           </p:cNvPr>
@@ -12236,7 +12264,7 @@
           <p:cNvPr id="17" name="Rectangle 16">
             <a:extLst>
               <a:ext uri="{FF2B5EF4-FFF2-40B4-BE49-F238E27FC236}">
-                <a16:creationId xmlns:a16="http://schemas.microsoft.com/office/drawing/2014/main" id="{B0CA323F-35CC-40FB-9A50-4349AB36032A}"/>
+                <a16:creationId xmlns:a16="http://schemas.microsoft.com/office/drawing/2014/main" xmlns="" id="{B0CA323F-35CC-40FB-9A50-4349AB36032A}"/>
               </a:ext>
             </a:extLst>
           </p:cNvPr>
@@ -12370,7 +12398,7 @@
           <p:cNvPr id="22" name="Straight Arrow Connector 21">
             <a:extLst>
               <a:ext uri="{FF2B5EF4-FFF2-40B4-BE49-F238E27FC236}">
-                <a16:creationId xmlns:a16="http://schemas.microsoft.com/office/drawing/2014/main" id="{E5AB3887-2964-41E1-BADC-78E22026A8D6}"/>
+                <a16:creationId xmlns:a16="http://schemas.microsoft.com/office/drawing/2014/main" xmlns="" id="{E5AB3887-2964-41E1-BADC-78E22026A8D6}"/>
               </a:ext>
             </a:extLst>
           </p:cNvPr>
@@ -12417,7 +12445,7 @@
           <p:cNvPr id="10" name="Group 9">
             <a:extLst>
               <a:ext uri="{FF2B5EF4-FFF2-40B4-BE49-F238E27FC236}">
-                <a16:creationId xmlns:a16="http://schemas.microsoft.com/office/drawing/2014/main" id="{798BE1D3-E32D-4231-A09D-A4E59BD9D54B}"/>
+                <a16:creationId xmlns:a16="http://schemas.microsoft.com/office/drawing/2014/main" xmlns="" id="{798BE1D3-E32D-4231-A09D-A4E59BD9D54B}"/>
               </a:ext>
             </a:extLst>
           </p:cNvPr>
@@ -12437,7 +12465,7 @@
             <p:cNvPr id="24" name="Straight Arrow Connector 23">
               <a:extLst>
                 <a:ext uri="{FF2B5EF4-FFF2-40B4-BE49-F238E27FC236}">
-                  <a16:creationId xmlns:a16="http://schemas.microsoft.com/office/drawing/2014/main" id="{AFD81C80-C338-4F84-A54D-FD8E931EF2D1}"/>
+                  <a16:creationId xmlns:a16="http://schemas.microsoft.com/office/drawing/2014/main" xmlns="" id="{AFD81C80-C338-4F84-A54D-FD8E931EF2D1}"/>
                 </a:ext>
               </a:extLst>
             </p:cNvPr>
@@ -12482,7 +12510,7 @@
             <p:cNvPr id="25" name="TextBox 24">
               <a:extLst>
                 <a:ext uri="{FF2B5EF4-FFF2-40B4-BE49-F238E27FC236}">
-                  <a16:creationId xmlns:a16="http://schemas.microsoft.com/office/drawing/2014/main" id="{C05F794F-BC43-4EF2-A4B8-6FE8D9702A8E}"/>
+                  <a16:creationId xmlns:a16="http://schemas.microsoft.com/office/drawing/2014/main" xmlns="" id="{C05F794F-BC43-4EF2-A4B8-6FE8D9702A8E}"/>
                 </a:ext>
               </a:extLst>
             </p:cNvPr>
@@ -12548,7 +12576,7 @@
           <p:cNvPr id="41" name="Straight Arrow Connector 40">
             <a:extLst>
               <a:ext uri="{FF2B5EF4-FFF2-40B4-BE49-F238E27FC236}">
-                <a16:creationId xmlns:a16="http://schemas.microsoft.com/office/drawing/2014/main" id="{2763003B-C8D4-4A25-9508-51A19B7A806D}"/>
+                <a16:creationId xmlns:a16="http://schemas.microsoft.com/office/drawing/2014/main" xmlns="" id="{2763003B-C8D4-4A25-9508-51A19B7A806D}"/>
               </a:ext>
             </a:extLst>
           </p:cNvPr>
@@ -12595,7 +12623,7 @@
           <p:cNvPr id="42" name="TextBox 41">
             <a:extLst>
               <a:ext uri="{FF2B5EF4-FFF2-40B4-BE49-F238E27FC236}">
-                <a16:creationId xmlns:a16="http://schemas.microsoft.com/office/drawing/2014/main" id="{A78B5645-1941-44FB-B01F-A7508D997D60}"/>
+                <a16:creationId xmlns:a16="http://schemas.microsoft.com/office/drawing/2014/main" xmlns="" id="{A78B5645-1941-44FB-B01F-A7508D997D60}"/>
               </a:ext>
             </a:extLst>
           </p:cNvPr>
@@ -12696,7 +12724,7 @@
           <p:cNvPr id="4" name="Group 3">
             <a:extLst>
               <a:ext uri="{FF2B5EF4-FFF2-40B4-BE49-F238E27FC236}">
-                <a16:creationId xmlns:a16="http://schemas.microsoft.com/office/drawing/2014/main" id="{EE44A6D8-2083-45B0-8477-F8B65439B817}"/>
+                <a16:creationId xmlns:a16="http://schemas.microsoft.com/office/drawing/2014/main" xmlns="" id="{EE44A6D8-2083-45B0-8477-F8B65439B817}"/>
               </a:ext>
             </a:extLst>
           </p:cNvPr>
@@ -12716,7 +12744,7 @@
             <p:cNvPr id="15" name="Straight Arrow Connector 14">
               <a:extLst>
                 <a:ext uri="{FF2B5EF4-FFF2-40B4-BE49-F238E27FC236}">
-                  <a16:creationId xmlns:a16="http://schemas.microsoft.com/office/drawing/2014/main" id="{C4FB8097-6879-4C4B-A52B-1027BBB0E4CA}"/>
+                  <a16:creationId xmlns:a16="http://schemas.microsoft.com/office/drawing/2014/main" xmlns="" id="{C4FB8097-6879-4C4B-A52B-1027BBB0E4CA}"/>
                 </a:ext>
               </a:extLst>
             </p:cNvPr>
@@ -12765,7 +12793,7 @@
                 <p:cNvPr id="43" name="TextBox 42">
                   <a:extLst>
                     <a:ext uri="{FF2B5EF4-FFF2-40B4-BE49-F238E27FC236}">
-                      <a16:creationId xmlns:a16="http://schemas.microsoft.com/office/drawing/2014/main" id="{597C41D0-63D0-4C54-9EC7-FD1505B86CB9}"/>
+                      <a16:creationId xmlns:a16="http://schemas.microsoft.com/office/drawing/2014/main" xmlns="" id="{597C41D0-63D0-4C54-9EC7-FD1505B86CB9}"/>
                     </a:ext>
                   </a:extLst>
                 </p:cNvPr>
@@ -12872,6 +12900,23 @@
                       </m:oMath>
                     </m:oMathPara>
                   </a14:m>
+                  <a:r>
+                    <a:rPr kumimoji="0" lang="en-US" sz="1800" b="0" i="0" u="none" strike="noStrike" kern="1200" cap="none" spc="0" normalizeH="0" baseline="0" noProof="0" dirty="0">
+                      <a:ln>
+                        <a:noFill/>
+                      </a:ln>
+                      <a:solidFill>
+                        <a:prstClr val="black"/>
+                      </a:solidFill>
+                      <a:effectLst/>
+                      <a:uLnTx/>
+                      <a:uFillTx/>
+                      <a:latin typeface="Trebuchet MS" panose="020B0603020202020204"/>
+                      <a:ea typeface="+mn-ea"/>
+                      <a:cs typeface="+mn-cs"/>
+                    </a:rPr>
+                    <a:t/>
+                  </a:r>
                   <a:br>
                     <a:rPr kumimoji="0" lang="en-US" sz="1800" b="0" i="0" u="none" strike="noStrike" kern="1200" cap="none" spc="0" normalizeH="0" baseline="0" noProof="0" dirty="0">
                       <a:ln>
@@ -12957,7 +13002,7 @@
           <p:cNvPr id="50" name="TextBox 49">
             <a:extLst>
               <a:ext uri="{FF2B5EF4-FFF2-40B4-BE49-F238E27FC236}">
-                <a16:creationId xmlns:a16="http://schemas.microsoft.com/office/drawing/2014/main" id="{9CA50C34-6502-4513-B1E5-17DB8E7693CD}"/>
+                <a16:creationId xmlns:a16="http://schemas.microsoft.com/office/drawing/2014/main" xmlns="" id="{9CA50C34-6502-4513-B1E5-17DB8E7693CD}"/>
               </a:ext>
             </a:extLst>
           </p:cNvPr>
@@ -13022,7 +13067,7 @@
           <p:cNvPr id="21" name="Group 20">
             <a:extLst>
               <a:ext uri="{FF2B5EF4-FFF2-40B4-BE49-F238E27FC236}">
-                <a16:creationId xmlns:a16="http://schemas.microsoft.com/office/drawing/2014/main" id="{00DB0BCD-709D-480B-B0FE-382B8E7C661B}"/>
+                <a16:creationId xmlns:a16="http://schemas.microsoft.com/office/drawing/2014/main" xmlns="" id="{00DB0BCD-709D-480B-B0FE-382B8E7C661B}"/>
               </a:ext>
             </a:extLst>
           </p:cNvPr>
@@ -13042,7 +13087,7 @@
             <p:cNvPr id="23" name="Straight Arrow Connector 22">
               <a:extLst>
                 <a:ext uri="{FF2B5EF4-FFF2-40B4-BE49-F238E27FC236}">
-                  <a16:creationId xmlns:a16="http://schemas.microsoft.com/office/drawing/2014/main" id="{E281DB7B-E8F3-4CA3-97BF-913C840B15D9}"/>
+                  <a16:creationId xmlns:a16="http://schemas.microsoft.com/office/drawing/2014/main" xmlns="" id="{E281DB7B-E8F3-4CA3-97BF-913C840B15D9}"/>
                 </a:ext>
               </a:extLst>
             </p:cNvPr>
@@ -13091,7 +13136,7 @@
                 <p:cNvPr id="27" name="TextBox 26">
                   <a:extLst>
                     <a:ext uri="{FF2B5EF4-FFF2-40B4-BE49-F238E27FC236}">
-                      <a16:creationId xmlns:a16="http://schemas.microsoft.com/office/drawing/2014/main" id="{FC17AA30-640B-44E7-B451-DB310F832CE9}"/>
+                      <a16:creationId xmlns:a16="http://schemas.microsoft.com/office/drawing/2014/main" xmlns="" id="{FC17AA30-640B-44E7-B451-DB310F832CE9}"/>
                     </a:ext>
                   </a:extLst>
                 </p:cNvPr>
@@ -13217,7 +13262,7 @@
           <p:cNvPr id="29" name="Straight Arrow Connector 28">
             <a:extLst>
               <a:ext uri="{FF2B5EF4-FFF2-40B4-BE49-F238E27FC236}">
-                <a16:creationId xmlns:a16="http://schemas.microsoft.com/office/drawing/2014/main" id="{4DE7095F-495E-4A0B-8F26-26F15D9FA628}"/>
+                <a16:creationId xmlns:a16="http://schemas.microsoft.com/office/drawing/2014/main" xmlns="" id="{4DE7095F-495E-4A0B-8F26-26F15D9FA628}"/>
               </a:ext>
             </a:extLst>
           </p:cNvPr>
@@ -13264,7 +13309,7 @@
           <p:cNvPr id="3" name="Group 2">
             <a:extLst>
               <a:ext uri="{FF2B5EF4-FFF2-40B4-BE49-F238E27FC236}">
-                <a16:creationId xmlns:a16="http://schemas.microsoft.com/office/drawing/2014/main" id="{29556DD3-8312-4BFA-AFE4-DFB2DC245782}"/>
+                <a16:creationId xmlns:a16="http://schemas.microsoft.com/office/drawing/2014/main" xmlns="" id="{29556DD3-8312-4BFA-AFE4-DFB2DC245782}"/>
               </a:ext>
             </a:extLst>
           </p:cNvPr>
@@ -13284,7 +13329,7 @@
             <p:cNvPr id="28" name="Straight Arrow Connector 27">
               <a:extLst>
                 <a:ext uri="{FF2B5EF4-FFF2-40B4-BE49-F238E27FC236}">
-                  <a16:creationId xmlns:a16="http://schemas.microsoft.com/office/drawing/2014/main" id="{2E3A63AB-DF64-4A41-BE55-3FAF84EF8B38}"/>
+                  <a16:creationId xmlns:a16="http://schemas.microsoft.com/office/drawing/2014/main" xmlns="" id="{2E3A63AB-DF64-4A41-BE55-3FAF84EF8B38}"/>
                 </a:ext>
               </a:extLst>
             </p:cNvPr>
@@ -13333,7 +13378,7 @@
                 <p:cNvPr id="30" name="TextBox 29">
                   <a:extLst>
                     <a:ext uri="{FF2B5EF4-FFF2-40B4-BE49-F238E27FC236}">
-                      <a16:creationId xmlns:a16="http://schemas.microsoft.com/office/drawing/2014/main" id="{1514DF8D-03A9-4ECD-9F0B-CDE76DE928BE}"/>
+                      <a16:creationId xmlns:a16="http://schemas.microsoft.com/office/drawing/2014/main" xmlns="" id="{1514DF8D-03A9-4ECD-9F0B-CDE76DE928BE}"/>
                     </a:ext>
                   </a:extLst>
                 </p:cNvPr>
@@ -13391,6 +13436,10 @@
                       </m:oMath>
                     </m:oMathPara>
                   </a14:m>
+                  <a:r>
+                    <a:rPr lang="en-US" b="0" dirty="0"/>
+                    <a:t/>
+                  </a:r>
                   <a:br>
                     <a:rPr lang="en-US" b="0" dirty="0"/>
                   </a:br>
@@ -13450,7 +13499,7 @@
           <p:cNvPr id="20" name="Group 19">
             <a:extLst>
               <a:ext uri="{FF2B5EF4-FFF2-40B4-BE49-F238E27FC236}">
-                <a16:creationId xmlns:a16="http://schemas.microsoft.com/office/drawing/2014/main" id="{B36E2083-FBA1-48DB-A513-BBAA0378893F}"/>
+                <a16:creationId xmlns:a16="http://schemas.microsoft.com/office/drawing/2014/main" xmlns="" id="{B36E2083-FBA1-48DB-A513-BBAA0378893F}"/>
               </a:ext>
             </a:extLst>
           </p:cNvPr>
@@ -13470,7 +13519,7 @@
             <p:cNvPr id="31" name="Straight Arrow Connector 30">
               <a:extLst>
                 <a:ext uri="{FF2B5EF4-FFF2-40B4-BE49-F238E27FC236}">
-                  <a16:creationId xmlns:a16="http://schemas.microsoft.com/office/drawing/2014/main" id="{C0B3468B-BE22-4163-994B-03ADD06384B6}"/>
+                  <a16:creationId xmlns:a16="http://schemas.microsoft.com/office/drawing/2014/main" xmlns="" id="{C0B3468B-BE22-4163-994B-03ADD06384B6}"/>
                 </a:ext>
               </a:extLst>
             </p:cNvPr>
@@ -13519,7 +13568,7 @@
                 <p:cNvPr id="32" name="TextBox 31">
                   <a:extLst>
                     <a:ext uri="{FF2B5EF4-FFF2-40B4-BE49-F238E27FC236}">
-                      <a16:creationId xmlns:a16="http://schemas.microsoft.com/office/drawing/2014/main" id="{12529FFD-A2D3-4C7D-8A5A-B9E5CC49CEC3}"/>
+                      <a16:creationId xmlns:a16="http://schemas.microsoft.com/office/drawing/2014/main" xmlns="" id="{12529FFD-A2D3-4C7D-8A5A-B9E5CC49CEC3}"/>
                     </a:ext>
                   </a:extLst>
                 </p:cNvPr>
@@ -13577,6 +13626,10 @@
                       </m:oMath>
                     </m:oMathPara>
                   </a14:m>
+                  <a:r>
+                    <a:rPr lang="en-US" b="0" dirty="0"/>
+                    <a:t/>
+                  </a:r>
                   <a:br>
                     <a:rPr lang="en-US" b="0" dirty="0"/>
                   </a:br>
@@ -13636,7 +13689,7 @@
           <p:cNvPr id="33" name="Straight Arrow Connector 32">
             <a:extLst>
               <a:ext uri="{FF2B5EF4-FFF2-40B4-BE49-F238E27FC236}">
-                <a16:creationId xmlns:a16="http://schemas.microsoft.com/office/drawing/2014/main" id="{4856276E-CBCA-47F9-93A0-FBDAF1BFF544}"/>
+                <a16:creationId xmlns:a16="http://schemas.microsoft.com/office/drawing/2014/main" xmlns="" id="{4856276E-CBCA-47F9-93A0-FBDAF1BFF544}"/>
               </a:ext>
             </a:extLst>
           </p:cNvPr>
@@ -13684,7 +13737,7 @@
           <p:cNvPr id="39" name="Title 1">
             <a:extLst>
               <a:ext uri="{FF2B5EF4-FFF2-40B4-BE49-F238E27FC236}">
-                <a16:creationId xmlns:a16="http://schemas.microsoft.com/office/drawing/2014/main" id="{A8100B3E-DBA4-4DE0-864F-F152EE250F6F}"/>
+                <a16:creationId xmlns:a16="http://schemas.microsoft.com/office/drawing/2014/main" xmlns="" id="{A8100B3E-DBA4-4DE0-864F-F152EE250F6F}"/>
               </a:ext>
             </a:extLst>
           </p:cNvPr>
@@ -13721,7 +13774,7 @@
           <p:cNvPr id="6" name="Slide Number Placeholder 5">
             <a:extLst>
               <a:ext uri="{FF2B5EF4-FFF2-40B4-BE49-F238E27FC236}">
-                <a16:creationId xmlns:a16="http://schemas.microsoft.com/office/drawing/2014/main" id="{B09A1548-527A-433B-9B4A-E8989CFB6B15}"/>
+                <a16:creationId xmlns:a16="http://schemas.microsoft.com/office/drawing/2014/main" xmlns="" id="{B09A1548-527A-433B-9B4A-E8989CFB6B15}"/>
               </a:ext>
             </a:extLst>
           </p:cNvPr>
@@ -13751,7 +13804,7 @@
           <p:cNvPr id="8" name="Group 7">
             <a:extLst>
               <a:ext uri="{FF2B5EF4-FFF2-40B4-BE49-F238E27FC236}">
-                <a16:creationId xmlns:a16="http://schemas.microsoft.com/office/drawing/2014/main" id="{EABDCBF1-6629-4261-8977-A400FB700610}"/>
+                <a16:creationId xmlns:a16="http://schemas.microsoft.com/office/drawing/2014/main" xmlns="" id="{EABDCBF1-6629-4261-8977-A400FB700610}"/>
               </a:ext>
             </a:extLst>
           </p:cNvPr>
@@ -13771,7 +13824,7 @@
             <p:cNvPr id="26" name="TextBox 25">
               <a:extLst>
                 <a:ext uri="{FF2B5EF4-FFF2-40B4-BE49-F238E27FC236}">
-                  <a16:creationId xmlns:a16="http://schemas.microsoft.com/office/drawing/2014/main" id="{194E6F51-B414-44B5-96BA-A80FC0864F4F}"/>
+                  <a16:creationId xmlns:a16="http://schemas.microsoft.com/office/drawing/2014/main" xmlns="" id="{194E6F51-B414-44B5-96BA-A80FC0864F4F}"/>
                 </a:ext>
               </a:extLst>
             </p:cNvPr>
@@ -13815,7 +13868,7 @@
             <p:cNvPr id="40" name="Group 39">
               <a:extLst>
                 <a:ext uri="{FF2B5EF4-FFF2-40B4-BE49-F238E27FC236}">
-                  <a16:creationId xmlns:a16="http://schemas.microsoft.com/office/drawing/2014/main" id="{70AE469F-6C2F-4084-858C-6FA02B66A2F3}"/>
+                  <a16:creationId xmlns:a16="http://schemas.microsoft.com/office/drawing/2014/main" xmlns="" id="{70AE469F-6C2F-4084-858C-6FA02B66A2F3}"/>
                 </a:ext>
               </a:extLst>
             </p:cNvPr>
@@ -13835,7 +13888,7 @@
               <p:cNvPr id="44" name="Rectangle 43">
                 <a:extLst>
                   <a:ext uri="{FF2B5EF4-FFF2-40B4-BE49-F238E27FC236}">
-                    <a16:creationId xmlns:a16="http://schemas.microsoft.com/office/drawing/2014/main" id="{558891A4-A660-4D63-887E-457B959EA9B6}"/>
+                    <a16:creationId xmlns:a16="http://schemas.microsoft.com/office/drawing/2014/main" xmlns="" id="{558891A4-A660-4D63-887E-457B959EA9B6}"/>
                   </a:ext>
                 </a:extLst>
               </p:cNvPr>
@@ -13915,7 +13968,7 @@
               <p:cNvPr id="45" name="Group 44">
                 <a:extLst>
                   <a:ext uri="{FF2B5EF4-FFF2-40B4-BE49-F238E27FC236}">
-                    <a16:creationId xmlns:a16="http://schemas.microsoft.com/office/drawing/2014/main" id="{1F370D1A-BCE0-4EEC-97CC-A8A009EDB468}"/>
+                    <a16:creationId xmlns:a16="http://schemas.microsoft.com/office/drawing/2014/main" xmlns="" id="{1F370D1A-BCE0-4EEC-97CC-A8A009EDB468}"/>
                   </a:ext>
                 </a:extLst>
               </p:cNvPr>
@@ -13935,7 +13988,7 @@
                 <p:cNvPr id="49" name="Rectangle 48">
                   <a:extLst>
                     <a:ext uri="{FF2B5EF4-FFF2-40B4-BE49-F238E27FC236}">
-                      <a16:creationId xmlns:a16="http://schemas.microsoft.com/office/drawing/2014/main" id="{4A79A2CA-9D54-4E73-BCDF-14EAB2A42A7B}"/>
+                      <a16:creationId xmlns:a16="http://schemas.microsoft.com/office/drawing/2014/main" xmlns="" id="{4A79A2CA-9D54-4E73-BCDF-14EAB2A42A7B}"/>
                     </a:ext>
                   </a:extLst>
                 </p:cNvPr>
@@ -14022,7 +14075,7 @@
                 <p:cNvPr id="51" name="Rectangle 50">
                   <a:extLst>
                     <a:ext uri="{FF2B5EF4-FFF2-40B4-BE49-F238E27FC236}">
-                      <a16:creationId xmlns:a16="http://schemas.microsoft.com/office/drawing/2014/main" id="{D0684D9D-0EFA-457A-8BC6-1606FC273FD9}"/>
+                      <a16:creationId xmlns:a16="http://schemas.microsoft.com/office/drawing/2014/main" xmlns="" id="{D0684D9D-0EFA-457A-8BC6-1606FC273FD9}"/>
                     </a:ext>
                   </a:extLst>
                 </p:cNvPr>
@@ -14153,7 +14206,7 @@
           <p:cNvPr id="7" name="Group 6">
             <a:extLst>
               <a:ext uri="{FF2B5EF4-FFF2-40B4-BE49-F238E27FC236}">
-                <a16:creationId xmlns:a16="http://schemas.microsoft.com/office/drawing/2014/main" id="{739A96B0-70B1-417A-80F2-363E64367A32}"/>
+                <a16:creationId xmlns:a16="http://schemas.microsoft.com/office/drawing/2014/main" xmlns="" id="{739A96B0-70B1-417A-80F2-363E64367A32}"/>
               </a:ext>
             </a:extLst>
           </p:cNvPr>
@@ -14173,7 +14226,7 @@
             <p:cNvPr id="5" name="Group 4">
               <a:extLst>
                 <a:ext uri="{FF2B5EF4-FFF2-40B4-BE49-F238E27FC236}">
-                  <a16:creationId xmlns:a16="http://schemas.microsoft.com/office/drawing/2014/main" id="{766600B2-43D6-426A-BF4F-E893A35FBE58}"/>
+                  <a16:creationId xmlns:a16="http://schemas.microsoft.com/office/drawing/2014/main" xmlns="" id="{766600B2-43D6-426A-BF4F-E893A35FBE58}"/>
                 </a:ext>
               </a:extLst>
             </p:cNvPr>
@@ -14193,7 +14246,7 @@
               <p:cNvPr id="36" name="Rectangle 35">
                 <a:extLst>
                   <a:ext uri="{FF2B5EF4-FFF2-40B4-BE49-F238E27FC236}">
-                    <a16:creationId xmlns:a16="http://schemas.microsoft.com/office/drawing/2014/main" id="{69ADB7BC-9BA6-4C17-9E6D-B422AED9DAEC}"/>
+                    <a16:creationId xmlns:a16="http://schemas.microsoft.com/office/drawing/2014/main" xmlns="" id="{69ADB7BC-9BA6-4C17-9E6D-B422AED9DAEC}"/>
                   </a:ext>
                 </a:extLst>
               </p:cNvPr>
@@ -14273,7 +14326,7 @@
               <p:cNvPr id="48" name="Rectangle 47">
                 <a:extLst>
                   <a:ext uri="{FF2B5EF4-FFF2-40B4-BE49-F238E27FC236}">
-                    <a16:creationId xmlns:a16="http://schemas.microsoft.com/office/drawing/2014/main" id="{443CF2E7-3344-4452-99A5-CAC1F527AF55}"/>
+                    <a16:creationId xmlns:a16="http://schemas.microsoft.com/office/drawing/2014/main" xmlns="" id="{443CF2E7-3344-4452-99A5-CAC1F527AF55}"/>
                   </a:ext>
                 </a:extLst>
               </p:cNvPr>
@@ -14402,7 +14455,7 @@
             <p:cNvPr id="52" name="Rectangle 51">
               <a:extLst>
                 <a:ext uri="{FF2B5EF4-FFF2-40B4-BE49-F238E27FC236}">
-                  <a16:creationId xmlns:a16="http://schemas.microsoft.com/office/drawing/2014/main" id="{1134DA3A-0540-4260-BAB4-7484BD13F541}"/>
+                  <a16:creationId xmlns:a16="http://schemas.microsoft.com/office/drawing/2014/main" xmlns="" id="{1134DA3A-0540-4260-BAB4-7484BD13F541}"/>
                 </a:ext>
               </a:extLst>
             </p:cNvPr>
@@ -14490,7 +14543,7 @@
           <p:cNvPr id="53" name="Rectangle 52">
             <a:extLst>
               <a:ext uri="{FF2B5EF4-FFF2-40B4-BE49-F238E27FC236}">
-                <a16:creationId xmlns:a16="http://schemas.microsoft.com/office/drawing/2014/main" id="{E9B56035-CA91-4D33-9DEA-9922173D2D5B}"/>
+                <a16:creationId xmlns:a16="http://schemas.microsoft.com/office/drawing/2014/main" xmlns="" id="{E9B56035-CA91-4D33-9DEA-9922173D2D5B}"/>
               </a:ext>
             </a:extLst>
           </p:cNvPr>
@@ -14569,7 +14622,7 @@
           <p:cNvPr id="54" name="TextBox 53">
             <a:extLst>
               <a:ext uri="{FF2B5EF4-FFF2-40B4-BE49-F238E27FC236}">
-                <a16:creationId xmlns:a16="http://schemas.microsoft.com/office/drawing/2014/main" id="{367C69FA-901B-4FBD-B9B8-F7AB6C777723}"/>
+                <a16:creationId xmlns:a16="http://schemas.microsoft.com/office/drawing/2014/main" xmlns="" id="{367C69FA-901B-4FBD-B9B8-F7AB6C777723}"/>
               </a:ext>
             </a:extLst>
           </p:cNvPr>
@@ -15692,7 +15745,7 @@
           <p:cNvPr id="47" name="Rectangle 46">
             <a:extLst>
               <a:ext uri="{FF2B5EF4-FFF2-40B4-BE49-F238E27FC236}">
-                <a16:creationId xmlns:a16="http://schemas.microsoft.com/office/drawing/2014/main" id="{E33E5640-3ED1-4A60-A2C1-88A47377BA0C}"/>
+                <a16:creationId xmlns:a16="http://schemas.microsoft.com/office/drawing/2014/main" xmlns="" id="{E33E5640-3ED1-4A60-A2C1-88A47377BA0C}"/>
               </a:ext>
             </a:extLst>
           </p:cNvPr>
@@ -15822,7 +15875,7 @@
           <p:cNvPr id="48" name="Rectangle 47">
             <a:extLst>
               <a:ext uri="{FF2B5EF4-FFF2-40B4-BE49-F238E27FC236}">
-                <a16:creationId xmlns:a16="http://schemas.microsoft.com/office/drawing/2014/main" id="{443CF2E7-3344-4452-99A5-CAC1F527AF55}"/>
+                <a16:creationId xmlns:a16="http://schemas.microsoft.com/office/drawing/2014/main" xmlns="" id="{443CF2E7-3344-4452-99A5-CAC1F527AF55}"/>
               </a:ext>
             </a:extLst>
           </p:cNvPr>
@@ -15949,7 +16002,7 @@
           <p:cNvPr id="39" name="Title 1">
             <a:extLst>
               <a:ext uri="{FF2B5EF4-FFF2-40B4-BE49-F238E27FC236}">
-                <a16:creationId xmlns:a16="http://schemas.microsoft.com/office/drawing/2014/main" id="{A8100B3E-DBA4-4DE0-864F-F152EE250F6F}"/>
+                <a16:creationId xmlns:a16="http://schemas.microsoft.com/office/drawing/2014/main" xmlns="" id="{A8100B3E-DBA4-4DE0-864F-F152EE250F6F}"/>
               </a:ext>
             </a:extLst>
           </p:cNvPr>
@@ -15988,7 +16041,7 @@
           <p:cNvPr id="37" name="Straight Arrow Connector 36">
             <a:extLst>
               <a:ext uri="{FF2B5EF4-FFF2-40B4-BE49-F238E27FC236}">
-                <a16:creationId xmlns:a16="http://schemas.microsoft.com/office/drawing/2014/main" id="{9830D0AB-E7C4-4A5F-AE4C-FF9BCADD29CB}"/>
+                <a16:creationId xmlns:a16="http://schemas.microsoft.com/office/drawing/2014/main" xmlns="" id="{9830D0AB-E7C4-4A5F-AE4C-FF9BCADD29CB}"/>
               </a:ext>
             </a:extLst>
           </p:cNvPr>
@@ -16038,7 +16091,7 @@
               <p:cNvPr id="18" name="TextBox 17">
                 <a:extLst>
                   <a:ext uri="{FF2B5EF4-FFF2-40B4-BE49-F238E27FC236}">
-                    <a16:creationId xmlns:a16="http://schemas.microsoft.com/office/drawing/2014/main" id="{DBC36B95-FD05-42EA-B8DB-4052D4B6088B}"/>
+                    <a16:creationId xmlns:a16="http://schemas.microsoft.com/office/drawing/2014/main" xmlns="" id="{DBC36B95-FD05-42EA-B8DB-4052D4B6088B}"/>
                   </a:ext>
                 </a:extLst>
               </p:cNvPr>
@@ -16134,7 +16187,7 @@
               <p:cNvPr id="49" name="TextBox 48">
                 <a:extLst>
                   <a:ext uri="{FF2B5EF4-FFF2-40B4-BE49-F238E27FC236}">
-                    <a16:creationId xmlns:a16="http://schemas.microsoft.com/office/drawing/2014/main" id="{B7F51AAA-655B-4D93-A1BE-A16A2F16B9C7}"/>
+                    <a16:creationId xmlns:a16="http://schemas.microsoft.com/office/drawing/2014/main" xmlns="" id="{B7F51AAA-655B-4D93-A1BE-A16A2F16B9C7}"/>
                   </a:ext>
                 </a:extLst>
               </p:cNvPr>
@@ -16251,7 +16304,7 @@
           <p:cNvPr id="61" name="Straight Arrow Connector 60">
             <a:extLst>
               <a:ext uri="{FF2B5EF4-FFF2-40B4-BE49-F238E27FC236}">
-                <a16:creationId xmlns:a16="http://schemas.microsoft.com/office/drawing/2014/main" id="{BB190311-64E6-41BA-8AC5-E1B36EE27BBC}"/>
+                <a16:creationId xmlns:a16="http://schemas.microsoft.com/office/drawing/2014/main" xmlns="" id="{BB190311-64E6-41BA-8AC5-E1B36EE27BBC}"/>
               </a:ext>
             </a:extLst>
           </p:cNvPr>
@@ -16300,7 +16353,7 @@
               <p:cNvPr id="62" name="TextBox 61">
                 <a:extLst>
                   <a:ext uri="{FF2B5EF4-FFF2-40B4-BE49-F238E27FC236}">
-                    <a16:creationId xmlns:a16="http://schemas.microsoft.com/office/drawing/2014/main" id="{DCB73AB5-1E79-4FA1-9E38-323F1C5A5A7E}"/>
+                    <a16:creationId xmlns:a16="http://schemas.microsoft.com/office/drawing/2014/main" xmlns="" id="{DCB73AB5-1E79-4FA1-9E38-323F1C5A5A7E}"/>
                   </a:ext>
                 </a:extLst>
               </p:cNvPr>
@@ -16457,6 +16510,12 @@
                     </m:oMath>
                   </m:oMathPara>
                 </a14:m>
+                <a:r>
+                  <a:rPr lang="en-US" sz="3600" b="0" i="1" dirty="0">
+                    <a:latin typeface="Cambria Math" panose="02040503050406030204" pitchFamily="18" charset="0"/>
+                  </a:rPr>
+                  <a:t/>
+                </a:r>
                 <a:br>
                   <a:rPr lang="en-US" sz="3600" b="0" i="1" dirty="0">
                     <a:latin typeface="Cambria Math" panose="02040503050406030204" pitchFamily="18" charset="0"/>
@@ -16519,7 +16578,7 @@
               <p:cNvPr id="44" name="TextBox 43">
                 <a:extLst>
                   <a:ext uri="{FF2B5EF4-FFF2-40B4-BE49-F238E27FC236}">
-                    <a16:creationId xmlns:a16="http://schemas.microsoft.com/office/drawing/2014/main" id="{96AEF92C-3820-4AD1-9DEF-96AAE9B6ECC4}"/>
+                    <a16:creationId xmlns:a16="http://schemas.microsoft.com/office/drawing/2014/main" xmlns="" id="{96AEF92C-3820-4AD1-9DEF-96AAE9B6ECC4}"/>
                   </a:ext>
                 </a:extLst>
               </p:cNvPr>
@@ -16651,6 +16710,12 @@
                     </m:oMath>
                   </m:oMathPara>
                 </a14:m>
+                <a:r>
+                  <a:rPr lang="en-US" sz="3600" b="0" i="1" dirty="0">
+                    <a:latin typeface="Cambria Math" panose="02040503050406030204" pitchFamily="18" charset="0"/>
+                  </a:rPr>
+                  <a:t/>
+                </a:r>
                 <a:br>
                   <a:rPr lang="en-US" sz="3600" b="0" i="1" dirty="0">
                     <a:latin typeface="Cambria Math" panose="02040503050406030204" pitchFamily="18" charset="0"/>
@@ -16711,7 +16776,7 @@
           <p:cNvPr id="6" name="Group 5">
             <a:extLst>
               <a:ext uri="{FF2B5EF4-FFF2-40B4-BE49-F238E27FC236}">
-                <a16:creationId xmlns:a16="http://schemas.microsoft.com/office/drawing/2014/main" id="{9C65EE93-1366-4529-AC02-C93EF0A2EAD8}"/>
+                <a16:creationId xmlns:a16="http://schemas.microsoft.com/office/drawing/2014/main" xmlns="" id="{9C65EE93-1366-4529-AC02-C93EF0A2EAD8}"/>
               </a:ext>
             </a:extLst>
           </p:cNvPr>
@@ -16731,7 +16796,7 @@
             <p:cNvPr id="52" name="Rectangle 51">
               <a:extLst>
                 <a:ext uri="{FF2B5EF4-FFF2-40B4-BE49-F238E27FC236}">
-                  <a16:creationId xmlns:a16="http://schemas.microsoft.com/office/drawing/2014/main" id="{91FC43B0-13BB-407B-9AD3-1C274931DD69}"/>
+                  <a16:creationId xmlns:a16="http://schemas.microsoft.com/office/drawing/2014/main" xmlns="" id="{91FC43B0-13BB-407B-9AD3-1C274931DD69}"/>
                 </a:ext>
               </a:extLst>
             </p:cNvPr>
@@ -16858,7 +16923,7 @@
             <p:cNvPr id="57" name="Straight Arrow Connector 56">
               <a:extLst>
                 <a:ext uri="{FF2B5EF4-FFF2-40B4-BE49-F238E27FC236}">
-                  <a16:creationId xmlns:a16="http://schemas.microsoft.com/office/drawing/2014/main" id="{9058E969-1448-4669-B4EF-CC6D1D032033}"/>
+                  <a16:creationId xmlns:a16="http://schemas.microsoft.com/office/drawing/2014/main" xmlns="" id="{9058E969-1448-4669-B4EF-CC6D1D032033}"/>
                 </a:ext>
               </a:extLst>
             </p:cNvPr>
@@ -16905,7 +16970,7 @@
             <p:cNvPr id="60" name="Straight Arrow Connector 59">
               <a:extLst>
                 <a:ext uri="{FF2B5EF4-FFF2-40B4-BE49-F238E27FC236}">
-                  <a16:creationId xmlns:a16="http://schemas.microsoft.com/office/drawing/2014/main" id="{CCEF68B6-DD0B-4D8C-AD6F-9F0A4DF35CFD}"/>
+                  <a16:creationId xmlns:a16="http://schemas.microsoft.com/office/drawing/2014/main" xmlns="" id="{CCEF68B6-DD0B-4D8C-AD6F-9F0A4DF35CFD}"/>
                 </a:ext>
               </a:extLst>
             </p:cNvPr>
@@ -16952,7 +17017,7 @@
             <p:cNvPr id="78" name="Group 77">
               <a:extLst>
                 <a:ext uri="{FF2B5EF4-FFF2-40B4-BE49-F238E27FC236}">
-                  <a16:creationId xmlns:a16="http://schemas.microsoft.com/office/drawing/2014/main" id="{66B6B3CC-819B-4F73-BA1D-22E01B942256}"/>
+                  <a16:creationId xmlns:a16="http://schemas.microsoft.com/office/drawing/2014/main" xmlns="" id="{66B6B3CC-819B-4F73-BA1D-22E01B942256}"/>
                 </a:ext>
               </a:extLst>
             </p:cNvPr>
@@ -16972,7 +17037,7 @@
               <p:cNvPr id="73" name="Straight Arrow Connector 72">
                 <a:extLst>
                   <a:ext uri="{FF2B5EF4-FFF2-40B4-BE49-F238E27FC236}">
-                    <a16:creationId xmlns:a16="http://schemas.microsoft.com/office/drawing/2014/main" id="{866CB804-F56C-4CBF-BA49-6A23B5E61E53}"/>
+                    <a16:creationId xmlns:a16="http://schemas.microsoft.com/office/drawing/2014/main" xmlns="" id="{866CB804-F56C-4CBF-BA49-6A23B5E61E53}"/>
                   </a:ext>
                 </a:extLst>
               </p:cNvPr>
@@ -17017,7 +17082,7 @@
               <p:cNvPr id="74" name="Straight Arrow Connector 73">
                 <a:extLst>
                   <a:ext uri="{FF2B5EF4-FFF2-40B4-BE49-F238E27FC236}">
-                    <a16:creationId xmlns:a16="http://schemas.microsoft.com/office/drawing/2014/main" id="{618D90D4-D9AB-4072-8F45-F029840952AC}"/>
+                    <a16:creationId xmlns:a16="http://schemas.microsoft.com/office/drawing/2014/main" xmlns="" id="{618D90D4-D9AB-4072-8F45-F029840952AC}"/>
                   </a:ext>
                 </a:extLst>
               </p:cNvPr>
@@ -17064,7 +17129,7 @@
           <p:cNvPr id="2" name="Slide Number Placeholder 1">
             <a:extLst>
               <a:ext uri="{FF2B5EF4-FFF2-40B4-BE49-F238E27FC236}">
-                <a16:creationId xmlns:a16="http://schemas.microsoft.com/office/drawing/2014/main" id="{39A4A61C-E614-40D0-A029-086975E3AEA9}"/>
+                <a16:creationId xmlns:a16="http://schemas.microsoft.com/office/drawing/2014/main" xmlns="" id="{39A4A61C-E614-40D0-A029-086975E3AEA9}"/>
               </a:ext>
             </a:extLst>
           </p:cNvPr>
@@ -17409,7 +17474,7 @@
           <p:cNvPr id="69" name="Freeform: Shape 68">
             <a:extLst>
               <a:ext uri="{FF2B5EF4-FFF2-40B4-BE49-F238E27FC236}">
-                <a16:creationId xmlns:a16="http://schemas.microsoft.com/office/drawing/2014/main" id="{A0D700E9-CDA7-4D60-99AF-492B4B66860D}"/>
+                <a16:creationId xmlns:a16="http://schemas.microsoft.com/office/drawing/2014/main" xmlns="" id="{A0D700E9-CDA7-4D60-99AF-492B4B66860D}"/>
               </a:ext>
             </a:extLst>
           </p:cNvPr>
@@ -17521,7 +17586,7 @@
           <p:cNvPr id="47" name="Rectangle 46">
             <a:extLst>
               <a:ext uri="{FF2B5EF4-FFF2-40B4-BE49-F238E27FC236}">
-                <a16:creationId xmlns:a16="http://schemas.microsoft.com/office/drawing/2014/main" id="{E33E5640-3ED1-4A60-A2C1-88A47377BA0C}"/>
+                <a16:creationId xmlns:a16="http://schemas.microsoft.com/office/drawing/2014/main" xmlns="" id="{E33E5640-3ED1-4A60-A2C1-88A47377BA0C}"/>
               </a:ext>
             </a:extLst>
           </p:cNvPr>
@@ -17651,7 +17716,7 @@
           <p:cNvPr id="48" name="Rectangle 47">
             <a:extLst>
               <a:ext uri="{FF2B5EF4-FFF2-40B4-BE49-F238E27FC236}">
-                <a16:creationId xmlns:a16="http://schemas.microsoft.com/office/drawing/2014/main" id="{443CF2E7-3344-4452-99A5-CAC1F527AF55}"/>
+                <a16:creationId xmlns:a16="http://schemas.microsoft.com/office/drawing/2014/main" xmlns="" id="{443CF2E7-3344-4452-99A5-CAC1F527AF55}"/>
               </a:ext>
             </a:extLst>
           </p:cNvPr>
@@ -17778,7 +17843,7 @@
           <p:cNvPr id="39" name="Title 1">
             <a:extLst>
               <a:ext uri="{FF2B5EF4-FFF2-40B4-BE49-F238E27FC236}">
-                <a16:creationId xmlns:a16="http://schemas.microsoft.com/office/drawing/2014/main" id="{A8100B3E-DBA4-4DE0-864F-F152EE250F6F}"/>
+                <a16:creationId xmlns:a16="http://schemas.microsoft.com/office/drawing/2014/main" xmlns="" id="{A8100B3E-DBA4-4DE0-864F-F152EE250F6F}"/>
               </a:ext>
             </a:extLst>
           </p:cNvPr>
@@ -17817,7 +17882,7 @@
           <p:cNvPr id="37" name="Straight Arrow Connector 36">
             <a:extLst>
               <a:ext uri="{FF2B5EF4-FFF2-40B4-BE49-F238E27FC236}">
-                <a16:creationId xmlns:a16="http://schemas.microsoft.com/office/drawing/2014/main" id="{9830D0AB-E7C4-4A5F-AE4C-FF9BCADD29CB}"/>
+                <a16:creationId xmlns:a16="http://schemas.microsoft.com/office/drawing/2014/main" xmlns="" id="{9830D0AB-E7C4-4A5F-AE4C-FF9BCADD29CB}"/>
               </a:ext>
             </a:extLst>
           </p:cNvPr>
@@ -17867,7 +17932,7 @@
               <p:cNvPr id="18" name="TextBox 17">
                 <a:extLst>
                   <a:ext uri="{FF2B5EF4-FFF2-40B4-BE49-F238E27FC236}">
-                    <a16:creationId xmlns:a16="http://schemas.microsoft.com/office/drawing/2014/main" id="{DBC36B95-FD05-42EA-B8DB-4052D4B6088B}"/>
+                    <a16:creationId xmlns:a16="http://schemas.microsoft.com/office/drawing/2014/main" xmlns="" id="{DBC36B95-FD05-42EA-B8DB-4052D4B6088B}"/>
                   </a:ext>
                 </a:extLst>
               </p:cNvPr>
@@ -17963,7 +18028,7 @@
               <p:cNvPr id="49" name="TextBox 48">
                 <a:extLst>
                   <a:ext uri="{FF2B5EF4-FFF2-40B4-BE49-F238E27FC236}">
-                    <a16:creationId xmlns:a16="http://schemas.microsoft.com/office/drawing/2014/main" id="{B7F51AAA-655B-4D93-A1BE-A16A2F16B9C7}"/>
+                    <a16:creationId xmlns:a16="http://schemas.microsoft.com/office/drawing/2014/main" xmlns="" id="{B7F51AAA-655B-4D93-A1BE-A16A2F16B9C7}"/>
                   </a:ext>
                 </a:extLst>
               </p:cNvPr>
@@ -18080,7 +18145,7 @@
           <p:cNvPr id="61" name="Straight Arrow Connector 60">
             <a:extLst>
               <a:ext uri="{FF2B5EF4-FFF2-40B4-BE49-F238E27FC236}">
-                <a16:creationId xmlns:a16="http://schemas.microsoft.com/office/drawing/2014/main" id="{BB190311-64E6-41BA-8AC5-E1B36EE27BBC}"/>
+                <a16:creationId xmlns:a16="http://schemas.microsoft.com/office/drawing/2014/main" xmlns="" id="{BB190311-64E6-41BA-8AC5-E1B36EE27BBC}"/>
               </a:ext>
             </a:extLst>
           </p:cNvPr>
@@ -18129,7 +18194,7 @@
               <p:cNvPr id="62" name="TextBox 61">
                 <a:extLst>
                   <a:ext uri="{FF2B5EF4-FFF2-40B4-BE49-F238E27FC236}">
-                    <a16:creationId xmlns:a16="http://schemas.microsoft.com/office/drawing/2014/main" id="{DCB73AB5-1E79-4FA1-9E38-323F1C5A5A7E}"/>
+                    <a16:creationId xmlns:a16="http://schemas.microsoft.com/office/drawing/2014/main" xmlns="" id="{DCB73AB5-1E79-4FA1-9E38-323F1C5A5A7E}"/>
                   </a:ext>
                 </a:extLst>
               </p:cNvPr>
@@ -18286,6 +18351,12 @@
                     </m:oMath>
                   </m:oMathPara>
                 </a14:m>
+                <a:r>
+                  <a:rPr lang="en-US" sz="3600" b="0" i="1" dirty="0">
+                    <a:latin typeface="Cambria Math" panose="02040503050406030204" pitchFamily="18" charset="0"/>
+                  </a:rPr>
+                  <a:t/>
+                </a:r>
                 <a:br>
                   <a:rPr lang="en-US" sz="3600" b="0" i="1" dirty="0">
                     <a:latin typeface="Cambria Math" panose="02040503050406030204" pitchFamily="18" charset="0"/>
@@ -18348,7 +18419,7 @@
               <p:cNvPr id="40" name="TextBox 39">
                 <a:extLst>
                   <a:ext uri="{FF2B5EF4-FFF2-40B4-BE49-F238E27FC236}">
-                    <a16:creationId xmlns:a16="http://schemas.microsoft.com/office/drawing/2014/main" id="{AD092996-4549-49D9-B160-337093B26E54}"/>
+                    <a16:creationId xmlns:a16="http://schemas.microsoft.com/office/drawing/2014/main" xmlns="" id="{AD092996-4549-49D9-B160-337093B26E54}"/>
                   </a:ext>
                 </a:extLst>
               </p:cNvPr>
@@ -18981,7 +19052,7 @@
           <p:cNvPr id="79" name="Group 78">
             <a:extLst>
               <a:ext uri="{FF2B5EF4-FFF2-40B4-BE49-F238E27FC236}">
-                <a16:creationId xmlns:a16="http://schemas.microsoft.com/office/drawing/2014/main" id="{FC1971F2-8FB3-42CE-8B72-D7EC76EBA8E1}"/>
+                <a16:creationId xmlns:a16="http://schemas.microsoft.com/office/drawing/2014/main" xmlns="" id="{FC1971F2-8FB3-42CE-8B72-D7EC76EBA8E1}"/>
               </a:ext>
             </a:extLst>
           </p:cNvPr>
@@ -19003,7 +19074,7 @@
                 <p:cNvPr id="44" name="TextBox 43">
                   <a:extLst>
                     <a:ext uri="{FF2B5EF4-FFF2-40B4-BE49-F238E27FC236}">
-                      <a16:creationId xmlns:a16="http://schemas.microsoft.com/office/drawing/2014/main" id="{96AEF92C-3820-4AD1-9DEF-96AAE9B6ECC4}"/>
+                      <a16:creationId xmlns:a16="http://schemas.microsoft.com/office/drawing/2014/main" xmlns="" id="{96AEF92C-3820-4AD1-9DEF-96AAE9B6ECC4}"/>
                     </a:ext>
                   </a:extLst>
                 </p:cNvPr>
@@ -19135,6 +19206,12 @@
                       </m:oMath>
                     </m:oMathPara>
                   </a14:m>
+                  <a:r>
+                    <a:rPr lang="en-US" sz="3600" b="0" i="1" dirty="0">
+                      <a:latin typeface="Cambria Math" panose="02040503050406030204" pitchFamily="18" charset="0"/>
+                    </a:rPr>
+                    <a:t/>
+                  </a:r>
                   <a:br>
                     <a:rPr lang="en-US" sz="3600" b="0" i="1" dirty="0">
                       <a:latin typeface="Cambria Math" panose="02040503050406030204" pitchFamily="18" charset="0"/>
@@ -19195,7 +19272,7 @@
             <p:cNvPr id="52" name="Rectangle 51">
               <a:extLst>
                 <a:ext uri="{FF2B5EF4-FFF2-40B4-BE49-F238E27FC236}">
-                  <a16:creationId xmlns:a16="http://schemas.microsoft.com/office/drawing/2014/main" id="{91FC43B0-13BB-407B-9AD3-1C274931DD69}"/>
+                  <a16:creationId xmlns:a16="http://schemas.microsoft.com/office/drawing/2014/main" xmlns="" id="{91FC43B0-13BB-407B-9AD3-1C274931DD69}"/>
                 </a:ext>
               </a:extLst>
             </p:cNvPr>
@@ -19322,7 +19399,7 @@
             <p:cNvPr id="53" name="Rectangle 52">
               <a:extLst>
                 <a:ext uri="{FF2B5EF4-FFF2-40B4-BE49-F238E27FC236}">
-                  <a16:creationId xmlns:a16="http://schemas.microsoft.com/office/drawing/2014/main" id="{6521DF2A-636A-4B52-B7B6-F07278A1ACE9}"/>
+                  <a16:creationId xmlns:a16="http://schemas.microsoft.com/office/drawing/2014/main" xmlns="" id="{6521DF2A-636A-4B52-B7B6-F07278A1ACE9}"/>
                 </a:ext>
               </a:extLst>
             </p:cNvPr>
@@ -19413,7 +19490,7 @@
             <p:cNvPr id="54" name="Rectangle 53">
               <a:extLst>
                 <a:ext uri="{FF2B5EF4-FFF2-40B4-BE49-F238E27FC236}">
-                  <a16:creationId xmlns:a16="http://schemas.microsoft.com/office/drawing/2014/main" id="{40B2407F-6ACD-4D0C-A691-ABAF372DF723}"/>
+                  <a16:creationId xmlns:a16="http://schemas.microsoft.com/office/drawing/2014/main" xmlns="" id="{40B2407F-6ACD-4D0C-A691-ABAF372DF723}"/>
                 </a:ext>
               </a:extLst>
             </p:cNvPr>
@@ -19546,7 +19623,7 @@
             <p:cNvPr id="57" name="Straight Arrow Connector 56">
               <a:extLst>
                 <a:ext uri="{FF2B5EF4-FFF2-40B4-BE49-F238E27FC236}">
-                  <a16:creationId xmlns:a16="http://schemas.microsoft.com/office/drawing/2014/main" id="{9058E969-1448-4669-B4EF-CC6D1D032033}"/>
+                  <a16:creationId xmlns:a16="http://schemas.microsoft.com/office/drawing/2014/main" xmlns="" id="{9058E969-1448-4669-B4EF-CC6D1D032033}"/>
                 </a:ext>
               </a:extLst>
             </p:cNvPr>
@@ -19593,7 +19670,7 @@
             <p:cNvPr id="58" name="Straight Arrow Connector 57">
               <a:extLst>
                 <a:ext uri="{FF2B5EF4-FFF2-40B4-BE49-F238E27FC236}">
-                  <a16:creationId xmlns:a16="http://schemas.microsoft.com/office/drawing/2014/main" id="{E51644D2-F391-4D0D-B60A-A41D84D1F911}"/>
+                  <a16:creationId xmlns:a16="http://schemas.microsoft.com/office/drawing/2014/main" xmlns="" id="{E51644D2-F391-4D0D-B60A-A41D84D1F911}"/>
                 </a:ext>
               </a:extLst>
             </p:cNvPr>
@@ -19640,7 +19717,7 @@
             <p:cNvPr id="59" name="Straight Arrow Connector 58">
               <a:extLst>
                 <a:ext uri="{FF2B5EF4-FFF2-40B4-BE49-F238E27FC236}">
-                  <a16:creationId xmlns:a16="http://schemas.microsoft.com/office/drawing/2014/main" id="{D8DFEF77-59D5-4A19-A93F-1C1F6A1657CE}"/>
+                  <a16:creationId xmlns:a16="http://schemas.microsoft.com/office/drawing/2014/main" xmlns="" id="{D8DFEF77-59D5-4A19-A93F-1C1F6A1657CE}"/>
                 </a:ext>
               </a:extLst>
             </p:cNvPr>
@@ -19687,7 +19764,7 @@
             <p:cNvPr id="60" name="Straight Arrow Connector 59">
               <a:extLst>
                 <a:ext uri="{FF2B5EF4-FFF2-40B4-BE49-F238E27FC236}">
-                  <a16:creationId xmlns:a16="http://schemas.microsoft.com/office/drawing/2014/main" id="{CCEF68B6-DD0B-4D8C-AD6F-9F0A4DF35CFD}"/>
+                  <a16:creationId xmlns:a16="http://schemas.microsoft.com/office/drawing/2014/main" xmlns="" id="{CCEF68B6-DD0B-4D8C-AD6F-9F0A4DF35CFD}"/>
                 </a:ext>
               </a:extLst>
             </p:cNvPr>
@@ -19736,7 +19813,7 @@
                 <p:cNvPr id="63" name="TextBox 62">
                   <a:extLst>
                     <a:ext uri="{FF2B5EF4-FFF2-40B4-BE49-F238E27FC236}">
-                      <a16:creationId xmlns:a16="http://schemas.microsoft.com/office/drawing/2014/main" id="{C02C4A60-181A-41E7-82B5-FF541B3DE4A9}"/>
+                      <a16:creationId xmlns:a16="http://schemas.microsoft.com/office/drawing/2014/main" xmlns="" id="{C02C4A60-181A-41E7-82B5-FF541B3DE4A9}"/>
                     </a:ext>
                   </a:extLst>
                 </p:cNvPr>
@@ -19851,7 +19928,7 @@
                 <p:cNvPr id="64" name="TextBox 63">
                   <a:extLst>
                     <a:ext uri="{FF2B5EF4-FFF2-40B4-BE49-F238E27FC236}">
-                      <a16:creationId xmlns:a16="http://schemas.microsoft.com/office/drawing/2014/main" id="{2FD9758A-D517-49FB-B655-871A9E2A56A0}"/>
+                      <a16:creationId xmlns:a16="http://schemas.microsoft.com/office/drawing/2014/main" xmlns="" id="{2FD9758A-D517-49FB-B655-871A9E2A56A0}"/>
                     </a:ext>
                   </a:extLst>
                 </p:cNvPr>
@@ -19999,7 +20076,7 @@
                 <p:cNvPr id="71" name="TextBox 70">
                   <a:extLst>
                     <a:ext uri="{FF2B5EF4-FFF2-40B4-BE49-F238E27FC236}">
-                      <a16:creationId xmlns:a16="http://schemas.microsoft.com/office/drawing/2014/main" id="{7FEFB8D8-31BE-476C-B2BB-DFA18E2476A4}"/>
+                      <a16:creationId xmlns:a16="http://schemas.microsoft.com/office/drawing/2014/main" xmlns="" id="{7FEFB8D8-31BE-476C-B2BB-DFA18E2476A4}"/>
                     </a:ext>
                   </a:extLst>
                 </p:cNvPr>
@@ -20117,7 +20194,7 @@
           <p:cNvPr id="78" name="Group 77">
             <a:extLst>
               <a:ext uri="{FF2B5EF4-FFF2-40B4-BE49-F238E27FC236}">
-                <a16:creationId xmlns:a16="http://schemas.microsoft.com/office/drawing/2014/main" id="{66B6B3CC-819B-4F73-BA1D-22E01B942256}"/>
+                <a16:creationId xmlns:a16="http://schemas.microsoft.com/office/drawing/2014/main" xmlns="" id="{66B6B3CC-819B-4F73-BA1D-22E01B942256}"/>
               </a:ext>
             </a:extLst>
           </p:cNvPr>
@@ -20137,7 +20214,7 @@
             <p:cNvPr id="73" name="Straight Arrow Connector 72">
               <a:extLst>
                 <a:ext uri="{FF2B5EF4-FFF2-40B4-BE49-F238E27FC236}">
-                  <a16:creationId xmlns:a16="http://schemas.microsoft.com/office/drawing/2014/main" id="{866CB804-F56C-4CBF-BA49-6A23B5E61E53}"/>
+                  <a16:creationId xmlns:a16="http://schemas.microsoft.com/office/drawing/2014/main" xmlns="" id="{866CB804-F56C-4CBF-BA49-6A23B5E61E53}"/>
                 </a:ext>
               </a:extLst>
             </p:cNvPr>
@@ -20182,7 +20259,7 @@
             <p:cNvPr id="74" name="Straight Arrow Connector 73">
               <a:extLst>
                 <a:ext uri="{FF2B5EF4-FFF2-40B4-BE49-F238E27FC236}">
-                  <a16:creationId xmlns:a16="http://schemas.microsoft.com/office/drawing/2014/main" id="{618D90D4-D9AB-4072-8F45-F029840952AC}"/>
+                  <a16:creationId xmlns:a16="http://schemas.microsoft.com/office/drawing/2014/main" xmlns="" id="{618D90D4-D9AB-4072-8F45-F029840952AC}"/>
                 </a:ext>
               </a:extLst>
             </p:cNvPr>
@@ -20228,7 +20305,7 @@
           <p:cNvPr id="2" name="Slide Number Placeholder 1">
             <a:extLst>
               <a:ext uri="{FF2B5EF4-FFF2-40B4-BE49-F238E27FC236}">
-                <a16:creationId xmlns:a16="http://schemas.microsoft.com/office/drawing/2014/main" id="{39A4A61C-E614-40D0-A029-086975E3AEA9}"/>
+                <a16:creationId xmlns:a16="http://schemas.microsoft.com/office/drawing/2014/main" xmlns="" id="{39A4A61C-E614-40D0-A029-086975E3AEA9}"/>
               </a:ext>
             </a:extLst>
           </p:cNvPr>
@@ -20671,7 +20748,7 @@
           <p:cNvPr id="39" name="Title 1">
             <a:extLst>
               <a:ext uri="{FF2B5EF4-FFF2-40B4-BE49-F238E27FC236}">
-                <a16:creationId xmlns:a16="http://schemas.microsoft.com/office/drawing/2014/main" id="{A8100B3E-DBA4-4DE0-864F-F152EE250F6F}"/>
+                <a16:creationId xmlns:a16="http://schemas.microsoft.com/office/drawing/2014/main" xmlns="" id="{A8100B3E-DBA4-4DE0-864F-F152EE250F6F}"/>
               </a:ext>
             </a:extLst>
           </p:cNvPr>
@@ -20710,7 +20787,7 @@
           <p:cNvPr id="5" name="Picture 4">
             <a:extLst>
               <a:ext uri="{FF2B5EF4-FFF2-40B4-BE49-F238E27FC236}">
-                <a16:creationId xmlns:a16="http://schemas.microsoft.com/office/drawing/2014/main" id="{4D1378B7-6BFA-49E8-A1A9-8E545C816AE6}"/>
+                <a16:creationId xmlns:a16="http://schemas.microsoft.com/office/drawing/2014/main" xmlns="" id="{4D1378B7-6BFA-49E8-A1A9-8E545C816AE6}"/>
               </a:ext>
             </a:extLst>
           </p:cNvPr>
@@ -20740,7 +20817,7 @@
           <p:cNvPr id="10" name="TextBox 9">
             <a:extLst>
               <a:ext uri="{FF2B5EF4-FFF2-40B4-BE49-F238E27FC236}">
-                <a16:creationId xmlns:a16="http://schemas.microsoft.com/office/drawing/2014/main" id="{2CC07CA0-CB3B-408F-BCA2-C72403DBEF1E}"/>
+                <a16:creationId xmlns:a16="http://schemas.microsoft.com/office/drawing/2014/main" xmlns="" id="{2CC07CA0-CB3B-408F-BCA2-C72403DBEF1E}"/>
               </a:ext>
             </a:extLst>
           </p:cNvPr>
@@ -20870,7 +20947,7 @@
           <p:cNvPr id="4" name="Slide Number Placeholder 3">
             <a:extLst>
               <a:ext uri="{FF2B5EF4-FFF2-40B4-BE49-F238E27FC236}">
-                <a16:creationId xmlns:a16="http://schemas.microsoft.com/office/drawing/2014/main" id="{DBB2CB64-79F8-4F5F-81B9-45283DB80F0B}"/>
+                <a16:creationId xmlns:a16="http://schemas.microsoft.com/office/drawing/2014/main" xmlns="" id="{DBB2CB64-79F8-4F5F-81B9-45283DB80F0B}"/>
               </a:ext>
             </a:extLst>
           </p:cNvPr>
@@ -20930,7 +21007,7 @@
           <p:cNvPr id="39" name="Title 1">
             <a:extLst>
               <a:ext uri="{FF2B5EF4-FFF2-40B4-BE49-F238E27FC236}">
-                <a16:creationId xmlns:a16="http://schemas.microsoft.com/office/drawing/2014/main" id="{A8100B3E-DBA4-4DE0-864F-F152EE250F6F}"/>
+                <a16:creationId xmlns:a16="http://schemas.microsoft.com/office/drawing/2014/main" xmlns="" id="{A8100B3E-DBA4-4DE0-864F-F152EE250F6F}"/>
               </a:ext>
             </a:extLst>
           </p:cNvPr>
@@ -20969,7 +21046,7 @@
           <p:cNvPr id="7" name="Picture 6">
             <a:extLst>
               <a:ext uri="{FF2B5EF4-FFF2-40B4-BE49-F238E27FC236}">
-                <a16:creationId xmlns:a16="http://schemas.microsoft.com/office/drawing/2014/main" id="{880130BA-E803-4AF9-84DE-FEC7D1B8465C}"/>
+                <a16:creationId xmlns:a16="http://schemas.microsoft.com/office/drawing/2014/main" xmlns="" id="{880130BA-E803-4AF9-84DE-FEC7D1B8465C}"/>
               </a:ext>
             </a:extLst>
           </p:cNvPr>
@@ -21001,7 +21078,7 @@
               <p:cNvPr id="19" name="TextBox 18">
                 <a:extLst>
                   <a:ext uri="{FF2B5EF4-FFF2-40B4-BE49-F238E27FC236}">
-                    <a16:creationId xmlns:a16="http://schemas.microsoft.com/office/drawing/2014/main" id="{D8D0DE4E-798E-48AC-B5F0-09A08252B1EA}"/>
+                    <a16:creationId xmlns:a16="http://schemas.microsoft.com/office/drawing/2014/main" xmlns="" id="{D8D0DE4E-798E-48AC-B5F0-09A08252B1EA}"/>
                   </a:ext>
                 </a:extLst>
               </p:cNvPr>
@@ -21117,7 +21194,7 @@
           <p:cNvPr id="4" name="Picture 3">
             <a:extLst>
               <a:ext uri="{FF2B5EF4-FFF2-40B4-BE49-F238E27FC236}">
-                <a16:creationId xmlns:a16="http://schemas.microsoft.com/office/drawing/2014/main" id="{356AFBDB-AE54-4D90-959E-3EA191380400}"/>
+                <a16:creationId xmlns:a16="http://schemas.microsoft.com/office/drawing/2014/main" xmlns="" id="{356AFBDB-AE54-4D90-959E-3EA191380400}"/>
               </a:ext>
             </a:extLst>
           </p:cNvPr>
@@ -21152,7 +21229,7 @@
               <p:cNvPr id="14" name="TextBox 13">
                 <a:extLst>
                   <a:ext uri="{FF2B5EF4-FFF2-40B4-BE49-F238E27FC236}">
-                    <a16:creationId xmlns:a16="http://schemas.microsoft.com/office/drawing/2014/main" id="{11386286-1DB9-48C0-B384-3982ECB152DC}"/>
+                    <a16:creationId xmlns:a16="http://schemas.microsoft.com/office/drawing/2014/main" xmlns="" id="{11386286-1DB9-48C0-B384-3982ECB152DC}"/>
                   </a:ext>
                 </a:extLst>
               </p:cNvPr>
@@ -21359,7 +21436,7 @@
           <p:cNvPr id="15" name="Straight Arrow Connector 14">
             <a:extLst>
               <a:ext uri="{FF2B5EF4-FFF2-40B4-BE49-F238E27FC236}">
-                <a16:creationId xmlns:a16="http://schemas.microsoft.com/office/drawing/2014/main" id="{DED34169-5224-478D-AC0E-AC722990B934}"/>
+                <a16:creationId xmlns:a16="http://schemas.microsoft.com/office/drawing/2014/main" xmlns="" id="{DED34169-5224-478D-AC0E-AC722990B934}"/>
               </a:ext>
             </a:extLst>
           </p:cNvPr>
@@ -21408,7 +21485,7 @@
               <p:cNvPr id="9" name="TextBox 8">
                 <a:extLst>
                   <a:ext uri="{FF2B5EF4-FFF2-40B4-BE49-F238E27FC236}">
-                    <a16:creationId xmlns:a16="http://schemas.microsoft.com/office/drawing/2014/main" id="{E61FDD08-D0F9-42EB-BB2D-C8273378B37C}"/>
+                    <a16:creationId xmlns:a16="http://schemas.microsoft.com/office/drawing/2014/main" xmlns="" id="{E61FDD08-D0F9-42EB-BB2D-C8273378B37C}"/>
                   </a:ext>
                 </a:extLst>
               </p:cNvPr>
@@ -21542,7 +21619,7 @@
           <p:cNvPr id="12" name="Rectangle 11">
             <a:extLst>
               <a:ext uri="{FF2B5EF4-FFF2-40B4-BE49-F238E27FC236}">
-                <a16:creationId xmlns:a16="http://schemas.microsoft.com/office/drawing/2014/main" id="{7BEC8890-3B6C-46BD-B8CD-C983AA8200F5}"/>
+                <a16:creationId xmlns:a16="http://schemas.microsoft.com/office/drawing/2014/main" xmlns="" id="{7BEC8890-3B6C-46BD-B8CD-C983AA8200F5}"/>
               </a:ext>
             </a:extLst>
           </p:cNvPr>
@@ -21598,7 +21675,7 @@
           <p:cNvPr id="16" name="Speech Bubble: Rectangle with Corners Rounded 15">
             <a:extLst>
               <a:ext uri="{FF2B5EF4-FFF2-40B4-BE49-F238E27FC236}">
-                <a16:creationId xmlns:a16="http://schemas.microsoft.com/office/drawing/2014/main" id="{99D61782-029C-4E3C-978F-66F996BC6628}"/>
+                <a16:creationId xmlns:a16="http://schemas.microsoft.com/office/drawing/2014/main" xmlns="" id="{99D61782-029C-4E3C-978F-66F996BC6628}"/>
               </a:ext>
             </a:extLst>
           </p:cNvPr>
@@ -21670,7 +21747,7 @@
           <p:cNvPr id="5" name="Slide Number Placeholder 4">
             <a:extLst>
               <a:ext uri="{FF2B5EF4-FFF2-40B4-BE49-F238E27FC236}">
-                <a16:creationId xmlns:a16="http://schemas.microsoft.com/office/drawing/2014/main" id="{AFBCBA92-9C9D-4CE1-9E8C-B44A24A95188}"/>
+                <a16:creationId xmlns:a16="http://schemas.microsoft.com/office/drawing/2014/main" xmlns="" id="{AFBCBA92-9C9D-4CE1-9E8C-B44A24A95188}"/>
               </a:ext>
             </a:extLst>
           </p:cNvPr>
@@ -22208,7 +22285,7 @@
           <p:cNvPr id="5" name="Title 1">
             <a:extLst>
               <a:ext uri="{FF2B5EF4-FFF2-40B4-BE49-F238E27FC236}">
-                <a16:creationId xmlns:a16="http://schemas.microsoft.com/office/drawing/2014/main" id="{F11C875C-9CAA-4838-BBDD-43705F932F58}"/>
+                <a16:creationId xmlns:a16="http://schemas.microsoft.com/office/drawing/2014/main" xmlns="" id="{F11C875C-9CAA-4838-BBDD-43705F932F58}"/>
               </a:ext>
             </a:extLst>
           </p:cNvPr>
@@ -22326,7 +22403,7 @@
           <p:cNvPr id="14" name="Picture 13">
             <a:extLst>
               <a:ext uri="{FF2B5EF4-FFF2-40B4-BE49-F238E27FC236}">
-                <a16:creationId xmlns:a16="http://schemas.microsoft.com/office/drawing/2014/main" id="{A5018CE7-28D9-4022-9A9E-B2B9B8CA48FE}"/>
+                <a16:creationId xmlns:a16="http://schemas.microsoft.com/office/drawing/2014/main" xmlns="" id="{A5018CE7-28D9-4022-9A9E-B2B9B8CA48FE}"/>
               </a:ext>
             </a:extLst>
           </p:cNvPr>
@@ -22356,7 +22433,7 @@
           <p:cNvPr id="23" name="Group 22">
             <a:extLst>
               <a:ext uri="{FF2B5EF4-FFF2-40B4-BE49-F238E27FC236}">
-                <a16:creationId xmlns:a16="http://schemas.microsoft.com/office/drawing/2014/main" id="{92AFB317-F39E-4D8D-BF6D-081F2F0B5691}"/>
+                <a16:creationId xmlns:a16="http://schemas.microsoft.com/office/drawing/2014/main" xmlns="" id="{92AFB317-F39E-4D8D-BF6D-081F2F0B5691}"/>
               </a:ext>
             </a:extLst>
           </p:cNvPr>
@@ -22376,7 +22453,7 @@
             <p:cNvPr id="17" name="Oval 16">
               <a:extLst>
                 <a:ext uri="{FF2B5EF4-FFF2-40B4-BE49-F238E27FC236}">
-                  <a16:creationId xmlns:a16="http://schemas.microsoft.com/office/drawing/2014/main" id="{520F6D53-68A7-4282-831D-E164F3C4C7C3}"/>
+                  <a16:creationId xmlns:a16="http://schemas.microsoft.com/office/drawing/2014/main" xmlns="" id="{520F6D53-68A7-4282-831D-E164F3C4C7C3}"/>
                 </a:ext>
               </a:extLst>
             </p:cNvPr>
@@ -22430,7 +22507,7 @@
             <p:cNvPr id="18" name="Speech Bubble: Rectangle with Corners Rounded 17">
               <a:extLst>
                 <a:ext uri="{FF2B5EF4-FFF2-40B4-BE49-F238E27FC236}">
-                  <a16:creationId xmlns:a16="http://schemas.microsoft.com/office/drawing/2014/main" id="{80EB8B5B-B3C1-44AB-99E3-63FF1DF8C61B}"/>
+                  <a16:creationId xmlns:a16="http://schemas.microsoft.com/office/drawing/2014/main" xmlns="" id="{80EB8B5B-B3C1-44AB-99E3-63FF1DF8C61B}"/>
                 </a:ext>
               </a:extLst>
             </p:cNvPr>
@@ -22496,7 +22573,7 @@
           <p:cNvPr id="3" name="Group 2">
             <a:extLst>
               <a:ext uri="{FF2B5EF4-FFF2-40B4-BE49-F238E27FC236}">
-                <a16:creationId xmlns:a16="http://schemas.microsoft.com/office/drawing/2014/main" id="{6752D4F8-081A-4556-8E37-2F42D8215138}"/>
+                <a16:creationId xmlns:a16="http://schemas.microsoft.com/office/drawing/2014/main" xmlns="" id="{6752D4F8-081A-4556-8E37-2F42D8215138}"/>
               </a:ext>
             </a:extLst>
           </p:cNvPr>
@@ -22516,7 +22593,7 @@
             <p:cNvPr id="19" name="Speech Bubble: Rectangle with Corners Rounded 18">
               <a:extLst>
                 <a:ext uri="{FF2B5EF4-FFF2-40B4-BE49-F238E27FC236}">
-                  <a16:creationId xmlns:a16="http://schemas.microsoft.com/office/drawing/2014/main" id="{52381E81-23BB-4204-8FD5-D26B6A1F5C7A}"/>
+                  <a16:creationId xmlns:a16="http://schemas.microsoft.com/office/drawing/2014/main" xmlns="" id="{52381E81-23BB-4204-8FD5-D26B6A1F5C7A}"/>
                 </a:ext>
               </a:extLst>
             </p:cNvPr>
@@ -22581,7 +22658,7 @@
             <p:cNvPr id="20" name="Oval 19">
               <a:extLst>
                 <a:ext uri="{FF2B5EF4-FFF2-40B4-BE49-F238E27FC236}">
-                  <a16:creationId xmlns:a16="http://schemas.microsoft.com/office/drawing/2014/main" id="{73B86C22-E865-4134-B8BA-7261808CE2CE}"/>
+                  <a16:creationId xmlns:a16="http://schemas.microsoft.com/office/drawing/2014/main" xmlns="" id="{73B86C22-E865-4134-B8BA-7261808CE2CE}"/>
                 </a:ext>
               </a:extLst>
             </p:cNvPr>
@@ -22636,7 +22713,7 @@
           <p:cNvPr id="21" name="TextBox 20">
             <a:extLst>
               <a:ext uri="{FF2B5EF4-FFF2-40B4-BE49-F238E27FC236}">
-                <a16:creationId xmlns:a16="http://schemas.microsoft.com/office/drawing/2014/main" id="{586A0C4C-167D-41C8-BC77-8C4E9A9D51FD}"/>
+                <a16:creationId xmlns:a16="http://schemas.microsoft.com/office/drawing/2014/main" xmlns="" id="{586A0C4C-167D-41C8-BC77-8C4E9A9D51FD}"/>
               </a:ext>
             </a:extLst>
           </p:cNvPr>
@@ -22713,7 +22790,7 @@
           <p:cNvPr id="2" name="Rectangle 1">
             <a:extLst>
               <a:ext uri="{FF2B5EF4-FFF2-40B4-BE49-F238E27FC236}">
-                <a16:creationId xmlns:a16="http://schemas.microsoft.com/office/drawing/2014/main" id="{3101410B-4D12-422F-B98B-D38CFF7D5334}"/>
+                <a16:creationId xmlns:a16="http://schemas.microsoft.com/office/drawing/2014/main" xmlns="" id="{3101410B-4D12-422F-B98B-D38CFF7D5334}"/>
               </a:ext>
             </a:extLst>
           </p:cNvPr>
@@ -22751,7 +22828,7 @@
           <p:cNvPr id="7" name="Group 6">
             <a:extLst>
               <a:ext uri="{FF2B5EF4-FFF2-40B4-BE49-F238E27FC236}">
-                <a16:creationId xmlns:a16="http://schemas.microsoft.com/office/drawing/2014/main" id="{D020B265-BF6B-40E4-B76C-77519FD68172}"/>
+                <a16:creationId xmlns:a16="http://schemas.microsoft.com/office/drawing/2014/main" xmlns="" id="{D020B265-BF6B-40E4-B76C-77519FD68172}"/>
               </a:ext>
             </a:extLst>
           </p:cNvPr>
@@ -22771,7 +22848,7 @@
             <p:cNvPr id="4" name="Oval 3">
               <a:extLst>
                 <a:ext uri="{FF2B5EF4-FFF2-40B4-BE49-F238E27FC236}">
-                  <a16:creationId xmlns:a16="http://schemas.microsoft.com/office/drawing/2014/main" id="{4D458EBB-5B35-4391-8BF2-99C410B5C56E}"/>
+                  <a16:creationId xmlns:a16="http://schemas.microsoft.com/office/drawing/2014/main" xmlns="" id="{4D458EBB-5B35-4391-8BF2-99C410B5C56E}"/>
                 </a:ext>
               </a:extLst>
             </p:cNvPr>
@@ -22829,7 +22906,7 @@
             <p:cNvPr id="6" name="Speech Bubble: Rectangle with Corners Rounded 5">
               <a:extLst>
                 <a:ext uri="{FF2B5EF4-FFF2-40B4-BE49-F238E27FC236}">
-                  <a16:creationId xmlns:a16="http://schemas.microsoft.com/office/drawing/2014/main" id="{36130E7F-235F-42D0-A9FA-86591749D944}"/>
+                  <a16:creationId xmlns:a16="http://schemas.microsoft.com/office/drawing/2014/main" xmlns="" id="{36130E7F-235F-42D0-A9FA-86591749D944}"/>
                 </a:ext>
               </a:extLst>
             </p:cNvPr>
@@ -22890,7 +22967,7 @@
           <p:cNvPr id="10" name="Slide Number Placeholder 9">
             <a:extLst>
               <a:ext uri="{FF2B5EF4-FFF2-40B4-BE49-F238E27FC236}">
-                <a16:creationId xmlns:a16="http://schemas.microsoft.com/office/drawing/2014/main" id="{E11656A2-85FD-401F-8228-B777A563C32E}"/>
+                <a16:creationId xmlns:a16="http://schemas.microsoft.com/office/drawing/2014/main" xmlns="" id="{E11656A2-85FD-401F-8228-B777A563C32E}"/>
               </a:ext>
             </a:extLst>
           </p:cNvPr>
@@ -23532,7 +23609,7 @@
           <p:cNvPr id="16" name="Picture 15">
             <a:extLst>
               <a:ext uri="{FF2B5EF4-FFF2-40B4-BE49-F238E27FC236}">
-                <a16:creationId xmlns:a16="http://schemas.microsoft.com/office/drawing/2014/main" id="{75044DBC-9455-41CC-91D8-EA3508CC5869}"/>
+                <a16:creationId xmlns:a16="http://schemas.microsoft.com/office/drawing/2014/main" xmlns="" id="{75044DBC-9455-41CC-91D8-EA3508CC5869}"/>
               </a:ext>
             </a:extLst>
           </p:cNvPr>
@@ -23562,7 +23639,7 @@
           <p:cNvPr id="27" name="Group 26">
             <a:extLst>
               <a:ext uri="{FF2B5EF4-FFF2-40B4-BE49-F238E27FC236}">
-                <a16:creationId xmlns:a16="http://schemas.microsoft.com/office/drawing/2014/main" id="{0649C811-8FC9-44B4-8F1D-013E85A748DD}"/>
+                <a16:creationId xmlns:a16="http://schemas.microsoft.com/office/drawing/2014/main" xmlns="" id="{0649C811-8FC9-44B4-8F1D-013E85A748DD}"/>
               </a:ext>
             </a:extLst>
           </p:cNvPr>
@@ -23582,7 +23659,7 @@
             <p:cNvPr id="4" name="Picture 3">
               <a:extLst>
                 <a:ext uri="{FF2B5EF4-FFF2-40B4-BE49-F238E27FC236}">
-                  <a16:creationId xmlns:a16="http://schemas.microsoft.com/office/drawing/2014/main" id="{393BD330-B0D0-4624-977B-59F8F69B16B9}"/>
+                  <a16:creationId xmlns:a16="http://schemas.microsoft.com/office/drawing/2014/main" xmlns="" id="{393BD330-B0D0-4624-977B-59F8F69B16B9}"/>
                 </a:ext>
               </a:extLst>
             </p:cNvPr>
@@ -23612,7 +23689,7 @@
             <p:cNvPr id="10" name="Rectangle 9">
               <a:extLst>
                 <a:ext uri="{FF2B5EF4-FFF2-40B4-BE49-F238E27FC236}">
-                  <a16:creationId xmlns:a16="http://schemas.microsoft.com/office/drawing/2014/main" id="{15F41219-5081-4320-AA15-A4523E7FD80A}"/>
+                  <a16:creationId xmlns:a16="http://schemas.microsoft.com/office/drawing/2014/main" xmlns="" id="{15F41219-5081-4320-AA15-A4523E7FD80A}"/>
                 </a:ext>
               </a:extLst>
             </p:cNvPr>
@@ -23665,7 +23742,7 @@
           <p:cNvPr id="2" name="Title 1">
             <a:extLst>
               <a:ext uri="{FF2B5EF4-FFF2-40B4-BE49-F238E27FC236}">
-                <a16:creationId xmlns:a16="http://schemas.microsoft.com/office/drawing/2014/main" id="{74BDEF2B-CF04-4FC7-B45D-7BFB4D26ED44}"/>
+                <a16:creationId xmlns:a16="http://schemas.microsoft.com/office/drawing/2014/main" xmlns="" id="{74BDEF2B-CF04-4FC7-B45D-7BFB4D26ED44}"/>
               </a:ext>
             </a:extLst>
           </p:cNvPr>
@@ -23776,7 +23853,7 @@
           <p:cNvPr id="5" name="Slide Number Placeholder 4">
             <a:extLst>
               <a:ext uri="{FF2B5EF4-FFF2-40B4-BE49-F238E27FC236}">
-                <a16:creationId xmlns:a16="http://schemas.microsoft.com/office/drawing/2014/main" id="{6C7AC4C2-311E-4220-AFEE-F95E8983AB3B}"/>
+                <a16:creationId xmlns:a16="http://schemas.microsoft.com/office/drawing/2014/main" xmlns="" id="{6C7AC4C2-311E-4220-AFEE-F95E8983AB3B}"/>
               </a:ext>
             </a:extLst>
           </p:cNvPr>
@@ -23806,7 +23883,7 @@
           <p:cNvPr id="28" name="Group 27">
             <a:extLst>
               <a:ext uri="{FF2B5EF4-FFF2-40B4-BE49-F238E27FC236}">
-                <a16:creationId xmlns:a16="http://schemas.microsoft.com/office/drawing/2014/main" id="{1AA134A0-7FAC-44C7-ADD1-1AB80686D524}"/>
+                <a16:creationId xmlns:a16="http://schemas.microsoft.com/office/drawing/2014/main" xmlns="" id="{1AA134A0-7FAC-44C7-ADD1-1AB80686D524}"/>
               </a:ext>
             </a:extLst>
           </p:cNvPr>
@@ -23826,7 +23903,7 @@
             <p:cNvPr id="7" name="TextBox 6">
               <a:extLst>
                 <a:ext uri="{FF2B5EF4-FFF2-40B4-BE49-F238E27FC236}">
-                  <a16:creationId xmlns:a16="http://schemas.microsoft.com/office/drawing/2014/main" id="{A1CB4040-B930-4C77-85A7-14277601F045}"/>
+                  <a16:creationId xmlns:a16="http://schemas.microsoft.com/office/drawing/2014/main" xmlns="" id="{A1CB4040-B930-4C77-85A7-14277601F045}"/>
                 </a:ext>
               </a:extLst>
             </p:cNvPr>
@@ -23854,7 +23931,15 @@
               <a:pPr algn="ctr"/>
               <a:r>
                 <a:rPr lang="en-US" dirty="0"/>
-                <a:t>Boxplot of metric for the 10 letters with 16 principle components</a:t>
+                <a:t>Boxplot of metric for the 10 letters with 16 </a:t>
+              </a:r>
+              <a:r>
+                <a:rPr lang="en-US" dirty="0" smtClean="0"/>
+                <a:t>principal </a:t>
+              </a:r>
+              <a:r>
+                <a:rPr lang="en-US" dirty="0"/>
+                <a:t>components</a:t>
               </a:r>
             </a:p>
           </p:txBody>
@@ -23864,7 +23949,7 @@
             <p:cNvPr id="13" name="Straight Connector 12">
               <a:extLst>
                 <a:ext uri="{FF2B5EF4-FFF2-40B4-BE49-F238E27FC236}">
-                  <a16:creationId xmlns:a16="http://schemas.microsoft.com/office/drawing/2014/main" id="{FAE9083E-9AE0-4ADB-A366-68C48294E971}"/>
+                  <a16:creationId xmlns:a16="http://schemas.microsoft.com/office/drawing/2014/main" xmlns="" id="{FAE9083E-9AE0-4ADB-A366-68C48294E971}"/>
                 </a:ext>
               </a:extLst>
             </p:cNvPr>
@@ -23908,7 +23993,7 @@
             <p:cNvPr id="12" name="Straight Connector 11">
               <a:extLst>
                 <a:ext uri="{FF2B5EF4-FFF2-40B4-BE49-F238E27FC236}">
-                  <a16:creationId xmlns:a16="http://schemas.microsoft.com/office/drawing/2014/main" id="{B83E3D3C-92F3-412F-822C-30C8140EA2D5}"/>
+                  <a16:creationId xmlns:a16="http://schemas.microsoft.com/office/drawing/2014/main" xmlns="" id="{B83E3D3C-92F3-412F-822C-30C8140EA2D5}"/>
                 </a:ext>
               </a:extLst>
             </p:cNvPr>
@@ -23952,7 +24037,7 @@
             <p:cNvPr id="14" name="Straight Connector 13">
               <a:extLst>
                 <a:ext uri="{FF2B5EF4-FFF2-40B4-BE49-F238E27FC236}">
-                  <a16:creationId xmlns:a16="http://schemas.microsoft.com/office/drawing/2014/main" id="{DA139436-6896-45B8-9AE8-1945DFAEACCF}"/>
+                  <a16:creationId xmlns:a16="http://schemas.microsoft.com/office/drawing/2014/main" xmlns="" id="{DA139436-6896-45B8-9AE8-1945DFAEACCF}"/>
                 </a:ext>
               </a:extLst>
             </p:cNvPr>

</xml_diff>

<commit_message>
Fixel spelling principal in plot
</commit_message>
<xml_diff>
--- a/FinalReport_Team_Bengio.pptx
+++ b/FinalReport_Team_Bengio.pptx
@@ -128,7 +128,7 @@
   <p:extLst>
     <p:ext uri="{EFAFB233-063F-42B5-8137-9DF3F51BA10A}">
       <p15:sldGuideLst xmlns:p15="http://schemas.microsoft.com/office/powerpoint/2012/main">
-        <p15:guide id="2" pos="5280" userDrawn="1">
+        <p15:guide id="2" pos="5496" userDrawn="1">
           <p15:clr>
             <a:srgbClr val="A4A3A4"/>
           </p15:clr>
@@ -189,7 +189,7 @@
           <p:cNvPr id="2" name="Header Placeholder 1">
             <a:extLst>
               <a:ext uri="{FF2B5EF4-FFF2-40B4-BE49-F238E27FC236}">
-                <a16:creationId xmlns:a16="http://schemas.microsoft.com/office/drawing/2014/main" xmlns="" id="{27EF4775-AD35-41B2-88B0-64A2DA4D7CC3}"/>
+                <a16:creationId xmlns="" xmlns:a16="http://schemas.microsoft.com/office/drawing/2014/main" id="{27EF4775-AD35-41B2-88B0-64A2DA4D7CC3}"/>
               </a:ext>
             </a:extLst>
           </p:cNvPr>
@@ -226,7 +226,7 @@
           <p:cNvPr id="3" name="Date Placeholder 2">
             <a:extLst>
               <a:ext uri="{FF2B5EF4-FFF2-40B4-BE49-F238E27FC236}">
-                <a16:creationId xmlns:a16="http://schemas.microsoft.com/office/drawing/2014/main" xmlns="" id="{2ADE11AC-244E-4519-A3F3-843E036AE852}"/>
+                <a16:creationId xmlns="" xmlns:a16="http://schemas.microsoft.com/office/drawing/2014/main" id="{2ADE11AC-244E-4519-A3F3-843E036AE852}"/>
               </a:ext>
             </a:extLst>
           </p:cNvPr>
@@ -267,7 +267,7 @@
           <p:cNvPr id="4" name="Footer Placeholder 3">
             <a:extLst>
               <a:ext uri="{FF2B5EF4-FFF2-40B4-BE49-F238E27FC236}">
-                <a16:creationId xmlns:a16="http://schemas.microsoft.com/office/drawing/2014/main" xmlns="" id="{7C4A3E00-1FC7-430B-B8C4-C511868F37E4}"/>
+                <a16:creationId xmlns="" xmlns:a16="http://schemas.microsoft.com/office/drawing/2014/main" id="{7C4A3E00-1FC7-430B-B8C4-C511868F37E4}"/>
               </a:ext>
             </a:extLst>
           </p:cNvPr>
@@ -304,7 +304,7 @@
           <p:cNvPr id="5" name="Slide Number Placeholder 4">
             <a:extLst>
               <a:ext uri="{FF2B5EF4-FFF2-40B4-BE49-F238E27FC236}">
-                <a16:creationId xmlns:a16="http://schemas.microsoft.com/office/drawing/2014/main" xmlns="" id="{E1FEDF45-CD80-47DE-88E6-F472D3ED7152}"/>
+                <a16:creationId xmlns="" xmlns:a16="http://schemas.microsoft.com/office/drawing/2014/main" id="{E1FEDF45-CD80-47DE-88E6-F472D3ED7152}"/>
               </a:ext>
             </a:extLst>
           </p:cNvPr>
@@ -2269,7 +2269,7 @@
           <p:cNvPr id="18" name="Slide Number Placeholder 5">
             <a:extLst>
               <a:ext uri="{FF2B5EF4-FFF2-40B4-BE49-F238E27FC236}">
-                <a16:creationId xmlns:a16="http://schemas.microsoft.com/office/drawing/2014/main" xmlns="" id="{F7E597E2-118F-47DF-9A03-1F5A2C0A8857}"/>
+                <a16:creationId xmlns="" xmlns:a16="http://schemas.microsoft.com/office/drawing/2014/main" id="{F7E597E2-118F-47DF-9A03-1F5A2C0A8857}"/>
               </a:ext>
             </a:extLst>
           </p:cNvPr>
@@ -2938,7 +2938,7 @@
           <p:cNvPr id="10" name="Slide Number Placeholder 5">
             <a:extLst>
               <a:ext uri="{FF2B5EF4-FFF2-40B4-BE49-F238E27FC236}">
-                <a16:creationId xmlns:a16="http://schemas.microsoft.com/office/drawing/2014/main" xmlns="" id="{E56CF6C3-1900-43CB-8E33-D8CBE7D39EDE}"/>
+                <a16:creationId xmlns="" xmlns:a16="http://schemas.microsoft.com/office/drawing/2014/main" id="{E56CF6C3-1900-43CB-8E33-D8CBE7D39EDE}"/>
               </a:ext>
             </a:extLst>
           </p:cNvPr>
@@ -4704,7 +4704,7 @@
           <p:cNvPr id="7" name="Slide Number Placeholder 5">
             <a:extLst>
               <a:ext uri="{FF2B5EF4-FFF2-40B4-BE49-F238E27FC236}">
-                <a16:creationId xmlns:a16="http://schemas.microsoft.com/office/drawing/2014/main" xmlns="" id="{EB3DD466-D729-4677-9DC7-EEFB05BF9FDC}"/>
+                <a16:creationId xmlns="" xmlns:a16="http://schemas.microsoft.com/office/drawing/2014/main" id="{EB3DD466-D729-4677-9DC7-EEFB05BF9FDC}"/>
               </a:ext>
             </a:extLst>
           </p:cNvPr>
@@ -7284,7 +7284,7 @@
           <p:cNvPr id="2" name="Title 1">
             <a:extLst>
               <a:ext uri="{FF2B5EF4-FFF2-40B4-BE49-F238E27FC236}">
-                <a16:creationId xmlns:a16="http://schemas.microsoft.com/office/drawing/2014/main" xmlns="" id="{12C8D476-DF9A-440D-9445-5A222E615C18}"/>
+                <a16:creationId xmlns="" xmlns:a16="http://schemas.microsoft.com/office/drawing/2014/main" id="{12C8D476-DF9A-440D-9445-5A222E615C18}"/>
               </a:ext>
             </a:extLst>
           </p:cNvPr>
@@ -7337,7 +7337,7 @@
           <p:cNvPr id="3" name="Subtitle 2">
             <a:extLst>
               <a:ext uri="{FF2B5EF4-FFF2-40B4-BE49-F238E27FC236}">
-                <a16:creationId xmlns:a16="http://schemas.microsoft.com/office/drawing/2014/main" xmlns="" id="{A53D7FE4-8842-4712-A350-A365C67D161F}"/>
+                <a16:creationId xmlns="" xmlns:a16="http://schemas.microsoft.com/office/drawing/2014/main" id="{A53D7FE4-8842-4712-A350-A365C67D161F}"/>
               </a:ext>
             </a:extLst>
           </p:cNvPr>
@@ -7383,6 +7383,13 @@
   <p:clrMapOvr>
     <a:masterClrMapping/>
   </p:clrMapOvr>
+  <p:timing>
+    <p:tnLst>
+      <p:par>
+        <p:cTn id="1" dur="indefinite" restart="never" nodeType="tmRoot"/>
+      </p:par>
+    </p:tnLst>
+  </p:timing>
 </p:sld>
 </file>
 
@@ -7408,7 +7415,7 @@
           <p:cNvPr id="21" name="Picture 20">
             <a:extLst>
               <a:ext uri="{FF2B5EF4-FFF2-40B4-BE49-F238E27FC236}">
-                <a16:creationId xmlns:a16="http://schemas.microsoft.com/office/drawing/2014/main" xmlns="" id="{1F8EE730-898B-4039-BAC3-D603895B728D}"/>
+                <a16:creationId xmlns="" xmlns:a16="http://schemas.microsoft.com/office/drawing/2014/main" id="{1F8EE730-898B-4039-BAC3-D603895B728D}"/>
               </a:ext>
             </a:extLst>
           </p:cNvPr>
@@ -7438,7 +7445,7 @@
           <p:cNvPr id="5" name="Title 1">
             <a:extLst>
               <a:ext uri="{FF2B5EF4-FFF2-40B4-BE49-F238E27FC236}">
-                <a16:creationId xmlns:a16="http://schemas.microsoft.com/office/drawing/2014/main" xmlns="" id="{F11C875C-9CAA-4838-BBDD-43705F932F58}"/>
+                <a16:creationId xmlns="" xmlns:a16="http://schemas.microsoft.com/office/drawing/2014/main" id="{F11C875C-9CAA-4838-BBDD-43705F932F58}"/>
               </a:ext>
             </a:extLst>
           </p:cNvPr>
@@ -7556,7 +7563,7 @@
           <p:cNvPr id="19" name="Rectangle 18">
             <a:extLst>
               <a:ext uri="{FF2B5EF4-FFF2-40B4-BE49-F238E27FC236}">
-                <a16:creationId xmlns:a16="http://schemas.microsoft.com/office/drawing/2014/main" xmlns="" id="{BF98BCEA-D55A-4113-B873-849012A84EFC}"/>
+                <a16:creationId xmlns="" xmlns:a16="http://schemas.microsoft.com/office/drawing/2014/main" id="{BF98BCEA-D55A-4113-B873-849012A84EFC}"/>
               </a:ext>
             </a:extLst>
           </p:cNvPr>
@@ -7614,7 +7621,7 @@
           <p:cNvPr id="4" name="Slide Number Placeholder 3">
             <a:extLst>
               <a:ext uri="{FF2B5EF4-FFF2-40B4-BE49-F238E27FC236}">
-                <a16:creationId xmlns:a16="http://schemas.microsoft.com/office/drawing/2014/main" xmlns="" id="{F84FDF19-CDD8-49D9-8864-6D3392CDB04B}"/>
+                <a16:creationId xmlns="" xmlns:a16="http://schemas.microsoft.com/office/drawing/2014/main" id="{F84FDF19-CDD8-49D9-8864-6D3392CDB04B}"/>
               </a:ext>
             </a:extLst>
           </p:cNvPr>
@@ -7806,7 +7813,7 @@
           <p:cNvPr id="5" name="Title 1">
             <a:extLst>
               <a:ext uri="{FF2B5EF4-FFF2-40B4-BE49-F238E27FC236}">
-                <a16:creationId xmlns:a16="http://schemas.microsoft.com/office/drawing/2014/main" xmlns="" id="{F11C875C-9CAA-4838-BBDD-43705F932F58}"/>
+                <a16:creationId xmlns="" xmlns:a16="http://schemas.microsoft.com/office/drawing/2014/main" id="{F11C875C-9CAA-4838-BBDD-43705F932F58}"/>
               </a:ext>
             </a:extLst>
           </p:cNvPr>
@@ -7924,7 +7931,7 @@
           <p:cNvPr id="4" name="Picture 3">
             <a:extLst>
               <a:ext uri="{FF2B5EF4-FFF2-40B4-BE49-F238E27FC236}">
-                <a16:creationId xmlns:a16="http://schemas.microsoft.com/office/drawing/2014/main" xmlns="" id="{7B393A30-7610-4901-951C-32DBC3375DB3}"/>
+                <a16:creationId xmlns="" xmlns:a16="http://schemas.microsoft.com/office/drawing/2014/main" id="{7B393A30-7610-4901-951C-32DBC3375DB3}"/>
               </a:ext>
             </a:extLst>
           </p:cNvPr>
@@ -7954,7 +7961,7 @@
           <p:cNvPr id="13" name="Group 12">
             <a:extLst>
               <a:ext uri="{FF2B5EF4-FFF2-40B4-BE49-F238E27FC236}">
-                <a16:creationId xmlns:a16="http://schemas.microsoft.com/office/drawing/2014/main" xmlns="" id="{E7CC4D30-929F-40A5-A394-7A5DF51AE9F6}"/>
+                <a16:creationId xmlns="" xmlns:a16="http://schemas.microsoft.com/office/drawing/2014/main" id="{E7CC4D30-929F-40A5-A394-7A5DF51AE9F6}"/>
               </a:ext>
             </a:extLst>
           </p:cNvPr>
@@ -7974,7 +7981,7 @@
             <p:cNvPr id="10" name="Oval 9">
               <a:extLst>
                 <a:ext uri="{FF2B5EF4-FFF2-40B4-BE49-F238E27FC236}">
-                  <a16:creationId xmlns:a16="http://schemas.microsoft.com/office/drawing/2014/main" xmlns="" id="{A61665EE-7087-437A-ADDC-2A23001C1E19}"/>
+                  <a16:creationId xmlns="" xmlns:a16="http://schemas.microsoft.com/office/drawing/2014/main" id="{A61665EE-7087-437A-ADDC-2A23001C1E19}"/>
                 </a:ext>
               </a:extLst>
             </p:cNvPr>
@@ -8033,7 +8040,7 @@
             <p:cNvPr id="12" name="Speech Bubble: Rectangle with Corners Rounded 11">
               <a:extLst>
                 <a:ext uri="{FF2B5EF4-FFF2-40B4-BE49-F238E27FC236}">
-                  <a16:creationId xmlns:a16="http://schemas.microsoft.com/office/drawing/2014/main" xmlns="" id="{8E74D0FC-7C2F-49D1-BFC6-E151E676CD54}"/>
+                  <a16:creationId xmlns="" xmlns:a16="http://schemas.microsoft.com/office/drawing/2014/main" id="{8E74D0FC-7C2F-49D1-BFC6-E151E676CD54}"/>
                 </a:ext>
               </a:extLst>
             </p:cNvPr>
@@ -8094,7 +8101,7 @@
           <p:cNvPr id="21" name="Group 20">
             <a:extLst>
               <a:ext uri="{FF2B5EF4-FFF2-40B4-BE49-F238E27FC236}">
-                <a16:creationId xmlns:a16="http://schemas.microsoft.com/office/drawing/2014/main" xmlns="" id="{2016CB66-0B0E-4159-87DF-7177CC09E36B}"/>
+                <a16:creationId xmlns="" xmlns:a16="http://schemas.microsoft.com/office/drawing/2014/main" id="{2016CB66-0B0E-4159-87DF-7177CC09E36B}"/>
               </a:ext>
             </a:extLst>
           </p:cNvPr>
@@ -8114,7 +8121,7 @@
             <p:cNvPr id="15" name="Oval 14">
               <a:extLst>
                 <a:ext uri="{FF2B5EF4-FFF2-40B4-BE49-F238E27FC236}">
-                  <a16:creationId xmlns:a16="http://schemas.microsoft.com/office/drawing/2014/main" xmlns="" id="{6517D2BB-E709-4022-934B-2181AF478D1D}"/>
+                  <a16:creationId xmlns="" xmlns:a16="http://schemas.microsoft.com/office/drawing/2014/main" id="{6517D2BB-E709-4022-934B-2181AF478D1D}"/>
                 </a:ext>
               </a:extLst>
             </p:cNvPr>
@@ -8173,7 +8180,7 @@
             <p:cNvPr id="16" name="Speech Bubble: Rectangle with Corners Rounded 15">
               <a:extLst>
                 <a:ext uri="{FF2B5EF4-FFF2-40B4-BE49-F238E27FC236}">
-                  <a16:creationId xmlns:a16="http://schemas.microsoft.com/office/drawing/2014/main" xmlns="" id="{1F45A44D-462B-4E24-8C55-A55422487F8E}"/>
+                  <a16:creationId xmlns="" xmlns:a16="http://schemas.microsoft.com/office/drawing/2014/main" id="{1F45A44D-462B-4E24-8C55-A55422487F8E}"/>
                 </a:ext>
               </a:extLst>
             </p:cNvPr>
@@ -8234,7 +8241,7 @@
           <p:cNvPr id="22" name="Group 21">
             <a:extLst>
               <a:ext uri="{FF2B5EF4-FFF2-40B4-BE49-F238E27FC236}">
-                <a16:creationId xmlns:a16="http://schemas.microsoft.com/office/drawing/2014/main" xmlns="" id="{F8B6916F-E023-4EF3-BFC6-61AC5E4DABBE}"/>
+                <a16:creationId xmlns="" xmlns:a16="http://schemas.microsoft.com/office/drawing/2014/main" id="{F8B6916F-E023-4EF3-BFC6-61AC5E4DABBE}"/>
               </a:ext>
             </a:extLst>
           </p:cNvPr>
@@ -8254,7 +8261,7 @@
             <p:cNvPr id="17" name="Oval 16">
               <a:extLst>
                 <a:ext uri="{FF2B5EF4-FFF2-40B4-BE49-F238E27FC236}">
-                  <a16:creationId xmlns:a16="http://schemas.microsoft.com/office/drawing/2014/main" xmlns="" id="{63521CBF-F26F-4019-901A-ED7D225C4FC4}"/>
+                  <a16:creationId xmlns="" xmlns:a16="http://schemas.microsoft.com/office/drawing/2014/main" id="{63521CBF-F26F-4019-901A-ED7D225C4FC4}"/>
                 </a:ext>
               </a:extLst>
             </p:cNvPr>
@@ -8313,7 +8320,7 @@
             <p:cNvPr id="18" name="Speech Bubble: Rectangle with Corners Rounded 17">
               <a:extLst>
                 <a:ext uri="{FF2B5EF4-FFF2-40B4-BE49-F238E27FC236}">
-                  <a16:creationId xmlns:a16="http://schemas.microsoft.com/office/drawing/2014/main" xmlns="" id="{1ECADFA8-18A3-4F84-BB13-625E50AC8E45}"/>
+                  <a16:creationId xmlns="" xmlns:a16="http://schemas.microsoft.com/office/drawing/2014/main" id="{1ECADFA8-18A3-4F84-BB13-625E50AC8E45}"/>
                 </a:ext>
               </a:extLst>
             </p:cNvPr>
@@ -8382,7 +8389,7 @@
           <p:cNvPr id="23" name="Group 22">
             <a:extLst>
               <a:ext uri="{FF2B5EF4-FFF2-40B4-BE49-F238E27FC236}">
-                <a16:creationId xmlns:a16="http://schemas.microsoft.com/office/drawing/2014/main" xmlns="" id="{4054503E-1722-4A7A-A377-4F993D284459}"/>
+                <a16:creationId xmlns="" xmlns:a16="http://schemas.microsoft.com/office/drawing/2014/main" id="{4054503E-1722-4A7A-A377-4F993D284459}"/>
               </a:ext>
             </a:extLst>
           </p:cNvPr>
@@ -8402,7 +8409,7 @@
             <p:cNvPr id="19" name="Oval 18">
               <a:extLst>
                 <a:ext uri="{FF2B5EF4-FFF2-40B4-BE49-F238E27FC236}">
-                  <a16:creationId xmlns:a16="http://schemas.microsoft.com/office/drawing/2014/main" xmlns="" id="{2E0B18F7-FEAD-4032-A208-470DBB5AB3B5}"/>
+                  <a16:creationId xmlns="" xmlns:a16="http://schemas.microsoft.com/office/drawing/2014/main" id="{2E0B18F7-FEAD-4032-A208-470DBB5AB3B5}"/>
                 </a:ext>
               </a:extLst>
             </p:cNvPr>
@@ -8461,7 +8468,7 @@
             <p:cNvPr id="20" name="Speech Bubble: Rectangle with Corners Rounded 19">
               <a:extLst>
                 <a:ext uri="{FF2B5EF4-FFF2-40B4-BE49-F238E27FC236}">
-                  <a16:creationId xmlns:a16="http://schemas.microsoft.com/office/drawing/2014/main" xmlns="" id="{CED676FD-EBB7-4CA0-A69D-CBE1E899F856}"/>
+                  <a16:creationId xmlns="" xmlns:a16="http://schemas.microsoft.com/office/drawing/2014/main" id="{CED676FD-EBB7-4CA0-A69D-CBE1E899F856}"/>
                 </a:ext>
               </a:extLst>
             </p:cNvPr>
@@ -8538,7 +8545,7 @@
           <p:cNvPr id="6" name="Slide Number Placeholder 5">
             <a:extLst>
               <a:ext uri="{FF2B5EF4-FFF2-40B4-BE49-F238E27FC236}">
-                <a16:creationId xmlns:a16="http://schemas.microsoft.com/office/drawing/2014/main" xmlns="" id="{FF735714-8A59-42AC-9461-94886EC0B19B}"/>
+                <a16:creationId xmlns="" xmlns:a16="http://schemas.microsoft.com/office/drawing/2014/main" id="{FF735714-8A59-42AC-9461-94886EC0B19B}"/>
               </a:ext>
             </a:extLst>
           </p:cNvPr>
@@ -8886,7 +8893,7 @@
           <p:cNvPr id="4" name="Title 1">
             <a:extLst>
               <a:ext uri="{FF2B5EF4-FFF2-40B4-BE49-F238E27FC236}">
-                <a16:creationId xmlns:a16="http://schemas.microsoft.com/office/drawing/2014/main" xmlns="" id="{94B69BDE-2E3C-4D3D-ADDB-96B638AF3FF7}"/>
+                <a16:creationId xmlns="" xmlns:a16="http://schemas.microsoft.com/office/drawing/2014/main" id="{94B69BDE-2E3C-4D3D-ADDB-96B638AF3FF7}"/>
               </a:ext>
             </a:extLst>
           </p:cNvPr>
@@ -9004,7 +9011,7 @@
           <p:cNvPr id="6" name="Content Placeholder 5">
             <a:extLst>
               <a:ext uri="{FF2B5EF4-FFF2-40B4-BE49-F238E27FC236}">
-                <a16:creationId xmlns:a16="http://schemas.microsoft.com/office/drawing/2014/main" xmlns="" id="{8AC93AEF-1C0F-4B94-80B8-E9BCF056E8C3}"/>
+                <a16:creationId xmlns="" xmlns:a16="http://schemas.microsoft.com/office/drawing/2014/main" id="{8AC93AEF-1C0F-4B94-80B8-E9BCF056E8C3}"/>
               </a:ext>
             </a:extLst>
           </p:cNvPr>
@@ -9160,7 +9167,7 @@
           <p:cNvPr id="5" name="Slide Number Placeholder 4">
             <a:extLst>
               <a:ext uri="{FF2B5EF4-FFF2-40B4-BE49-F238E27FC236}">
-                <a16:creationId xmlns:a16="http://schemas.microsoft.com/office/drawing/2014/main" xmlns="" id="{DCDB03CD-D0F1-4CAC-AAF1-B8B2D0EE8164}"/>
+                <a16:creationId xmlns="" xmlns:a16="http://schemas.microsoft.com/office/drawing/2014/main" id="{DCDB03CD-D0F1-4CAC-AAF1-B8B2D0EE8164}"/>
               </a:ext>
             </a:extLst>
           </p:cNvPr>
@@ -9195,6 +9202,13 @@
   <p:clrMapOvr>
     <a:masterClrMapping/>
   </p:clrMapOvr>
+  <p:timing>
+    <p:tnLst>
+      <p:par>
+        <p:cTn id="1" dur="indefinite" restart="never" nodeType="tmRoot"/>
+      </p:par>
+    </p:tnLst>
+  </p:timing>
 </p:sld>
 </file>
 
@@ -9220,7 +9234,7 @@
           <p:cNvPr id="4" name="Title 3">
             <a:extLst>
               <a:ext uri="{FF2B5EF4-FFF2-40B4-BE49-F238E27FC236}">
-                <a16:creationId xmlns:a16="http://schemas.microsoft.com/office/drawing/2014/main" xmlns="" id="{2A23610F-3ED1-4163-9E2C-C143B76FA000}"/>
+                <a16:creationId xmlns="" xmlns:a16="http://schemas.microsoft.com/office/drawing/2014/main" id="{2A23610F-3ED1-4163-9E2C-C143B76FA000}"/>
               </a:ext>
             </a:extLst>
           </p:cNvPr>
@@ -9257,7 +9271,7 @@
           <p:cNvPr id="6" name="Slide Number Placeholder 5">
             <a:extLst>
               <a:ext uri="{FF2B5EF4-FFF2-40B4-BE49-F238E27FC236}">
-                <a16:creationId xmlns:a16="http://schemas.microsoft.com/office/drawing/2014/main" xmlns="" id="{B2C876A0-C60B-4A17-B217-A09108C31EE5}"/>
+                <a16:creationId xmlns="" xmlns:a16="http://schemas.microsoft.com/office/drawing/2014/main" id="{B2C876A0-C60B-4A17-B217-A09108C31EE5}"/>
               </a:ext>
             </a:extLst>
           </p:cNvPr>
@@ -9308,6 +9322,13 @@
   <p:clrMapOvr>
     <a:masterClrMapping/>
   </p:clrMapOvr>
+  <p:timing>
+    <p:tnLst>
+      <p:par>
+        <p:cTn id="1" dur="indefinite" restart="never" nodeType="tmRoot"/>
+      </p:par>
+    </p:tnLst>
+  </p:timing>
 </p:sld>
 </file>
 
@@ -9333,7 +9354,7 @@
           <p:cNvPr id="3" name="Title 1">
             <a:extLst>
               <a:ext uri="{FF2B5EF4-FFF2-40B4-BE49-F238E27FC236}">
-                <a16:creationId xmlns:a16="http://schemas.microsoft.com/office/drawing/2014/main" xmlns="" id="{022C0EF2-32B3-443D-804C-08EF1ADB4E25}"/>
+                <a16:creationId xmlns="" xmlns:a16="http://schemas.microsoft.com/office/drawing/2014/main" id="{022C0EF2-32B3-443D-804C-08EF1ADB4E25}"/>
               </a:ext>
             </a:extLst>
           </p:cNvPr>
@@ -9451,7 +9472,7 @@
           <p:cNvPr id="5" name="Picture 4">
             <a:extLst>
               <a:ext uri="{FF2B5EF4-FFF2-40B4-BE49-F238E27FC236}">
-                <a16:creationId xmlns:a16="http://schemas.microsoft.com/office/drawing/2014/main" xmlns="" id="{DA72E527-7FB9-4702-831C-15AB0A63E38E}"/>
+                <a16:creationId xmlns="" xmlns:a16="http://schemas.microsoft.com/office/drawing/2014/main" id="{DA72E527-7FB9-4702-831C-15AB0A63E38E}"/>
               </a:ext>
             </a:extLst>
           </p:cNvPr>
@@ -9481,7 +9502,7 @@
           <p:cNvPr id="7" name="Picture 6">
             <a:extLst>
               <a:ext uri="{FF2B5EF4-FFF2-40B4-BE49-F238E27FC236}">
-                <a16:creationId xmlns:a16="http://schemas.microsoft.com/office/drawing/2014/main" xmlns="" id="{7290D52D-29B7-42BC-8ABD-8494C1989189}"/>
+                <a16:creationId xmlns="" xmlns:a16="http://schemas.microsoft.com/office/drawing/2014/main" id="{7290D52D-29B7-42BC-8ABD-8494C1989189}"/>
               </a:ext>
             </a:extLst>
           </p:cNvPr>
@@ -9511,7 +9532,7 @@
           <p:cNvPr id="8" name="TextBox 7">
             <a:extLst>
               <a:ext uri="{FF2B5EF4-FFF2-40B4-BE49-F238E27FC236}">
-                <a16:creationId xmlns:a16="http://schemas.microsoft.com/office/drawing/2014/main" xmlns="" id="{79A5C341-84F7-4C44-9944-892AFCAB25F8}"/>
+                <a16:creationId xmlns="" xmlns:a16="http://schemas.microsoft.com/office/drawing/2014/main" id="{79A5C341-84F7-4C44-9944-892AFCAB25F8}"/>
               </a:ext>
             </a:extLst>
           </p:cNvPr>
@@ -9554,7 +9575,7 @@
           <p:cNvPr id="9" name="TextBox 8">
             <a:extLst>
               <a:ext uri="{FF2B5EF4-FFF2-40B4-BE49-F238E27FC236}">
-                <a16:creationId xmlns:a16="http://schemas.microsoft.com/office/drawing/2014/main" xmlns="" id="{CEF91413-B775-4086-85A8-CCA76A13B789}"/>
+                <a16:creationId xmlns="" xmlns:a16="http://schemas.microsoft.com/office/drawing/2014/main" id="{CEF91413-B775-4086-85A8-CCA76A13B789}"/>
               </a:ext>
             </a:extLst>
           </p:cNvPr>
@@ -9590,7 +9611,7 @@
           <p:cNvPr id="6" name="Slide Number Placeholder 5">
             <a:extLst>
               <a:ext uri="{FF2B5EF4-FFF2-40B4-BE49-F238E27FC236}">
-                <a16:creationId xmlns:a16="http://schemas.microsoft.com/office/drawing/2014/main" xmlns="" id="{A705F972-01FC-4B84-BD27-C892119BCFDE}"/>
+                <a16:creationId xmlns="" xmlns:a16="http://schemas.microsoft.com/office/drawing/2014/main" id="{A705F972-01FC-4B84-BD27-C892119BCFDE}"/>
               </a:ext>
             </a:extLst>
           </p:cNvPr>
@@ -9625,6 +9646,13 @@
   <p:clrMapOvr>
     <a:masterClrMapping/>
   </p:clrMapOvr>
+  <p:timing>
+    <p:tnLst>
+      <p:par>
+        <p:cTn id="1" dur="indefinite" restart="never" nodeType="tmRoot"/>
+      </p:par>
+    </p:tnLst>
+  </p:timing>
 </p:sld>
 </file>
 
@@ -9650,7 +9678,7 @@
           <p:cNvPr id="5" name="Title 1">
             <a:extLst>
               <a:ext uri="{FF2B5EF4-FFF2-40B4-BE49-F238E27FC236}">
-                <a16:creationId xmlns:a16="http://schemas.microsoft.com/office/drawing/2014/main" xmlns="" id="{F11C875C-9CAA-4838-BBDD-43705F932F58}"/>
+                <a16:creationId xmlns="" xmlns:a16="http://schemas.microsoft.com/office/drawing/2014/main" id="{F11C875C-9CAA-4838-BBDD-43705F932F58}"/>
               </a:ext>
             </a:extLst>
           </p:cNvPr>
@@ -9768,7 +9796,7 @@
           <p:cNvPr id="16" name="Picture 15">
             <a:extLst>
               <a:ext uri="{FF2B5EF4-FFF2-40B4-BE49-F238E27FC236}">
-                <a16:creationId xmlns:a16="http://schemas.microsoft.com/office/drawing/2014/main" xmlns="" id="{208B5D7F-598F-4998-ADF5-C24ACC061371}"/>
+                <a16:creationId xmlns="" xmlns:a16="http://schemas.microsoft.com/office/drawing/2014/main" id="{208B5D7F-598F-4998-ADF5-C24ACC061371}"/>
               </a:ext>
             </a:extLst>
           </p:cNvPr>
@@ -9798,7 +9826,7 @@
           <p:cNvPr id="3" name="Group 2">
             <a:extLst>
               <a:ext uri="{FF2B5EF4-FFF2-40B4-BE49-F238E27FC236}">
-                <a16:creationId xmlns:a16="http://schemas.microsoft.com/office/drawing/2014/main" xmlns="" id="{F52FCCD3-020A-456D-A0D4-9CFD872F8DC3}"/>
+                <a16:creationId xmlns="" xmlns:a16="http://schemas.microsoft.com/office/drawing/2014/main" id="{F52FCCD3-020A-456D-A0D4-9CFD872F8DC3}"/>
               </a:ext>
             </a:extLst>
           </p:cNvPr>
@@ -9818,7 +9846,7 @@
             <p:cNvPr id="2" name="Oval 1">
               <a:extLst>
                 <a:ext uri="{FF2B5EF4-FFF2-40B4-BE49-F238E27FC236}">
-                  <a16:creationId xmlns:a16="http://schemas.microsoft.com/office/drawing/2014/main" xmlns="" id="{9C50E7AF-0E94-412C-888A-58566B9C017F}"/>
+                  <a16:creationId xmlns="" xmlns:a16="http://schemas.microsoft.com/office/drawing/2014/main" id="{9C50E7AF-0E94-412C-888A-58566B9C017F}"/>
                 </a:ext>
               </a:extLst>
             </p:cNvPr>
@@ -9877,7 +9905,7 @@
             <p:cNvPr id="6" name="Speech Bubble: Rectangle with Corners Rounded 5">
               <a:extLst>
                 <a:ext uri="{FF2B5EF4-FFF2-40B4-BE49-F238E27FC236}">
-                  <a16:creationId xmlns:a16="http://schemas.microsoft.com/office/drawing/2014/main" xmlns="" id="{C2256BD9-C63F-432F-B3CA-2DACDEC582A5}"/>
+                  <a16:creationId xmlns="" xmlns:a16="http://schemas.microsoft.com/office/drawing/2014/main" id="{C2256BD9-C63F-432F-B3CA-2DACDEC582A5}"/>
                 </a:ext>
               </a:extLst>
             </p:cNvPr>
@@ -9949,7 +9977,7 @@
           <p:cNvPr id="8" name="Slide Number Placeholder 7">
             <a:extLst>
               <a:ext uri="{FF2B5EF4-FFF2-40B4-BE49-F238E27FC236}">
-                <a16:creationId xmlns:a16="http://schemas.microsoft.com/office/drawing/2014/main" xmlns="" id="{DF61D421-F17A-4953-A9D1-EDD58F6180A2}"/>
+                <a16:creationId xmlns="" xmlns:a16="http://schemas.microsoft.com/office/drawing/2014/main" id="{DF61D421-F17A-4953-A9D1-EDD58F6180A2}"/>
               </a:ext>
             </a:extLst>
           </p:cNvPr>
@@ -10138,7 +10166,7 @@
           <p:cNvPr id="5" name="Title 1">
             <a:extLst>
               <a:ext uri="{FF2B5EF4-FFF2-40B4-BE49-F238E27FC236}">
-                <a16:creationId xmlns:a16="http://schemas.microsoft.com/office/drawing/2014/main" xmlns="" id="{F11C875C-9CAA-4838-BBDD-43705F932F58}"/>
+                <a16:creationId xmlns="" xmlns:a16="http://schemas.microsoft.com/office/drawing/2014/main" id="{F11C875C-9CAA-4838-BBDD-43705F932F58}"/>
               </a:ext>
             </a:extLst>
           </p:cNvPr>
@@ -10256,7 +10284,7 @@
           <p:cNvPr id="9" name="Picture 8">
             <a:extLst>
               <a:ext uri="{FF2B5EF4-FFF2-40B4-BE49-F238E27FC236}">
-                <a16:creationId xmlns:a16="http://schemas.microsoft.com/office/drawing/2014/main" xmlns="" id="{E51B9CE8-A297-4A7D-ACA1-4C68ADEE4141}"/>
+                <a16:creationId xmlns="" xmlns:a16="http://schemas.microsoft.com/office/drawing/2014/main" id="{E51B9CE8-A297-4A7D-ACA1-4C68ADEE4141}"/>
               </a:ext>
             </a:extLst>
           </p:cNvPr>
@@ -10286,7 +10314,7 @@
           <p:cNvPr id="11" name="Picture 10">
             <a:extLst>
               <a:ext uri="{FF2B5EF4-FFF2-40B4-BE49-F238E27FC236}">
-                <a16:creationId xmlns:a16="http://schemas.microsoft.com/office/drawing/2014/main" xmlns="" id="{DFE758EF-F0C4-4FCF-9A39-B643F8D56430}"/>
+                <a16:creationId xmlns="" xmlns:a16="http://schemas.microsoft.com/office/drawing/2014/main" id="{DFE758EF-F0C4-4FCF-9A39-B643F8D56430}"/>
               </a:ext>
             </a:extLst>
           </p:cNvPr>
@@ -10316,7 +10344,7 @@
           <p:cNvPr id="12" name="Picture 11">
             <a:extLst>
               <a:ext uri="{FF2B5EF4-FFF2-40B4-BE49-F238E27FC236}">
-                <a16:creationId xmlns:a16="http://schemas.microsoft.com/office/drawing/2014/main" xmlns="" id="{34B71FC2-8BF2-4EB9-83F5-C1A563E448E9}"/>
+                <a16:creationId xmlns="" xmlns:a16="http://schemas.microsoft.com/office/drawing/2014/main" id="{34B71FC2-8BF2-4EB9-83F5-C1A563E448E9}"/>
               </a:ext>
             </a:extLst>
           </p:cNvPr>
@@ -10346,7 +10374,7 @@
           <p:cNvPr id="14" name="Straight Arrow Connector 13">
             <a:extLst>
               <a:ext uri="{FF2B5EF4-FFF2-40B4-BE49-F238E27FC236}">
-                <a16:creationId xmlns:a16="http://schemas.microsoft.com/office/drawing/2014/main" xmlns="" id="{CFD8C50A-38CC-44D7-8E6F-B0B0549AE5F6}"/>
+                <a16:creationId xmlns="" xmlns:a16="http://schemas.microsoft.com/office/drawing/2014/main" id="{CFD8C50A-38CC-44D7-8E6F-B0B0549AE5F6}"/>
               </a:ext>
             </a:extLst>
           </p:cNvPr>
@@ -10388,7 +10416,7 @@
           <p:cNvPr id="15" name="Straight Arrow Connector 14">
             <a:extLst>
               <a:ext uri="{FF2B5EF4-FFF2-40B4-BE49-F238E27FC236}">
-                <a16:creationId xmlns:a16="http://schemas.microsoft.com/office/drawing/2014/main" xmlns="" id="{1CBB9985-9373-4EAF-B868-461F569BF544}"/>
+                <a16:creationId xmlns="" xmlns:a16="http://schemas.microsoft.com/office/drawing/2014/main" id="{1CBB9985-9373-4EAF-B868-461F569BF544}"/>
               </a:ext>
             </a:extLst>
           </p:cNvPr>
@@ -10432,7 +10460,7 @@
           <p:cNvPr id="19" name="TextBox 18">
             <a:extLst>
               <a:ext uri="{FF2B5EF4-FFF2-40B4-BE49-F238E27FC236}">
-                <a16:creationId xmlns:a16="http://schemas.microsoft.com/office/drawing/2014/main" xmlns="" id="{B5A0735C-F1BD-4670-A50D-304C14AF5A46}"/>
+                <a16:creationId xmlns="" xmlns:a16="http://schemas.microsoft.com/office/drawing/2014/main" id="{B5A0735C-F1BD-4670-A50D-304C14AF5A46}"/>
               </a:ext>
             </a:extLst>
           </p:cNvPr>
@@ -10481,7 +10509,7 @@
           <p:cNvPr id="20" name="TextBox 19">
             <a:extLst>
               <a:ext uri="{FF2B5EF4-FFF2-40B4-BE49-F238E27FC236}">
-                <a16:creationId xmlns:a16="http://schemas.microsoft.com/office/drawing/2014/main" xmlns="" id="{5706364F-4934-4403-A28D-85C0C8BFF3B3}"/>
+                <a16:creationId xmlns="" xmlns:a16="http://schemas.microsoft.com/office/drawing/2014/main" id="{5706364F-4934-4403-A28D-85C0C8BFF3B3}"/>
               </a:ext>
             </a:extLst>
           </p:cNvPr>
@@ -10520,7 +10548,7 @@
           <p:cNvPr id="21" name="TextBox 20">
             <a:extLst>
               <a:ext uri="{FF2B5EF4-FFF2-40B4-BE49-F238E27FC236}">
-                <a16:creationId xmlns:a16="http://schemas.microsoft.com/office/drawing/2014/main" xmlns="" id="{441831B6-543C-4A52-8709-D1E6B1F79DF3}"/>
+                <a16:creationId xmlns="" xmlns:a16="http://schemas.microsoft.com/office/drawing/2014/main" id="{441831B6-543C-4A52-8709-D1E6B1F79DF3}"/>
               </a:ext>
             </a:extLst>
           </p:cNvPr>
@@ -10583,7 +10611,7 @@
           <p:cNvPr id="4" name="Slide Number Placeholder 3">
             <a:extLst>
               <a:ext uri="{FF2B5EF4-FFF2-40B4-BE49-F238E27FC236}">
-                <a16:creationId xmlns:a16="http://schemas.microsoft.com/office/drawing/2014/main" xmlns="" id="{A25E451D-EFF0-4C7E-9194-591559E11F4F}"/>
+                <a16:creationId xmlns="" xmlns:a16="http://schemas.microsoft.com/office/drawing/2014/main" id="{A25E451D-EFF0-4C7E-9194-591559E11F4F}"/>
               </a:ext>
             </a:extLst>
           </p:cNvPr>
@@ -10618,6 +10646,13 @@
   <p:clrMapOvr>
     <a:masterClrMapping/>
   </p:clrMapOvr>
+  <p:timing>
+    <p:tnLst>
+      <p:par>
+        <p:cTn id="1" dur="indefinite" restart="never" nodeType="tmRoot"/>
+      </p:par>
+    </p:tnLst>
+  </p:timing>
 </p:sld>
 </file>
 
@@ -10643,7 +10678,7 @@
           <p:cNvPr id="5" name="Title 1">
             <a:extLst>
               <a:ext uri="{FF2B5EF4-FFF2-40B4-BE49-F238E27FC236}">
-                <a16:creationId xmlns:a16="http://schemas.microsoft.com/office/drawing/2014/main" xmlns="" id="{79722C87-A69B-4E73-87EC-6C6F8D15C4B0}"/>
+                <a16:creationId xmlns="" xmlns:a16="http://schemas.microsoft.com/office/drawing/2014/main" id="{79722C87-A69B-4E73-87EC-6C6F8D15C4B0}"/>
               </a:ext>
             </a:extLst>
           </p:cNvPr>
@@ -10680,7 +10715,7 @@
           <p:cNvPr id="8" name="Rectangle 7">
             <a:extLst>
               <a:ext uri="{FF2B5EF4-FFF2-40B4-BE49-F238E27FC236}">
-                <a16:creationId xmlns:a16="http://schemas.microsoft.com/office/drawing/2014/main" xmlns="" id="{43FAC0D6-D534-4F9A-9430-BDBBBED886EC}"/>
+                <a16:creationId xmlns="" xmlns:a16="http://schemas.microsoft.com/office/drawing/2014/main" id="{43FAC0D6-D534-4F9A-9430-BDBBBED886EC}"/>
               </a:ext>
             </a:extLst>
           </p:cNvPr>
@@ -10866,7 +10901,7 @@
           <p:cNvPr id="9" name="Rectangle 8">
             <a:extLst>
               <a:ext uri="{FF2B5EF4-FFF2-40B4-BE49-F238E27FC236}">
-                <a16:creationId xmlns:a16="http://schemas.microsoft.com/office/drawing/2014/main" xmlns="" id="{6D5A3AD8-1DA9-46C5-9172-18CC97FBB918}"/>
+                <a16:creationId xmlns="" xmlns:a16="http://schemas.microsoft.com/office/drawing/2014/main" id="{6D5A3AD8-1DA9-46C5-9172-18CC97FBB918}"/>
               </a:ext>
             </a:extLst>
           </p:cNvPr>
@@ -10948,7 +10983,7 @@
           <p:cNvPr id="10" name="Straight Arrow Connector 9">
             <a:extLst>
               <a:ext uri="{FF2B5EF4-FFF2-40B4-BE49-F238E27FC236}">
-                <a16:creationId xmlns:a16="http://schemas.microsoft.com/office/drawing/2014/main" xmlns="" id="{5C884956-0ABD-4C1F-B169-191EE90A9240}"/>
+                <a16:creationId xmlns="" xmlns:a16="http://schemas.microsoft.com/office/drawing/2014/main" id="{5C884956-0ABD-4C1F-B169-191EE90A9240}"/>
               </a:ext>
             </a:extLst>
           </p:cNvPr>
@@ -10995,7 +11030,7 @@
           <p:cNvPr id="11" name="Straight Arrow Connector 10">
             <a:extLst>
               <a:ext uri="{FF2B5EF4-FFF2-40B4-BE49-F238E27FC236}">
-                <a16:creationId xmlns:a16="http://schemas.microsoft.com/office/drawing/2014/main" xmlns="" id="{DCC33062-763C-4582-BA22-2F1D77AC32A0}"/>
+                <a16:creationId xmlns="" xmlns:a16="http://schemas.microsoft.com/office/drawing/2014/main" id="{DCC33062-763C-4582-BA22-2F1D77AC32A0}"/>
               </a:ext>
             </a:extLst>
           </p:cNvPr>
@@ -11043,7 +11078,7 @@
           <p:cNvPr id="12" name="Straight Arrow Connector 11">
             <a:extLst>
               <a:ext uri="{FF2B5EF4-FFF2-40B4-BE49-F238E27FC236}">
-                <a16:creationId xmlns:a16="http://schemas.microsoft.com/office/drawing/2014/main" xmlns="" id="{8609C124-D374-417A-9F43-2BC50B6C7C4C}"/>
+                <a16:creationId xmlns="" xmlns:a16="http://schemas.microsoft.com/office/drawing/2014/main" id="{8609C124-D374-417A-9F43-2BC50B6C7C4C}"/>
               </a:ext>
             </a:extLst>
           </p:cNvPr>
@@ -11090,7 +11125,7 @@
           <p:cNvPr id="14" name="Group 13">
             <a:extLst>
               <a:ext uri="{FF2B5EF4-FFF2-40B4-BE49-F238E27FC236}">
-                <a16:creationId xmlns:a16="http://schemas.microsoft.com/office/drawing/2014/main" xmlns="" id="{0635F6D7-A741-42C8-8CE5-A40A07460466}"/>
+                <a16:creationId xmlns="" xmlns:a16="http://schemas.microsoft.com/office/drawing/2014/main" id="{0635F6D7-A741-42C8-8CE5-A40A07460466}"/>
               </a:ext>
             </a:extLst>
           </p:cNvPr>
@@ -11110,7 +11145,7 @@
             <p:cNvPr id="15" name="Straight Arrow Connector 14">
               <a:extLst>
                 <a:ext uri="{FF2B5EF4-FFF2-40B4-BE49-F238E27FC236}">
-                  <a16:creationId xmlns:a16="http://schemas.microsoft.com/office/drawing/2014/main" xmlns="" id="{34B6FDFE-218E-4571-B69B-DD6A2005557C}"/>
+                  <a16:creationId xmlns="" xmlns:a16="http://schemas.microsoft.com/office/drawing/2014/main" id="{34B6FDFE-218E-4571-B69B-DD6A2005557C}"/>
                 </a:ext>
               </a:extLst>
             </p:cNvPr>
@@ -11155,7 +11190,7 @@
             <p:cNvPr id="16" name="TextBox 15">
               <a:extLst>
                 <a:ext uri="{FF2B5EF4-FFF2-40B4-BE49-F238E27FC236}">
-                  <a16:creationId xmlns:a16="http://schemas.microsoft.com/office/drawing/2014/main" xmlns="" id="{471F24B6-E904-403C-B1D3-98587279F277}"/>
+                  <a16:creationId xmlns="" xmlns:a16="http://schemas.microsoft.com/office/drawing/2014/main" id="{471F24B6-E904-403C-B1D3-98587279F277}"/>
                 </a:ext>
               </a:extLst>
             </p:cNvPr>
@@ -11221,7 +11256,7 @@
           <p:cNvPr id="17" name="TextBox 16">
             <a:extLst>
               <a:ext uri="{FF2B5EF4-FFF2-40B4-BE49-F238E27FC236}">
-                <a16:creationId xmlns:a16="http://schemas.microsoft.com/office/drawing/2014/main" xmlns="" id="{1142723A-FBA4-4B81-AE36-384A60A6D59D}"/>
+                <a16:creationId xmlns="" xmlns:a16="http://schemas.microsoft.com/office/drawing/2014/main" id="{1142723A-FBA4-4B81-AE36-384A60A6D59D}"/>
               </a:ext>
             </a:extLst>
           </p:cNvPr>
@@ -11305,7 +11340,7 @@
           <p:cNvPr id="18" name="Thought Bubble: Cloud 17">
             <a:extLst>
               <a:ext uri="{FF2B5EF4-FFF2-40B4-BE49-F238E27FC236}">
-                <a16:creationId xmlns:a16="http://schemas.microsoft.com/office/drawing/2014/main" xmlns="" id="{7220210C-4032-40E2-8C8F-4089B3148427}"/>
+                <a16:creationId xmlns="" xmlns:a16="http://schemas.microsoft.com/office/drawing/2014/main" id="{7220210C-4032-40E2-8C8F-4089B3148427}"/>
               </a:ext>
             </a:extLst>
           </p:cNvPr>
@@ -11364,7 +11399,7 @@
           <p:cNvPr id="19" name="Thought Bubble: Cloud 18">
             <a:extLst>
               <a:ext uri="{FF2B5EF4-FFF2-40B4-BE49-F238E27FC236}">
-                <a16:creationId xmlns:a16="http://schemas.microsoft.com/office/drawing/2014/main" xmlns="" id="{DAA3F5E9-9516-4B52-977E-B8915D516190}"/>
+                <a16:creationId xmlns="" xmlns:a16="http://schemas.microsoft.com/office/drawing/2014/main" id="{DAA3F5E9-9516-4B52-977E-B8915D516190}"/>
               </a:ext>
             </a:extLst>
           </p:cNvPr>
@@ -11423,7 +11458,7 @@
           <p:cNvPr id="20" name="Thought Bubble: Cloud 19">
             <a:extLst>
               <a:ext uri="{FF2B5EF4-FFF2-40B4-BE49-F238E27FC236}">
-                <a16:creationId xmlns:a16="http://schemas.microsoft.com/office/drawing/2014/main" xmlns="" id="{FCD1DD38-C3BC-4093-8D7B-56FEC0D4BE50}"/>
+                <a16:creationId xmlns="" xmlns:a16="http://schemas.microsoft.com/office/drawing/2014/main" id="{FCD1DD38-C3BC-4093-8D7B-56FEC0D4BE50}"/>
               </a:ext>
             </a:extLst>
           </p:cNvPr>
@@ -11482,7 +11517,7 @@
           <p:cNvPr id="21" name="Picture 20">
             <a:extLst>
               <a:ext uri="{FF2B5EF4-FFF2-40B4-BE49-F238E27FC236}">
-                <a16:creationId xmlns:a16="http://schemas.microsoft.com/office/drawing/2014/main" xmlns="" id="{2019D004-464C-4CD7-BE55-6A86597A7CB4}"/>
+                <a16:creationId xmlns="" xmlns:a16="http://schemas.microsoft.com/office/drawing/2014/main" id="{2019D004-464C-4CD7-BE55-6A86597A7CB4}"/>
               </a:ext>
             </a:extLst>
           </p:cNvPr>
@@ -11512,7 +11547,7 @@
           <p:cNvPr id="4" name="Slide Number Placeholder 3">
             <a:extLst>
               <a:ext uri="{FF2B5EF4-FFF2-40B4-BE49-F238E27FC236}">
-                <a16:creationId xmlns:a16="http://schemas.microsoft.com/office/drawing/2014/main" xmlns="" id="{8C0E9D76-D46F-47B4-A6C4-A6431BE6D82D}"/>
+                <a16:creationId xmlns="" xmlns:a16="http://schemas.microsoft.com/office/drawing/2014/main" id="{8C0E9D76-D46F-47B4-A6C4-A6431BE6D82D}"/>
               </a:ext>
             </a:extLst>
           </p:cNvPr>
@@ -12116,7 +12151,7 @@
           <p:cNvPr id="11" name="Rectangle 10">
             <a:extLst>
               <a:ext uri="{FF2B5EF4-FFF2-40B4-BE49-F238E27FC236}">
-                <a16:creationId xmlns:a16="http://schemas.microsoft.com/office/drawing/2014/main" xmlns="" id="{30C037EB-A097-4A95-A80A-5179B2C25D74}"/>
+                <a16:creationId xmlns="" xmlns:a16="http://schemas.microsoft.com/office/drawing/2014/main" id="{30C037EB-A097-4A95-A80A-5179B2C25D74}"/>
               </a:ext>
             </a:extLst>
           </p:cNvPr>
@@ -12199,7 +12234,7 @@
           <p:cNvPr id="16" name="TextBox 15">
             <a:extLst>
               <a:ext uri="{FF2B5EF4-FFF2-40B4-BE49-F238E27FC236}">
-                <a16:creationId xmlns:a16="http://schemas.microsoft.com/office/drawing/2014/main" xmlns="" id="{CF020DC6-F39F-424A-B0F5-95A58E404C95}"/>
+                <a16:creationId xmlns="" xmlns:a16="http://schemas.microsoft.com/office/drawing/2014/main" id="{CF020DC6-F39F-424A-B0F5-95A58E404C95}"/>
               </a:ext>
             </a:extLst>
           </p:cNvPr>
@@ -12264,7 +12299,7 @@
           <p:cNvPr id="17" name="Rectangle 16">
             <a:extLst>
               <a:ext uri="{FF2B5EF4-FFF2-40B4-BE49-F238E27FC236}">
-                <a16:creationId xmlns:a16="http://schemas.microsoft.com/office/drawing/2014/main" xmlns="" id="{B0CA323F-35CC-40FB-9A50-4349AB36032A}"/>
+                <a16:creationId xmlns="" xmlns:a16="http://schemas.microsoft.com/office/drawing/2014/main" id="{B0CA323F-35CC-40FB-9A50-4349AB36032A}"/>
               </a:ext>
             </a:extLst>
           </p:cNvPr>
@@ -12398,7 +12433,7 @@
           <p:cNvPr id="22" name="Straight Arrow Connector 21">
             <a:extLst>
               <a:ext uri="{FF2B5EF4-FFF2-40B4-BE49-F238E27FC236}">
-                <a16:creationId xmlns:a16="http://schemas.microsoft.com/office/drawing/2014/main" xmlns="" id="{E5AB3887-2964-41E1-BADC-78E22026A8D6}"/>
+                <a16:creationId xmlns="" xmlns:a16="http://schemas.microsoft.com/office/drawing/2014/main" id="{E5AB3887-2964-41E1-BADC-78E22026A8D6}"/>
               </a:ext>
             </a:extLst>
           </p:cNvPr>
@@ -12445,7 +12480,7 @@
           <p:cNvPr id="10" name="Group 9">
             <a:extLst>
               <a:ext uri="{FF2B5EF4-FFF2-40B4-BE49-F238E27FC236}">
-                <a16:creationId xmlns:a16="http://schemas.microsoft.com/office/drawing/2014/main" xmlns="" id="{798BE1D3-E32D-4231-A09D-A4E59BD9D54B}"/>
+                <a16:creationId xmlns="" xmlns:a16="http://schemas.microsoft.com/office/drawing/2014/main" id="{798BE1D3-E32D-4231-A09D-A4E59BD9D54B}"/>
               </a:ext>
             </a:extLst>
           </p:cNvPr>
@@ -12465,7 +12500,7 @@
             <p:cNvPr id="24" name="Straight Arrow Connector 23">
               <a:extLst>
                 <a:ext uri="{FF2B5EF4-FFF2-40B4-BE49-F238E27FC236}">
-                  <a16:creationId xmlns:a16="http://schemas.microsoft.com/office/drawing/2014/main" xmlns="" id="{AFD81C80-C338-4F84-A54D-FD8E931EF2D1}"/>
+                  <a16:creationId xmlns="" xmlns:a16="http://schemas.microsoft.com/office/drawing/2014/main" id="{AFD81C80-C338-4F84-A54D-FD8E931EF2D1}"/>
                 </a:ext>
               </a:extLst>
             </p:cNvPr>
@@ -12510,7 +12545,7 @@
             <p:cNvPr id="25" name="TextBox 24">
               <a:extLst>
                 <a:ext uri="{FF2B5EF4-FFF2-40B4-BE49-F238E27FC236}">
-                  <a16:creationId xmlns:a16="http://schemas.microsoft.com/office/drawing/2014/main" xmlns="" id="{C05F794F-BC43-4EF2-A4B8-6FE8D9702A8E}"/>
+                  <a16:creationId xmlns="" xmlns:a16="http://schemas.microsoft.com/office/drawing/2014/main" id="{C05F794F-BC43-4EF2-A4B8-6FE8D9702A8E}"/>
                 </a:ext>
               </a:extLst>
             </p:cNvPr>
@@ -12576,7 +12611,7 @@
           <p:cNvPr id="41" name="Straight Arrow Connector 40">
             <a:extLst>
               <a:ext uri="{FF2B5EF4-FFF2-40B4-BE49-F238E27FC236}">
-                <a16:creationId xmlns:a16="http://schemas.microsoft.com/office/drawing/2014/main" xmlns="" id="{2763003B-C8D4-4A25-9508-51A19B7A806D}"/>
+                <a16:creationId xmlns="" xmlns:a16="http://schemas.microsoft.com/office/drawing/2014/main" id="{2763003B-C8D4-4A25-9508-51A19B7A806D}"/>
               </a:ext>
             </a:extLst>
           </p:cNvPr>
@@ -12623,7 +12658,7 @@
           <p:cNvPr id="42" name="TextBox 41">
             <a:extLst>
               <a:ext uri="{FF2B5EF4-FFF2-40B4-BE49-F238E27FC236}">
-                <a16:creationId xmlns:a16="http://schemas.microsoft.com/office/drawing/2014/main" xmlns="" id="{A78B5645-1941-44FB-B01F-A7508D997D60}"/>
+                <a16:creationId xmlns="" xmlns:a16="http://schemas.microsoft.com/office/drawing/2014/main" id="{A78B5645-1941-44FB-B01F-A7508D997D60}"/>
               </a:ext>
             </a:extLst>
           </p:cNvPr>
@@ -12724,7 +12759,7 @@
           <p:cNvPr id="4" name="Group 3">
             <a:extLst>
               <a:ext uri="{FF2B5EF4-FFF2-40B4-BE49-F238E27FC236}">
-                <a16:creationId xmlns:a16="http://schemas.microsoft.com/office/drawing/2014/main" xmlns="" id="{EE44A6D8-2083-45B0-8477-F8B65439B817}"/>
+                <a16:creationId xmlns="" xmlns:a16="http://schemas.microsoft.com/office/drawing/2014/main" id="{EE44A6D8-2083-45B0-8477-F8B65439B817}"/>
               </a:ext>
             </a:extLst>
           </p:cNvPr>
@@ -12744,7 +12779,7 @@
             <p:cNvPr id="15" name="Straight Arrow Connector 14">
               <a:extLst>
                 <a:ext uri="{FF2B5EF4-FFF2-40B4-BE49-F238E27FC236}">
-                  <a16:creationId xmlns:a16="http://schemas.microsoft.com/office/drawing/2014/main" xmlns="" id="{C4FB8097-6879-4C4B-A52B-1027BBB0E4CA}"/>
+                  <a16:creationId xmlns="" xmlns:a16="http://schemas.microsoft.com/office/drawing/2014/main" id="{C4FB8097-6879-4C4B-A52B-1027BBB0E4CA}"/>
                 </a:ext>
               </a:extLst>
             </p:cNvPr>
@@ -12793,7 +12828,7 @@
                 <p:cNvPr id="43" name="TextBox 42">
                   <a:extLst>
                     <a:ext uri="{FF2B5EF4-FFF2-40B4-BE49-F238E27FC236}">
-                      <a16:creationId xmlns:a16="http://schemas.microsoft.com/office/drawing/2014/main" xmlns="" id="{597C41D0-63D0-4C54-9EC7-FD1505B86CB9}"/>
+                      <a16:creationId xmlns="" xmlns:a16="http://schemas.microsoft.com/office/drawing/2014/main" id="{597C41D0-63D0-4C54-9EC7-FD1505B86CB9}"/>
                     </a:ext>
                   </a:extLst>
                 </p:cNvPr>
@@ -13002,7 +13037,7 @@
           <p:cNvPr id="50" name="TextBox 49">
             <a:extLst>
               <a:ext uri="{FF2B5EF4-FFF2-40B4-BE49-F238E27FC236}">
-                <a16:creationId xmlns:a16="http://schemas.microsoft.com/office/drawing/2014/main" xmlns="" id="{9CA50C34-6502-4513-B1E5-17DB8E7693CD}"/>
+                <a16:creationId xmlns="" xmlns:a16="http://schemas.microsoft.com/office/drawing/2014/main" id="{9CA50C34-6502-4513-B1E5-17DB8E7693CD}"/>
               </a:ext>
             </a:extLst>
           </p:cNvPr>
@@ -13067,7 +13102,7 @@
           <p:cNvPr id="21" name="Group 20">
             <a:extLst>
               <a:ext uri="{FF2B5EF4-FFF2-40B4-BE49-F238E27FC236}">
-                <a16:creationId xmlns:a16="http://schemas.microsoft.com/office/drawing/2014/main" xmlns="" id="{00DB0BCD-709D-480B-B0FE-382B8E7C661B}"/>
+                <a16:creationId xmlns="" xmlns:a16="http://schemas.microsoft.com/office/drawing/2014/main" id="{00DB0BCD-709D-480B-B0FE-382B8E7C661B}"/>
               </a:ext>
             </a:extLst>
           </p:cNvPr>
@@ -13087,7 +13122,7 @@
             <p:cNvPr id="23" name="Straight Arrow Connector 22">
               <a:extLst>
                 <a:ext uri="{FF2B5EF4-FFF2-40B4-BE49-F238E27FC236}">
-                  <a16:creationId xmlns:a16="http://schemas.microsoft.com/office/drawing/2014/main" xmlns="" id="{E281DB7B-E8F3-4CA3-97BF-913C840B15D9}"/>
+                  <a16:creationId xmlns="" xmlns:a16="http://schemas.microsoft.com/office/drawing/2014/main" id="{E281DB7B-E8F3-4CA3-97BF-913C840B15D9}"/>
                 </a:ext>
               </a:extLst>
             </p:cNvPr>
@@ -13136,7 +13171,7 @@
                 <p:cNvPr id="27" name="TextBox 26">
                   <a:extLst>
                     <a:ext uri="{FF2B5EF4-FFF2-40B4-BE49-F238E27FC236}">
-                      <a16:creationId xmlns:a16="http://schemas.microsoft.com/office/drawing/2014/main" xmlns="" id="{FC17AA30-640B-44E7-B451-DB310F832CE9}"/>
+                      <a16:creationId xmlns="" xmlns:a16="http://schemas.microsoft.com/office/drawing/2014/main" id="{FC17AA30-640B-44E7-B451-DB310F832CE9}"/>
                     </a:ext>
                   </a:extLst>
                 </p:cNvPr>
@@ -13262,7 +13297,7 @@
           <p:cNvPr id="29" name="Straight Arrow Connector 28">
             <a:extLst>
               <a:ext uri="{FF2B5EF4-FFF2-40B4-BE49-F238E27FC236}">
-                <a16:creationId xmlns:a16="http://schemas.microsoft.com/office/drawing/2014/main" xmlns="" id="{4DE7095F-495E-4A0B-8F26-26F15D9FA628}"/>
+                <a16:creationId xmlns="" xmlns:a16="http://schemas.microsoft.com/office/drawing/2014/main" id="{4DE7095F-495E-4A0B-8F26-26F15D9FA628}"/>
               </a:ext>
             </a:extLst>
           </p:cNvPr>
@@ -13309,7 +13344,7 @@
           <p:cNvPr id="3" name="Group 2">
             <a:extLst>
               <a:ext uri="{FF2B5EF4-FFF2-40B4-BE49-F238E27FC236}">
-                <a16:creationId xmlns:a16="http://schemas.microsoft.com/office/drawing/2014/main" xmlns="" id="{29556DD3-8312-4BFA-AFE4-DFB2DC245782}"/>
+                <a16:creationId xmlns="" xmlns:a16="http://schemas.microsoft.com/office/drawing/2014/main" id="{29556DD3-8312-4BFA-AFE4-DFB2DC245782}"/>
               </a:ext>
             </a:extLst>
           </p:cNvPr>
@@ -13329,7 +13364,7 @@
             <p:cNvPr id="28" name="Straight Arrow Connector 27">
               <a:extLst>
                 <a:ext uri="{FF2B5EF4-FFF2-40B4-BE49-F238E27FC236}">
-                  <a16:creationId xmlns:a16="http://schemas.microsoft.com/office/drawing/2014/main" xmlns="" id="{2E3A63AB-DF64-4A41-BE55-3FAF84EF8B38}"/>
+                  <a16:creationId xmlns="" xmlns:a16="http://schemas.microsoft.com/office/drawing/2014/main" id="{2E3A63AB-DF64-4A41-BE55-3FAF84EF8B38}"/>
                 </a:ext>
               </a:extLst>
             </p:cNvPr>
@@ -13378,7 +13413,7 @@
                 <p:cNvPr id="30" name="TextBox 29">
                   <a:extLst>
                     <a:ext uri="{FF2B5EF4-FFF2-40B4-BE49-F238E27FC236}">
-                      <a16:creationId xmlns:a16="http://schemas.microsoft.com/office/drawing/2014/main" xmlns="" id="{1514DF8D-03A9-4ECD-9F0B-CDE76DE928BE}"/>
+                      <a16:creationId xmlns="" xmlns:a16="http://schemas.microsoft.com/office/drawing/2014/main" id="{1514DF8D-03A9-4ECD-9F0B-CDE76DE928BE}"/>
                     </a:ext>
                   </a:extLst>
                 </p:cNvPr>
@@ -13499,7 +13534,7 @@
           <p:cNvPr id="20" name="Group 19">
             <a:extLst>
               <a:ext uri="{FF2B5EF4-FFF2-40B4-BE49-F238E27FC236}">
-                <a16:creationId xmlns:a16="http://schemas.microsoft.com/office/drawing/2014/main" xmlns="" id="{B36E2083-FBA1-48DB-A513-BBAA0378893F}"/>
+                <a16:creationId xmlns="" xmlns:a16="http://schemas.microsoft.com/office/drawing/2014/main" id="{B36E2083-FBA1-48DB-A513-BBAA0378893F}"/>
               </a:ext>
             </a:extLst>
           </p:cNvPr>
@@ -13519,7 +13554,7 @@
             <p:cNvPr id="31" name="Straight Arrow Connector 30">
               <a:extLst>
                 <a:ext uri="{FF2B5EF4-FFF2-40B4-BE49-F238E27FC236}">
-                  <a16:creationId xmlns:a16="http://schemas.microsoft.com/office/drawing/2014/main" xmlns="" id="{C0B3468B-BE22-4163-994B-03ADD06384B6}"/>
+                  <a16:creationId xmlns="" xmlns:a16="http://schemas.microsoft.com/office/drawing/2014/main" id="{C0B3468B-BE22-4163-994B-03ADD06384B6}"/>
                 </a:ext>
               </a:extLst>
             </p:cNvPr>
@@ -13568,7 +13603,7 @@
                 <p:cNvPr id="32" name="TextBox 31">
                   <a:extLst>
                     <a:ext uri="{FF2B5EF4-FFF2-40B4-BE49-F238E27FC236}">
-                      <a16:creationId xmlns:a16="http://schemas.microsoft.com/office/drawing/2014/main" xmlns="" id="{12529FFD-A2D3-4C7D-8A5A-B9E5CC49CEC3}"/>
+                      <a16:creationId xmlns="" xmlns:a16="http://schemas.microsoft.com/office/drawing/2014/main" id="{12529FFD-A2D3-4C7D-8A5A-B9E5CC49CEC3}"/>
                     </a:ext>
                   </a:extLst>
                 </p:cNvPr>
@@ -13689,7 +13724,7 @@
           <p:cNvPr id="33" name="Straight Arrow Connector 32">
             <a:extLst>
               <a:ext uri="{FF2B5EF4-FFF2-40B4-BE49-F238E27FC236}">
-                <a16:creationId xmlns:a16="http://schemas.microsoft.com/office/drawing/2014/main" xmlns="" id="{4856276E-CBCA-47F9-93A0-FBDAF1BFF544}"/>
+                <a16:creationId xmlns="" xmlns:a16="http://schemas.microsoft.com/office/drawing/2014/main" id="{4856276E-CBCA-47F9-93A0-FBDAF1BFF544}"/>
               </a:ext>
             </a:extLst>
           </p:cNvPr>
@@ -13737,7 +13772,7 @@
           <p:cNvPr id="39" name="Title 1">
             <a:extLst>
               <a:ext uri="{FF2B5EF4-FFF2-40B4-BE49-F238E27FC236}">
-                <a16:creationId xmlns:a16="http://schemas.microsoft.com/office/drawing/2014/main" xmlns="" id="{A8100B3E-DBA4-4DE0-864F-F152EE250F6F}"/>
+                <a16:creationId xmlns="" xmlns:a16="http://schemas.microsoft.com/office/drawing/2014/main" id="{A8100B3E-DBA4-4DE0-864F-F152EE250F6F}"/>
               </a:ext>
             </a:extLst>
           </p:cNvPr>
@@ -13774,7 +13809,7 @@
           <p:cNvPr id="6" name="Slide Number Placeholder 5">
             <a:extLst>
               <a:ext uri="{FF2B5EF4-FFF2-40B4-BE49-F238E27FC236}">
-                <a16:creationId xmlns:a16="http://schemas.microsoft.com/office/drawing/2014/main" xmlns="" id="{B09A1548-527A-433B-9B4A-E8989CFB6B15}"/>
+                <a16:creationId xmlns="" xmlns:a16="http://schemas.microsoft.com/office/drawing/2014/main" id="{B09A1548-527A-433B-9B4A-E8989CFB6B15}"/>
               </a:ext>
             </a:extLst>
           </p:cNvPr>
@@ -13804,7 +13839,7 @@
           <p:cNvPr id="8" name="Group 7">
             <a:extLst>
               <a:ext uri="{FF2B5EF4-FFF2-40B4-BE49-F238E27FC236}">
-                <a16:creationId xmlns:a16="http://schemas.microsoft.com/office/drawing/2014/main" xmlns="" id="{EABDCBF1-6629-4261-8977-A400FB700610}"/>
+                <a16:creationId xmlns="" xmlns:a16="http://schemas.microsoft.com/office/drawing/2014/main" id="{EABDCBF1-6629-4261-8977-A400FB700610}"/>
               </a:ext>
             </a:extLst>
           </p:cNvPr>
@@ -13824,7 +13859,7 @@
             <p:cNvPr id="26" name="TextBox 25">
               <a:extLst>
                 <a:ext uri="{FF2B5EF4-FFF2-40B4-BE49-F238E27FC236}">
-                  <a16:creationId xmlns:a16="http://schemas.microsoft.com/office/drawing/2014/main" xmlns="" id="{194E6F51-B414-44B5-96BA-A80FC0864F4F}"/>
+                  <a16:creationId xmlns="" xmlns:a16="http://schemas.microsoft.com/office/drawing/2014/main" id="{194E6F51-B414-44B5-96BA-A80FC0864F4F}"/>
                 </a:ext>
               </a:extLst>
             </p:cNvPr>
@@ -13868,7 +13903,7 @@
             <p:cNvPr id="40" name="Group 39">
               <a:extLst>
                 <a:ext uri="{FF2B5EF4-FFF2-40B4-BE49-F238E27FC236}">
-                  <a16:creationId xmlns:a16="http://schemas.microsoft.com/office/drawing/2014/main" xmlns="" id="{70AE469F-6C2F-4084-858C-6FA02B66A2F3}"/>
+                  <a16:creationId xmlns="" xmlns:a16="http://schemas.microsoft.com/office/drawing/2014/main" id="{70AE469F-6C2F-4084-858C-6FA02B66A2F3}"/>
                 </a:ext>
               </a:extLst>
             </p:cNvPr>
@@ -13888,7 +13923,7 @@
               <p:cNvPr id="44" name="Rectangle 43">
                 <a:extLst>
                   <a:ext uri="{FF2B5EF4-FFF2-40B4-BE49-F238E27FC236}">
-                    <a16:creationId xmlns:a16="http://schemas.microsoft.com/office/drawing/2014/main" xmlns="" id="{558891A4-A660-4D63-887E-457B959EA9B6}"/>
+                    <a16:creationId xmlns="" xmlns:a16="http://schemas.microsoft.com/office/drawing/2014/main" id="{558891A4-A660-4D63-887E-457B959EA9B6}"/>
                   </a:ext>
                 </a:extLst>
               </p:cNvPr>
@@ -13968,7 +14003,7 @@
               <p:cNvPr id="45" name="Group 44">
                 <a:extLst>
                   <a:ext uri="{FF2B5EF4-FFF2-40B4-BE49-F238E27FC236}">
-                    <a16:creationId xmlns:a16="http://schemas.microsoft.com/office/drawing/2014/main" xmlns="" id="{1F370D1A-BCE0-4EEC-97CC-A8A009EDB468}"/>
+                    <a16:creationId xmlns="" xmlns:a16="http://schemas.microsoft.com/office/drawing/2014/main" id="{1F370D1A-BCE0-4EEC-97CC-A8A009EDB468}"/>
                   </a:ext>
                 </a:extLst>
               </p:cNvPr>
@@ -13988,7 +14023,7 @@
                 <p:cNvPr id="49" name="Rectangle 48">
                   <a:extLst>
                     <a:ext uri="{FF2B5EF4-FFF2-40B4-BE49-F238E27FC236}">
-                      <a16:creationId xmlns:a16="http://schemas.microsoft.com/office/drawing/2014/main" xmlns="" id="{4A79A2CA-9D54-4E73-BCDF-14EAB2A42A7B}"/>
+                      <a16:creationId xmlns="" xmlns:a16="http://schemas.microsoft.com/office/drawing/2014/main" id="{4A79A2CA-9D54-4E73-BCDF-14EAB2A42A7B}"/>
                     </a:ext>
                   </a:extLst>
                 </p:cNvPr>
@@ -14075,7 +14110,7 @@
                 <p:cNvPr id="51" name="Rectangle 50">
                   <a:extLst>
                     <a:ext uri="{FF2B5EF4-FFF2-40B4-BE49-F238E27FC236}">
-                      <a16:creationId xmlns:a16="http://schemas.microsoft.com/office/drawing/2014/main" xmlns="" id="{D0684D9D-0EFA-457A-8BC6-1606FC273FD9}"/>
+                      <a16:creationId xmlns="" xmlns:a16="http://schemas.microsoft.com/office/drawing/2014/main" id="{D0684D9D-0EFA-457A-8BC6-1606FC273FD9}"/>
                     </a:ext>
                   </a:extLst>
                 </p:cNvPr>
@@ -14206,7 +14241,7 @@
           <p:cNvPr id="7" name="Group 6">
             <a:extLst>
               <a:ext uri="{FF2B5EF4-FFF2-40B4-BE49-F238E27FC236}">
-                <a16:creationId xmlns:a16="http://schemas.microsoft.com/office/drawing/2014/main" xmlns="" id="{739A96B0-70B1-417A-80F2-363E64367A32}"/>
+                <a16:creationId xmlns="" xmlns:a16="http://schemas.microsoft.com/office/drawing/2014/main" id="{739A96B0-70B1-417A-80F2-363E64367A32}"/>
               </a:ext>
             </a:extLst>
           </p:cNvPr>
@@ -14226,7 +14261,7 @@
             <p:cNvPr id="5" name="Group 4">
               <a:extLst>
                 <a:ext uri="{FF2B5EF4-FFF2-40B4-BE49-F238E27FC236}">
-                  <a16:creationId xmlns:a16="http://schemas.microsoft.com/office/drawing/2014/main" xmlns="" id="{766600B2-43D6-426A-BF4F-E893A35FBE58}"/>
+                  <a16:creationId xmlns="" xmlns:a16="http://schemas.microsoft.com/office/drawing/2014/main" id="{766600B2-43D6-426A-BF4F-E893A35FBE58}"/>
                 </a:ext>
               </a:extLst>
             </p:cNvPr>
@@ -14246,7 +14281,7 @@
               <p:cNvPr id="36" name="Rectangle 35">
                 <a:extLst>
                   <a:ext uri="{FF2B5EF4-FFF2-40B4-BE49-F238E27FC236}">
-                    <a16:creationId xmlns:a16="http://schemas.microsoft.com/office/drawing/2014/main" xmlns="" id="{69ADB7BC-9BA6-4C17-9E6D-B422AED9DAEC}"/>
+                    <a16:creationId xmlns="" xmlns:a16="http://schemas.microsoft.com/office/drawing/2014/main" id="{69ADB7BC-9BA6-4C17-9E6D-B422AED9DAEC}"/>
                   </a:ext>
                 </a:extLst>
               </p:cNvPr>
@@ -14326,7 +14361,7 @@
               <p:cNvPr id="48" name="Rectangle 47">
                 <a:extLst>
                   <a:ext uri="{FF2B5EF4-FFF2-40B4-BE49-F238E27FC236}">
-                    <a16:creationId xmlns:a16="http://schemas.microsoft.com/office/drawing/2014/main" xmlns="" id="{443CF2E7-3344-4452-99A5-CAC1F527AF55}"/>
+                    <a16:creationId xmlns="" xmlns:a16="http://schemas.microsoft.com/office/drawing/2014/main" id="{443CF2E7-3344-4452-99A5-CAC1F527AF55}"/>
                   </a:ext>
                 </a:extLst>
               </p:cNvPr>
@@ -14455,7 +14490,7 @@
             <p:cNvPr id="52" name="Rectangle 51">
               <a:extLst>
                 <a:ext uri="{FF2B5EF4-FFF2-40B4-BE49-F238E27FC236}">
-                  <a16:creationId xmlns:a16="http://schemas.microsoft.com/office/drawing/2014/main" xmlns="" id="{1134DA3A-0540-4260-BAB4-7484BD13F541}"/>
+                  <a16:creationId xmlns="" xmlns:a16="http://schemas.microsoft.com/office/drawing/2014/main" id="{1134DA3A-0540-4260-BAB4-7484BD13F541}"/>
                 </a:ext>
               </a:extLst>
             </p:cNvPr>
@@ -14543,7 +14578,7 @@
           <p:cNvPr id="53" name="Rectangle 52">
             <a:extLst>
               <a:ext uri="{FF2B5EF4-FFF2-40B4-BE49-F238E27FC236}">
-                <a16:creationId xmlns:a16="http://schemas.microsoft.com/office/drawing/2014/main" xmlns="" id="{E9B56035-CA91-4D33-9DEA-9922173D2D5B}"/>
+                <a16:creationId xmlns="" xmlns:a16="http://schemas.microsoft.com/office/drawing/2014/main" id="{E9B56035-CA91-4D33-9DEA-9922173D2D5B}"/>
               </a:ext>
             </a:extLst>
           </p:cNvPr>
@@ -14622,7 +14657,7 @@
           <p:cNvPr id="54" name="TextBox 53">
             <a:extLst>
               <a:ext uri="{FF2B5EF4-FFF2-40B4-BE49-F238E27FC236}">
-                <a16:creationId xmlns:a16="http://schemas.microsoft.com/office/drawing/2014/main" xmlns="" id="{367C69FA-901B-4FBD-B9B8-F7AB6C777723}"/>
+                <a16:creationId xmlns="" xmlns:a16="http://schemas.microsoft.com/office/drawing/2014/main" id="{367C69FA-901B-4FBD-B9B8-F7AB6C777723}"/>
               </a:ext>
             </a:extLst>
           </p:cNvPr>
@@ -15745,7 +15780,7 @@
           <p:cNvPr id="47" name="Rectangle 46">
             <a:extLst>
               <a:ext uri="{FF2B5EF4-FFF2-40B4-BE49-F238E27FC236}">
-                <a16:creationId xmlns:a16="http://schemas.microsoft.com/office/drawing/2014/main" xmlns="" id="{E33E5640-3ED1-4A60-A2C1-88A47377BA0C}"/>
+                <a16:creationId xmlns="" xmlns:a16="http://schemas.microsoft.com/office/drawing/2014/main" id="{E33E5640-3ED1-4A60-A2C1-88A47377BA0C}"/>
               </a:ext>
             </a:extLst>
           </p:cNvPr>
@@ -15875,7 +15910,7 @@
           <p:cNvPr id="48" name="Rectangle 47">
             <a:extLst>
               <a:ext uri="{FF2B5EF4-FFF2-40B4-BE49-F238E27FC236}">
-                <a16:creationId xmlns:a16="http://schemas.microsoft.com/office/drawing/2014/main" xmlns="" id="{443CF2E7-3344-4452-99A5-CAC1F527AF55}"/>
+                <a16:creationId xmlns="" xmlns:a16="http://schemas.microsoft.com/office/drawing/2014/main" id="{443CF2E7-3344-4452-99A5-CAC1F527AF55}"/>
               </a:ext>
             </a:extLst>
           </p:cNvPr>
@@ -16002,7 +16037,7 @@
           <p:cNvPr id="39" name="Title 1">
             <a:extLst>
               <a:ext uri="{FF2B5EF4-FFF2-40B4-BE49-F238E27FC236}">
-                <a16:creationId xmlns:a16="http://schemas.microsoft.com/office/drawing/2014/main" xmlns="" id="{A8100B3E-DBA4-4DE0-864F-F152EE250F6F}"/>
+                <a16:creationId xmlns="" xmlns:a16="http://schemas.microsoft.com/office/drawing/2014/main" id="{A8100B3E-DBA4-4DE0-864F-F152EE250F6F}"/>
               </a:ext>
             </a:extLst>
           </p:cNvPr>
@@ -16041,7 +16076,7 @@
           <p:cNvPr id="37" name="Straight Arrow Connector 36">
             <a:extLst>
               <a:ext uri="{FF2B5EF4-FFF2-40B4-BE49-F238E27FC236}">
-                <a16:creationId xmlns:a16="http://schemas.microsoft.com/office/drawing/2014/main" xmlns="" id="{9830D0AB-E7C4-4A5F-AE4C-FF9BCADD29CB}"/>
+                <a16:creationId xmlns="" xmlns:a16="http://schemas.microsoft.com/office/drawing/2014/main" id="{9830D0AB-E7C4-4A5F-AE4C-FF9BCADD29CB}"/>
               </a:ext>
             </a:extLst>
           </p:cNvPr>
@@ -16091,7 +16126,7 @@
               <p:cNvPr id="18" name="TextBox 17">
                 <a:extLst>
                   <a:ext uri="{FF2B5EF4-FFF2-40B4-BE49-F238E27FC236}">
-                    <a16:creationId xmlns:a16="http://schemas.microsoft.com/office/drawing/2014/main" xmlns="" id="{DBC36B95-FD05-42EA-B8DB-4052D4B6088B}"/>
+                    <a16:creationId xmlns="" xmlns:a16="http://schemas.microsoft.com/office/drawing/2014/main" id="{DBC36B95-FD05-42EA-B8DB-4052D4B6088B}"/>
                   </a:ext>
                 </a:extLst>
               </p:cNvPr>
@@ -16187,7 +16222,7 @@
               <p:cNvPr id="49" name="TextBox 48">
                 <a:extLst>
                   <a:ext uri="{FF2B5EF4-FFF2-40B4-BE49-F238E27FC236}">
-                    <a16:creationId xmlns:a16="http://schemas.microsoft.com/office/drawing/2014/main" xmlns="" id="{B7F51AAA-655B-4D93-A1BE-A16A2F16B9C7}"/>
+                    <a16:creationId xmlns="" xmlns:a16="http://schemas.microsoft.com/office/drawing/2014/main" id="{B7F51AAA-655B-4D93-A1BE-A16A2F16B9C7}"/>
                   </a:ext>
                 </a:extLst>
               </p:cNvPr>
@@ -16304,7 +16339,7 @@
           <p:cNvPr id="61" name="Straight Arrow Connector 60">
             <a:extLst>
               <a:ext uri="{FF2B5EF4-FFF2-40B4-BE49-F238E27FC236}">
-                <a16:creationId xmlns:a16="http://schemas.microsoft.com/office/drawing/2014/main" xmlns="" id="{BB190311-64E6-41BA-8AC5-E1B36EE27BBC}"/>
+                <a16:creationId xmlns="" xmlns:a16="http://schemas.microsoft.com/office/drawing/2014/main" id="{BB190311-64E6-41BA-8AC5-E1B36EE27BBC}"/>
               </a:ext>
             </a:extLst>
           </p:cNvPr>
@@ -16353,7 +16388,7 @@
               <p:cNvPr id="62" name="TextBox 61">
                 <a:extLst>
                   <a:ext uri="{FF2B5EF4-FFF2-40B4-BE49-F238E27FC236}">
-                    <a16:creationId xmlns:a16="http://schemas.microsoft.com/office/drawing/2014/main" xmlns="" id="{DCB73AB5-1E79-4FA1-9E38-323F1C5A5A7E}"/>
+                    <a16:creationId xmlns="" xmlns:a16="http://schemas.microsoft.com/office/drawing/2014/main" id="{DCB73AB5-1E79-4FA1-9E38-323F1C5A5A7E}"/>
                   </a:ext>
                 </a:extLst>
               </p:cNvPr>
@@ -16578,7 +16613,7 @@
               <p:cNvPr id="44" name="TextBox 43">
                 <a:extLst>
                   <a:ext uri="{FF2B5EF4-FFF2-40B4-BE49-F238E27FC236}">
-                    <a16:creationId xmlns:a16="http://schemas.microsoft.com/office/drawing/2014/main" xmlns="" id="{96AEF92C-3820-4AD1-9DEF-96AAE9B6ECC4}"/>
+                    <a16:creationId xmlns="" xmlns:a16="http://schemas.microsoft.com/office/drawing/2014/main" id="{96AEF92C-3820-4AD1-9DEF-96AAE9B6ECC4}"/>
                   </a:ext>
                 </a:extLst>
               </p:cNvPr>
@@ -16776,7 +16811,7 @@
           <p:cNvPr id="6" name="Group 5">
             <a:extLst>
               <a:ext uri="{FF2B5EF4-FFF2-40B4-BE49-F238E27FC236}">
-                <a16:creationId xmlns:a16="http://schemas.microsoft.com/office/drawing/2014/main" xmlns="" id="{9C65EE93-1366-4529-AC02-C93EF0A2EAD8}"/>
+                <a16:creationId xmlns="" xmlns:a16="http://schemas.microsoft.com/office/drawing/2014/main" id="{9C65EE93-1366-4529-AC02-C93EF0A2EAD8}"/>
               </a:ext>
             </a:extLst>
           </p:cNvPr>
@@ -16796,7 +16831,7 @@
             <p:cNvPr id="52" name="Rectangle 51">
               <a:extLst>
                 <a:ext uri="{FF2B5EF4-FFF2-40B4-BE49-F238E27FC236}">
-                  <a16:creationId xmlns:a16="http://schemas.microsoft.com/office/drawing/2014/main" xmlns="" id="{91FC43B0-13BB-407B-9AD3-1C274931DD69}"/>
+                  <a16:creationId xmlns="" xmlns:a16="http://schemas.microsoft.com/office/drawing/2014/main" id="{91FC43B0-13BB-407B-9AD3-1C274931DD69}"/>
                 </a:ext>
               </a:extLst>
             </p:cNvPr>
@@ -16923,7 +16958,7 @@
             <p:cNvPr id="57" name="Straight Arrow Connector 56">
               <a:extLst>
                 <a:ext uri="{FF2B5EF4-FFF2-40B4-BE49-F238E27FC236}">
-                  <a16:creationId xmlns:a16="http://schemas.microsoft.com/office/drawing/2014/main" xmlns="" id="{9058E969-1448-4669-B4EF-CC6D1D032033}"/>
+                  <a16:creationId xmlns="" xmlns:a16="http://schemas.microsoft.com/office/drawing/2014/main" id="{9058E969-1448-4669-B4EF-CC6D1D032033}"/>
                 </a:ext>
               </a:extLst>
             </p:cNvPr>
@@ -16970,7 +17005,7 @@
             <p:cNvPr id="60" name="Straight Arrow Connector 59">
               <a:extLst>
                 <a:ext uri="{FF2B5EF4-FFF2-40B4-BE49-F238E27FC236}">
-                  <a16:creationId xmlns:a16="http://schemas.microsoft.com/office/drawing/2014/main" xmlns="" id="{CCEF68B6-DD0B-4D8C-AD6F-9F0A4DF35CFD}"/>
+                  <a16:creationId xmlns="" xmlns:a16="http://schemas.microsoft.com/office/drawing/2014/main" id="{CCEF68B6-DD0B-4D8C-AD6F-9F0A4DF35CFD}"/>
                 </a:ext>
               </a:extLst>
             </p:cNvPr>
@@ -17017,7 +17052,7 @@
             <p:cNvPr id="78" name="Group 77">
               <a:extLst>
                 <a:ext uri="{FF2B5EF4-FFF2-40B4-BE49-F238E27FC236}">
-                  <a16:creationId xmlns:a16="http://schemas.microsoft.com/office/drawing/2014/main" xmlns="" id="{66B6B3CC-819B-4F73-BA1D-22E01B942256}"/>
+                  <a16:creationId xmlns="" xmlns:a16="http://schemas.microsoft.com/office/drawing/2014/main" id="{66B6B3CC-819B-4F73-BA1D-22E01B942256}"/>
                 </a:ext>
               </a:extLst>
             </p:cNvPr>
@@ -17037,7 +17072,7 @@
               <p:cNvPr id="73" name="Straight Arrow Connector 72">
                 <a:extLst>
                   <a:ext uri="{FF2B5EF4-FFF2-40B4-BE49-F238E27FC236}">
-                    <a16:creationId xmlns:a16="http://schemas.microsoft.com/office/drawing/2014/main" xmlns="" id="{866CB804-F56C-4CBF-BA49-6A23B5E61E53}"/>
+                    <a16:creationId xmlns="" xmlns:a16="http://schemas.microsoft.com/office/drawing/2014/main" id="{866CB804-F56C-4CBF-BA49-6A23B5E61E53}"/>
                   </a:ext>
                 </a:extLst>
               </p:cNvPr>
@@ -17082,7 +17117,7 @@
               <p:cNvPr id="74" name="Straight Arrow Connector 73">
                 <a:extLst>
                   <a:ext uri="{FF2B5EF4-FFF2-40B4-BE49-F238E27FC236}">
-                    <a16:creationId xmlns:a16="http://schemas.microsoft.com/office/drawing/2014/main" xmlns="" id="{618D90D4-D9AB-4072-8F45-F029840952AC}"/>
+                    <a16:creationId xmlns="" xmlns:a16="http://schemas.microsoft.com/office/drawing/2014/main" id="{618D90D4-D9AB-4072-8F45-F029840952AC}"/>
                   </a:ext>
                 </a:extLst>
               </p:cNvPr>
@@ -17129,7 +17164,7 @@
           <p:cNvPr id="2" name="Slide Number Placeholder 1">
             <a:extLst>
               <a:ext uri="{FF2B5EF4-FFF2-40B4-BE49-F238E27FC236}">
-                <a16:creationId xmlns:a16="http://schemas.microsoft.com/office/drawing/2014/main" xmlns="" id="{39A4A61C-E614-40D0-A029-086975E3AEA9}"/>
+                <a16:creationId xmlns="" xmlns:a16="http://schemas.microsoft.com/office/drawing/2014/main" id="{39A4A61C-E614-40D0-A029-086975E3AEA9}"/>
               </a:ext>
             </a:extLst>
           </p:cNvPr>
@@ -17474,7 +17509,7 @@
           <p:cNvPr id="69" name="Freeform: Shape 68">
             <a:extLst>
               <a:ext uri="{FF2B5EF4-FFF2-40B4-BE49-F238E27FC236}">
-                <a16:creationId xmlns:a16="http://schemas.microsoft.com/office/drawing/2014/main" xmlns="" id="{A0D700E9-CDA7-4D60-99AF-492B4B66860D}"/>
+                <a16:creationId xmlns="" xmlns:a16="http://schemas.microsoft.com/office/drawing/2014/main" id="{A0D700E9-CDA7-4D60-99AF-492B4B66860D}"/>
               </a:ext>
             </a:extLst>
           </p:cNvPr>
@@ -17586,7 +17621,7 @@
           <p:cNvPr id="47" name="Rectangle 46">
             <a:extLst>
               <a:ext uri="{FF2B5EF4-FFF2-40B4-BE49-F238E27FC236}">
-                <a16:creationId xmlns:a16="http://schemas.microsoft.com/office/drawing/2014/main" xmlns="" id="{E33E5640-3ED1-4A60-A2C1-88A47377BA0C}"/>
+                <a16:creationId xmlns="" xmlns:a16="http://schemas.microsoft.com/office/drawing/2014/main" id="{E33E5640-3ED1-4A60-A2C1-88A47377BA0C}"/>
               </a:ext>
             </a:extLst>
           </p:cNvPr>
@@ -17716,7 +17751,7 @@
           <p:cNvPr id="48" name="Rectangle 47">
             <a:extLst>
               <a:ext uri="{FF2B5EF4-FFF2-40B4-BE49-F238E27FC236}">
-                <a16:creationId xmlns:a16="http://schemas.microsoft.com/office/drawing/2014/main" xmlns="" id="{443CF2E7-3344-4452-99A5-CAC1F527AF55}"/>
+                <a16:creationId xmlns="" xmlns:a16="http://schemas.microsoft.com/office/drawing/2014/main" id="{443CF2E7-3344-4452-99A5-CAC1F527AF55}"/>
               </a:ext>
             </a:extLst>
           </p:cNvPr>
@@ -17843,7 +17878,7 @@
           <p:cNvPr id="39" name="Title 1">
             <a:extLst>
               <a:ext uri="{FF2B5EF4-FFF2-40B4-BE49-F238E27FC236}">
-                <a16:creationId xmlns:a16="http://schemas.microsoft.com/office/drawing/2014/main" xmlns="" id="{A8100B3E-DBA4-4DE0-864F-F152EE250F6F}"/>
+                <a16:creationId xmlns="" xmlns:a16="http://schemas.microsoft.com/office/drawing/2014/main" id="{A8100B3E-DBA4-4DE0-864F-F152EE250F6F}"/>
               </a:ext>
             </a:extLst>
           </p:cNvPr>
@@ -17882,7 +17917,7 @@
           <p:cNvPr id="37" name="Straight Arrow Connector 36">
             <a:extLst>
               <a:ext uri="{FF2B5EF4-FFF2-40B4-BE49-F238E27FC236}">
-                <a16:creationId xmlns:a16="http://schemas.microsoft.com/office/drawing/2014/main" xmlns="" id="{9830D0AB-E7C4-4A5F-AE4C-FF9BCADD29CB}"/>
+                <a16:creationId xmlns="" xmlns:a16="http://schemas.microsoft.com/office/drawing/2014/main" id="{9830D0AB-E7C4-4A5F-AE4C-FF9BCADD29CB}"/>
               </a:ext>
             </a:extLst>
           </p:cNvPr>
@@ -17932,7 +17967,7 @@
               <p:cNvPr id="18" name="TextBox 17">
                 <a:extLst>
                   <a:ext uri="{FF2B5EF4-FFF2-40B4-BE49-F238E27FC236}">
-                    <a16:creationId xmlns:a16="http://schemas.microsoft.com/office/drawing/2014/main" xmlns="" id="{DBC36B95-FD05-42EA-B8DB-4052D4B6088B}"/>
+                    <a16:creationId xmlns="" xmlns:a16="http://schemas.microsoft.com/office/drawing/2014/main" id="{DBC36B95-FD05-42EA-B8DB-4052D4B6088B}"/>
                   </a:ext>
                 </a:extLst>
               </p:cNvPr>
@@ -18028,7 +18063,7 @@
               <p:cNvPr id="49" name="TextBox 48">
                 <a:extLst>
                   <a:ext uri="{FF2B5EF4-FFF2-40B4-BE49-F238E27FC236}">
-                    <a16:creationId xmlns:a16="http://schemas.microsoft.com/office/drawing/2014/main" xmlns="" id="{B7F51AAA-655B-4D93-A1BE-A16A2F16B9C7}"/>
+                    <a16:creationId xmlns="" xmlns:a16="http://schemas.microsoft.com/office/drawing/2014/main" id="{B7F51AAA-655B-4D93-A1BE-A16A2F16B9C7}"/>
                   </a:ext>
                 </a:extLst>
               </p:cNvPr>
@@ -18145,7 +18180,7 @@
           <p:cNvPr id="61" name="Straight Arrow Connector 60">
             <a:extLst>
               <a:ext uri="{FF2B5EF4-FFF2-40B4-BE49-F238E27FC236}">
-                <a16:creationId xmlns:a16="http://schemas.microsoft.com/office/drawing/2014/main" xmlns="" id="{BB190311-64E6-41BA-8AC5-E1B36EE27BBC}"/>
+                <a16:creationId xmlns="" xmlns:a16="http://schemas.microsoft.com/office/drawing/2014/main" id="{BB190311-64E6-41BA-8AC5-E1B36EE27BBC}"/>
               </a:ext>
             </a:extLst>
           </p:cNvPr>
@@ -18194,7 +18229,7 @@
               <p:cNvPr id="62" name="TextBox 61">
                 <a:extLst>
                   <a:ext uri="{FF2B5EF4-FFF2-40B4-BE49-F238E27FC236}">
-                    <a16:creationId xmlns:a16="http://schemas.microsoft.com/office/drawing/2014/main" xmlns="" id="{DCB73AB5-1E79-4FA1-9E38-323F1C5A5A7E}"/>
+                    <a16:creationId xmlns="" xmlns:a16="http://schemas.microsoft.com/office/drawing/2014/main" id="{DCB73AB5-1E79-4FA1-9E38-323F1C5A5A7E}"/>
                   </a:ext>
                 </a:extLst>
               </p:cNvPr>
@@ -18419,7 +18454,7 @@
               <p:cNvPr id="40" name="TextBox 39">
                 <a:extLst>
                   <a:ext uri="{FF2B5EF4-FFF2-40B4-BE49-F238E27FC236}">
-                    <a16:creationId xmlns:a16="http://schemas.microsoft.com/office/drawing/2014/main" xmlns="" id="{AD092996-4549-49D9-B160-337093B26E54}"/>
+                    <a16:creationId xmlns="" xmlns:a16="http://schemas.microsoft.com/office/drawing/2014/main" id="{AD092996-4549-49D9-B160-337093B26E54}"/>
                   </a:ext>
                 </a:extLst>
               </p:cNvPr>
@@ -19052,7 +19087,7 @@
           <p:cNvPr id="79" name="Group 78">
             <a:extLst>
               <a:ext uri="{FF2B5EF4-FFF2-40B4-BE49-F238E27FC236}">
-                <a16:creationId xmlns:a16="http://schemas.microsoft.com/office/drawing/2014/main" xmlns="" id="{FC1971F2-8FB3-42CE-8B72-D7EC76EBA8E1}"/>
+                <a16:creationId xmlns="" xmlns:a16="http://schemas.microsoft.com/office/drawing/2014/main" id="{FC1971F2-8FB3-42CE-8B72-D7EC76EBA8E1}"/>
               </a:ext>
             </a:extLst>
           </p:cNvPr>
@@ -19074,7 +19109,7 @@
                 <p:cNvPr id="44" name="TextBox 43">
                   <a:extLst>
                     <a:ext uri="{FF2B5EF4-FFF2-40B4-BE49-F238E27FC236}">
-                      <a16:creationId xmlns:a16="http://schemas.microsoft.com/office/drawing/2014/main" xmlns="" id="{96AEF92C-3820-4AD1-9DEF-96AAE9B6ECC4}"/>
+                      <a16:creationId xmlns="" xmlns:a16="http://schemas.microsoft.com/office/drawing/2014/main" id="{96AEF92C-3820-4AD1-9DEF-96AAE9B6ECC4}"/>
                     </a:ext>
                   </a:extLst>
                 </p:cNvPr>
@@ -19272,7 +19307,7 @@
             <p:cNvPr id="52" name="Rectangle 51">
               <a:extLst>
                 <a:ext uri="{FF2B5EF4-FFF2-40B4-BE49-F238E27FC236}">
-                  <a16:creationId xmlns:a16="http://schemas.microsoft.com/office/drawing/2014/main" xmlns="" id="{91FC43B0-13BB-407B-9AD3-1C274931DD69}"/>
+                  <a16:creationId xmlns="" xmlns:a16="http://schemas.microsoft.com/office/drawing/2014/main" id="{91FC43B0-13BB-407B-9AD3-1C274931DD69}"/>
                 </a:ext>
               </a:extLst>
             </p:cNvPr>
@@ -19399,7 +19434,7 @@
             <p:cNvPr id="53" name="Rectangle 52">
               <a:extLst>
                 <a:ext uri="{FF2B5EF4-FFF2-40B4-BE49-F238E27FC236}">
-                  <a16:creationId xmlns:a16="http://schemas.microsoft.com/office/drawing/2014/main" xmlns="" id="{6521DF2A-636A-4B52-B7B6-F07278A1ACE9}"/>
+                  <a16:creationId xmlns="" xmlns:a16="http://schemas.microsoft.com/office/drawing/2014/main" id="{6521DF2A-636A-4B52-B7B6-F07278A1ACE9}"/>
                 </a:ext>
               </a:extLst>
             </p:cNvPr>
@@ -19490,7 +19525,7 @@
             <p:cNvPr id="54" name="Rectangle 53">
               <a:extLst>
                 <a:ext uri="{FF2B5EF4-FFF2-40B4-BE49-F238E27FC236}">
-                  <a16:creationId xmlns:a16="http://schemas.microsoft.com/office/drawing/2014/main" xmlns="" id="{40B2407F-6ACD-4D0C-A691-ABAF372DF723}"/>
+                  <a16:creationId xmlns="" xmlns:a16="http://schemas.microsoft.com/office/drawing/2014/main" id="{40B2407F-6ACD-4D0C-A691-ABAF372DF723}"/>
                 </a:ext>
               </a:extLst>
             </p:cNvPr>
@@ -19623,7 +19658,7 @@
             <p:cNvPr id="57" name="Straight Arrow Connector 56">
               <a:extLst>
                 <a:ext uri="{FF2B5EF4-FFF2-40B4-BE49-F238E27FC236}">
-                  <a16:creationId xmlns:a16="http://schemas.microsoft.com/office/drawing/2014/main" xmlns="" id="{9058E969-1448-4669-B4EF-CC6D1D032033}"/>
+                  <a16:creationId xmlns="" xmlns:a16="http://schemas.microsoft.com/office/drawing/2014/main" id="{9058E969-1448-4669-B4EF-CC6D1D032033}"/>
                 </a:ext>
               </a:extLst>
             </p:cNvPr>
@@ -19670,7 +19705,7 @@
             <p:cNvPr id="58" name="Straight Arrow Connector 57">
               <a:extLst>
                 <a:ext uri="{FF2B5EF4-FFF2-40B4-BE49-F238E27FC236}">
-                  <a16:creationId xmlns:a16="http://schemas.microsoft.com/office/drawing/2014/main" xmlns="" id="{E51644D2-F391-4D0D-B60A-A41D84D1F911}"/>
+                  <a16:creationId xmlns="" xmlns:a16="http://schemas.microsoft.com/office/drawing/2014/main" id="{E51644D2-F391-4D0D-B60A-A41D84D1F911}"/>
                 </a:ext>
               </a:extLst>
             </p:cNvPr>
@@ -19717,7 +19752,7 @@
             <p:cNvPr id="59" name="Straight Arrow Connector 58">
               <a:extLst>
                 <a:ext uri="{FF2B5EF4-FFF2-40B4-BE49-F238E27FC236}">
-                  <a16:creationId xmlns:a16="http://schemas.microsoft.com/office/drawing/2014/main" xmlns="" id="{D8DFEF77-59D5-4A19-A93F-1C1F6A1657CE}"/>
+                  <a16:creationId xmlns="" xmlns:a16="http://schemas.microsoft.com/office/drawing/2014/main" id="{D8DFEF77-59D5-4A19-A93F-1C1F6A1657CE}"/>
                 </a:ext>
               </a:extLst>
             </p:cNvPr>
@@ -19764,7 +19799,7 @@
             <p:cNvPr id="60" name="Straight Arrow Connector 59">
               <a:extLst>
                 <a:ext uri="{FF2B5EF4-FFF2-40B4-BE49-F238E27FC236}">
-                  <a16:creationId xmlns:a16="http://schemas.microsoft.com/office/drawing/2014/main" xmlns="" id="{CCEF68B6-DD0B-4D8C-AD6F-9F0A4DF35CFD}"/>
+                  <a16:creationId xmlns="" xmlns:a16="http://schemas.microsoft.com/office/drawing/2014/main" id="{CCEF68B6-DD0B-4D8C-AD6F-9F0A4DF35CFD}"/>
                 </a:ext>
               </a:extLst>
             </p:cNvPr>
@@ -19813,7 +19848,7 @@
                 <p:cNvPr id="63" name="TextBox 62">
                   <a:extLst>
                     <a:ext uri="{FF2B5EF4-FFF2-40B4-BE49-F238E27FC236}">
-                      <a16:creationId xmlns:a16="http://schemas.microsoft.com/office/drawing/2014/main" xmlns="" id="{C02C4A60-181A-41E7-82B5-FF541B3DE4A9}"/>
+                      <a16:creationId xmlns="" xmlns:a16="http://schemas.microsoft.com/office/drawing/2014/main" id="{C02C4A60-181A-41E7-82B5-FF541B3DE4A9}"/>
                     </a:ext>
                   </a:extLst>
                 </p:cNvPr>
@@ -19928,7 +19963,7 @@
                 <p:cNvPr id="64" name="TextBox 63">
                   <a:extLst>
                     <a:ext uri="{FF2B5EF4-FFF2-40B4-BE49-F238E27FC236}">
-                      <a16:creationId xmlns:a16="http://schemas.microsoft.com/office/drawing/2014/main" xmlns="" id="{2FD9758A-D517-49FB-B655-871A9E2A56A0}"/>
+                      <a16:creationId xmlns="" xmlns:a16="http://schemas.microsoft.com/office/drawing/2014/main" id="{2FD9758A-D517-49FB-B655-871A9E2A56A0}"/>
                     </a:ext>
                   </a:extLst>
                 </p:cNvPr>
@@ -20076,7 +20111,7 @@
                 <p:cNvPr id="71" name="TextBox 70">
                   <a:extLst>
                     <a:ext uri="{FF2B5EF4-FFF2-40B4-BE49-F238E27FC236}">
-                      <a16:creationId xmlns:a16="http://schemas.microsoft.com/office/drawing/2014/main" xmlns="" id="{7FEFB8D8-31BE-476C-B2BB-DFA18E2476A4}"/>
+                      <a16:creationId xmlns="" xmlns:a16="http://schemas.microsoft.com/office/drawing/2014/main" id="{7FEFB8D8-31BE-476C-B2BB-DFA18E2476A4}"/>
                     </a:ext>
                   </a:extLst>
                 </p:cNvPr>
@@ -20194,7 +20229,7 @@
           <p:cNvPr id="78" name="Group 77">
             <a:extLst>
               <a:ext uri="{FF2B5EF4-FFF2-40B4-BE49-F238E27FC236}">
-                <a16:creationId xmlns:a16="http://schemas.microsoft.com/office/drawing/2014/main" xmlns="" id="{66B6B3CC-819B-4F73-BA1D-22E01B942256}"/>
+                <a16:creationId xmlns="" xmlns:a16="http://schemas.microsoft.com/office/drawing/2014/main" id="{66B6B3CC-819B-4F73-BA1D-22E01B942256}"/>
               </a:ext>
             </a:extLst>
           </p:cNvPr>
@@ -20214,7 +20249,7 @@
             <p:cNvPr id="73" name="Straight Arrow Connector 72">
               <a:extLst>
                 <a:ext uri="{FF2B5EF4-FFF2-40B4-BE49-F238E27FC236}">
-                  <a16:creationId xmlns:a16="http://schemas.microsoft.com/office/drawing/2014/main" xmlns="" id="{866CB804-F56C-4CBF-BA49-6A23B5E61E53}"/>
+                  <a16:creationId xmlns="" xmlns:a16="http://schemas.microsoft.com/office/drawing/2014/main" id="{866CB804-F56C-4CBF-BA49-6A23B5E61E53}"/>
                 </a:ext>
               </a:extLst>
             </p:cNvPr>
@@ -20259,7 +20294,7 @@
             <p:cNvPr id="74" name="Straight Arrow Connector 73">
               <a:extLst>
                 <a:ext uri="{FF2B5EF4-FFF2-40B4-BE49-F238E27FC236}">
-                  <a16:creationId xmlns:a16="http://schemas.microsoft.com/office/drawing/2014/main" xmlns="" id="{618D90D4-D9AB-4072-8F45-F029840952AC}"/>
+                  <a16:creationId xmlns="" xmlns:a16="http://schemas.microsoft.com/office/drawing/2014/main" id="{618D90D4-D9AB-4072-8F45-F029840952AC}"/>
                 </a:ext>
               </a:extLst>
             </p:cNvPr>
@@ -20305,7 +20340,7 @@
           <p:cNvPr id="2" name="Slide Number Placeholder 1">
             <a:extLst>
               <a:ext uri="{FF2B5EF4-FFF2-40B4-BE49-F238E27FC236}">
-                <a16:creationId xmlns:a16="http://schemas.microsoft.com/office/drawing/2014/main" xmlns="" id="{39A4A61C-E614-40D0-A029-086975E3AEA9}"/>
+                <a16:creationId xmlns="" xmlns:a16="http://schemas.microsoft.com/office/drawing/2014/main" id="{39A4A61C-E614-40D0-A029-086975E3AEA9}"/>
               </a:ext>
             </a:extLst>
           </p:cNvPr>
@@ -20748,7 +20783,7 @@
           <p:cNvPr id="39" name="Title 1">
             <a:extLst>
               <a:ext uri="{FF2B5EF4-FFF2-40B4-BE49-F238E27FC236}">
-                <a16:creationId xmlns:a16="http://schemas.microsoft.com/office/drawing/2014/main" xmlns="" id="{A8100B3E-DBA4-4DE0-864F-F152EE250F6F}"/>
+                <a16:creationId xmlns="" xmlns:a16="http://schemas.microsoft.com/office/drawing/2014/main" id="{A8100B3E-DBA4-4DE0-864F-F152EE250F6F}"/>
               </a:ext>
             </a:extLst>
           </p:cNvPr>
@@ -20787,7 +20822,7 @@
           <p:cNvPr id="5" name="Picture 4">
             <a:extLst>
               <a:ext uri="{FF2B5EF4-FFF2-40B4-BE49-F238E27FC236}">
-                <a16:creationId xmlns:a16="http://schemas.microsoft.com/office/drawing/2014/main" xmlns="" id="{4D1378B7-6BFA-49E8-A1A9-8E545C816AE6}"/>
+                <a16:creationId xmlns="" xmlns:a16="http://schemas.microsoft.com/office/drawing/2014/main" id="{4D1378B7-6BFA-49E8-A1A9-8E545C816AE6}"/>
               </a:ext>
             </a:extLst>
           </p:cNvPr>
@@ -20817,7 +20852,7 @@
           <p:cNvPr id="10" name="TextBox 9">
             <a:extLst>
               <a:ext uri="{FF2B5EF4-FFF2-40B4-BE49-F238E27FC236}">
-                <a16:creationId xmlns:a16="http://schemas.microsoft.com/office/drawing/2014/main" xmlns="" id="{2CC07CA0-CB3B-408F-BCA2-C72403DBEF1E}"/>
+                <a16:creationId xmlns="" xmlns:a16="http://schemas.microsoft.com/office/drawing/2014/main" id="{2CC07CA0-CB3B-408F-BCA2-C72403DBEF1E}"/>
               </a:ext>
             </a:extLst>
           </p:cNvPr>
@@ -20947,7 +20982,7 @@
           <p:cNvPr id="4" name="Slide Number Placeholder 3">
             <a:extLst>
               <a:ext uri="{FF2B5EF4-FFF2-40B4-BE49-F238E27FC236}">
-                <a16:creationId xmlns:a16="http://schemas.microsoft.com/office/drawing/2014/main" xmlns="" id="{DBB2CB64-79F8-4F5F-81B9-45283DB80F0B}"/>
+                <a16:creationId xmlns="" xmlns:a16="http://schemas.microsoft.com/office/drawing/2014/main" id="{DBB2CB64-79F8-4F5F-81B9-45283DB80F0B}"/>
               </a:ext>
             </a:extLst>
           </p:cNvPr>
@@ -20982,6 +21017,13 @@
   <p:clrMapOvr>
     <a:masterClrMapping/>
   </p:clrMapOvr>
+  <p:timing>
+    <p:tnLst>
+      <p:par>
+        <p:cTn id="1" dur="indefinite" restart="never" nodeType="tmRoot"/>
+      </p:par>
+    </p:tnLst>
+  </p:timing>
 </p:sld>
 </file>
 
@@ -21007,7 +21049,7 @@
           <p:cNvPr id="39" name="Title 1">
             <a:extLst>
               <a:ext uri="{FF2B5EF4-FFF2-40B4-BE49-F238E27FC236}">
-                <a16:creationId xmlns:a16="http://schemas.microsoft.com/office/drawing/2014/main" xmlns="" id="{A8100B3E-DBA4-4DE0-864F-F152EE250F6F}"/>
+                <a16:creationId xmlns="" xmlns:a16="http://schemas.microsoft.com/office/drawing/2014/main" id="{A8100B3E-DBA4-4DE0-864F-F152EE250F6F}"/>
               </a:ext>
             </a:extLst>
           </p:cNvPr>
@@ -21046,7 +21088,7 @@
           <p:cNvPr id="7" name="Picture 6">
             <a:extLst>
               <a:ext uri="{FF2B5EF4-FFF2-40B4-BE49-F238E27FC236}">
-                <a16:creationId xmlns:a16="http://schemas.microsoft.com/office/drawing/2014/main" xmlns="" id="{880130BA-E803-4AF9-84DE-FEC7D1B8465C}"/>
+                <a16:creationId xmlns="" xmlns:a16="http://schemas.microsoft.com/office/drawing/2014/main" id="{880130BA-E803-4AF9-84DE-FEC7D1B8465C}"/>
               </a:ext>
             </a:extLst>
           </p:cNvPr>
@@ -21078,7 +21120,7 @@
               <p:cNvPr id="19" name="TextBox 18">
                 <a:extLst>
                   <a:ext uri="{FF2B5EF4-FFF2-40B4-BE49-F238E27FC236}">
-                    <a16:creationId xmlns:a16="http://schemas.microsoft.com/office/drawing/2014/main" xmlns="" id="{D8D0DE4E-798E-48AC-B5F0-09A08252B1EA}"/>
+                    <a16:creationId xmlns="" xmlns:a16="http://schemas.microsoft.com/office/drawing/2014/main" id="{D8D0DE4E-798E-48AC-B5F0-09A08252B1EA}"/>
                   </a:ext>
                 </a:extLst>
               </p:cNvPr>
@@ -21194,7 +21236,7 @@
           <p:cNvPr id="4" name="Picture 3">
             <a:extLst>
               <a:ext uri="{FF2B5EF4-FFF2-40B4-BE49-F238E27FC236}">
-                <a16:creationId xmlns:a16="http://schemas.microsoft.com/office/drawing/2014/main" xmlns="" id="{356AFBDB-AE54-4D90-959E-3EA191380400}"/>
+                <a16:creationId xmlns="" xmlns:a16="http://schemas.microsoft.com/office/drawing/2014/main" id="{356AFBDB-AE54-4D90-959E-3EA191380400}"/>
               </a:ext>
             </a:extLst>
           </p:cNvPr>
@@ -21229,7 +21271,7 @@
               <p:cNvPr id="14" name="TextBox 13">
                 <a:extLst>
                   <a:ext uri="{FF2B5EF4-FFF2-40B4-BE49-F238E27FC236}">
-                    <a16:creationId xmlns:a16="http://schemas.microsoft.com/office/drawing/2014/main" xmlns="" id="{11386286-1DB9-48C0-B384-3982ECB152DC}"/>
+                    <a16:creationId xmlns="" xmlns:a16="http://schemas.microsoft.com/office/drawing/2014/main" id="{11386286-1DB9-48C0-B384-3982ECB152DC}"/>
                   </a:ext>
                 </a:extLst>
               </p:cNvPr>
@@ -21436,7 +21478,7 @@
           <p:cNvPr id="15" name="Straight Arrow Connector 14">
             <a:extLst>
               <a:ext uri="{FF2B5EF4-FFF2-40B4-BE49-F238E27FC236}">
-                <a16:creationId xmlns:a16="http://schemas.microsoft.com/office/drawing/2014/main" xmlns="" id="{DED34169-5224-478D-AC0E-AC722990B934}"/>
+                <a16:creationId xmlns="" xmlns:a16="http://schemas.microsoft.com/office/drawing/2014/main" id="{DED34169-5224-478D-AC0E-AC722990B934}"/>
               </a:ext>
             </a:extLst>
           </p:cNvPr>
@@ -21485,7 +21527,7 @@
               <p:cNvPr id="9" name="TextBox 8">
                 <a:extLst>
                   <a:ext uri="{FF2B5EF4-FFF2-40B4-BE49-F238E27FC236}">
-                    <a16:creationId xmlns:a16="http://schemas.microsoft.com/office/drawing/2014/main" xmlns="" id="{E61FDD08-D0F9-42EB-BB2D-C8273378B37C}"/>
+                    <a16:creationId xmlns="" xmlns:a16="http://schemas.microsoft.com/office/drawing/2014/main" id="{E61FDD08-D0F9-42EB-BB2D-C8273378B37C}"/>
                   </a:ext>
                 </a:extLst>
               </p:cNvPr>
@@ -21619,7 +21661,7 @@
           <p:cNvPr id="12" name="Rectangle 11">
             <a:extLst>
               <a:ext uri="{FF2B5EF4-FFF2-40B4-BE49-F238E27FC236}">
-                <a16:creationId xmlns:a16="http://schemas.microsoft.com/office/drawing/2014/main" xmlns="" id="{7BEC8890-3B6C-46BD-B8CD-C983AA8200F5}"/>
+                <a16:creationId xmlns="" xmlns:a16="http://schemas.microsoft.com/office/drawing/2014/main" id="{7BEC8890-3B6C-46BD-B8CD-C983AA8200F5}"/>
               </a:ext>
             </a:extLst>
           </p:cNvPr>
@@ -21675,7 +21717,7 @@
           <p:cNvPr id="16" name="Speech Bubble: Rectangle with Corners Rounded 15">
             <a:extLst>
               <a:ext uri="{FF2B5EF4-FFF2-40B4-BE49-F238E27FC236}">
-                <a16:creationId xmlns:a16="http://schemas.microsoft.com/office/drawing/2014/main" xmlns="" id="{99D61782-029C-4E3C-978F-66F996BC6628}"/>
+                <a16:creationId xmlns="" xmlns:a16="http://schemas.microsoft.com/office/drawing/2014/main" id="{99D61782-029C-4E3C-978F-66F996BC6628}"/>
               </a:ext>
             </a:extLst>
           </p:cNvPr>
@@ -21747,7 +21789,7 @@
           <p:cNvPr id="5" name="Slide Number Placeholder 4">
             <a:extLst>
               <a:ext uri="{FF2B5EF4-FFF2-40B4-BE49-F238E27FC236}">
-                <a16:creationId xmlns:a16="http://schemas.microsoft.com/office/drawing/2014/main" xmlns="" id="{AFBCBA92-9C9D-4CE1-9E8C-B44A24A95188}"/>
+                <a16:creationId xmlns="" xmlns:a16="http://schemas.microsoft.com/office/drawing/2014/main" id="{AFBCBA92-9C9D-4CE1-9E8C-B44A24A95188}"/>
               </a:ext>
             </a:extLst>
           </p:cNvPr>
@@ -22285,7 +22327,7 @@
           <p:cNvPr id="5" name="Title 1">
             <a:extLst>
               <a:ext uri="{FF2B5EF4-FFF2-40B4-BE49-F238E27FC236}">
-                <a16:creationId xmlns:a16="http://schemas.microsoft.com/office/drawing/2014/main" xmlns="" id="{F11C875C-9CAA-4838-BBDD-43705F932F58}"/>
+                <a16:creationId xmlns="" xmlns:a16="http://schemas.microsoft.com/office/drawing/2014/main" id="{F11C875C-9CAA-4838-BBDD-43705F932F58}"/>
               </a:ext>
             </a:extLst>
           </p:cNvPr>
@@ -22403,7 +22445,7 @@
           <p:cNvPr id="14" name="Picture 13">
             <a:extLst>
               <a:ext uri="{FF2B5EF4-FFF2-40B4-BE49-F238E27FC236}">
-                <a16:creationId xmlns:a16="http://schemas.microsoft.com/office/drawing/2014/main" xmlns="" id="{A5018CE7-28D9-4022-9A9E-B2B9B8CA48FE}"/>
+                <a16:creationId xmlns="" xmlns:a16="http://schemas.microsoft.com/office/drawing/2014/main" id="{A5018CE7-28D9-4022-9A9E-B2B9B8CA48FE}"/>
               </a:ext>
             </a:extLst>
           </p:cNvPr>
@@ -22433,7 +22475,7 @@
           <p:cNvPr id="23" name="Group 22">
             <a:extLst>
               <a:ext uri="{FF2B5EF4-FFF2-40B4-BE49-F238E27FC236}">
-                <a16:creationId xmlns:a16="http://schemas.microsoft.com/office/drawing/2014/main" xmlns="" id="{92AFB317-F39E-4D8D-BF6D-081F2F0B5691}"/>
+                <a16:creationId xmlns="" xmlns:a16="http://schemas.microsoft.com/office/drawing/2014/main" id="{92AFB317-F39E-4D8D-BF6D-081F2F0B5691}"/>
               </a:ext>
             </a:extLst>
           </p:cNvPr>
@@ -22453,7 +22495,7 @@
             <p:cNvPr id="17" name="Oval 16">
               <a:extLst>
                 <a:ext uri="{FF2B5EF4-FFF2-40B4-BE49-F238E27FC236}">
-                  <a16:creationId xmlns:a16="http://schemas.microsoft.com/office/drawing/2014/main" xmlns="" id="{520F6D53-68A7-4282-831D-E164F3C4C7C3}"/>
+                  <a16:creationId xmlns="" xmlns:a16="http://schemas.microsoft.com/office/drawing/2014/main" id="{520F6D53-68A7-4282-831D-E164F3C4C7C3}"/>
                 </a:ext>
               </a:extLst>
             </p:cNvPr>
@@ -22507,7 +22549,7 @@
             <p:cNvPr id="18" name="Speech Bubble: Rectangle with Corners Rounded 17">
               <a:extLst>
                 <a:ext uri="{FF2B5EF4-FFF2-40B4-BE49-F238E27FC236}">
-                  <a16:creationId xmlns:a16="http://schemas.microsoft.com/office/drawing/2014/main" xmlns="" id="{80EB8B5B-B3C1-44AB-99E3-63FF1DF8C61B}"/>
+                  <a16:creationId xmlns="" xmlns:a16="http://schemas.microsoft.com/office/drawing/2014/main" id="{80EB8B5B-B3C1-44AB-99E3-63FF1DF8C61B}"/>
                 </a:ext>
               </a:extLst>
             </p:cNvPr>
@@ -22573,7 +22615,7 @@
           <p:cNvPr id="3" name="Group 2">
             <a:extLst>
               <a:ext uri="{FF2B5EF4-FFF2-40B4-BE49-F238E27FC236}">
-                <a16:creationId xmlns:a16="http://schemas.microsoft.com/office/drawing/2014/main" xmlns="" id="{6752D4F8-081A-4556-8E37-2F42D8215138}"/>
+                <a16:creationId xmlns="" xmlns:a16="http://schemas.microsoft.com/office/drawing/2014/main" id="{6752D4F8-081A-4556-8E37-2F42D8215138}"/>
               </a:ext>
             </a:extLst>
           </p:cNvPr>
@@ -22593,7 +22635,7 @@
             <p:cNvPr id="19" name="Speech Bubble: Rectangle with Corners Rounded 18">
               <a:extLst>
                 <a:ext uri="{FF2B5EF4-FFF2-40B4-BE49-F238E27FC236}">
-                  <a16:creationId xmlns:a16="http://schemas.microsoft.com/office/drawing/2014/main" xmlns="" id="{52381E81-23BB-4204-8FD5-D26B6A1F5C7A}"/>
+                  <a16:creationId xmlns="" xmlns:a16="http://schemas.microsoft.com/office/drawing/2014/main" id="{52381E81-23BB-4204-8FD5-D26B6A1F5C7A}"/>
                 </a:ext>
               </a:extLst>
             </p:cNvPr>
@@ -22658,7 +22700,7 @@
             <p:cNvPr id="20" name="Oval 19">
               <a:extLst>
                 <a:ext uri="{FF2B5EF4-FFF2-40B4-BE49-F238E27FC236}">
-                  <a16:creationId xmlns:a16="http://schemas.microsoft.com/office/drawing/2014/main" xmlns="" id="{73B86C22-E865-4134-B8BA-7261808CE2CE}"/>
+                  <a16:creationId xmlns="" xmlns:a16="http://schemas.microsoft.com/office/drawing/2014/main" id="{73B86C22-E865-4134-B8BA-7261808CE2CE}"/>
                 </a:ext>
               </a:extLst>
             </p:cNvPr>
@@ -22713,7 +22755,7 @@
           <p:cNvPr id="21" name="TextBox 20">
             <a:extLst>
               <a:ext uri="{FF2B5EF4-FFF2-40B4-BE49-F238E27FC236}">
-                <a16:creationId xmlns:a16="http://schemas.microsoft.com/office/drawing/2014/main" xmlns="" id="{586A0C4C-167D-41C8-BC77-8C4E9A9D51FD}"/>
+                <a16:creationId xmlns="" xmlns:a16="http://schemas.microsoft.com/office/drawing/2014/main" id="{586A0C4C-167D-41C8-BC77-8C4E9A9D51FD}"/>
               </a:ext>
             </a:extLst>
           </p:cNvPr>
@@ -22790,7 +22832,7 @@
           <p:cNvPr id="2" name="Rectangle 1">
             <a:extLst>
               <a:ext uri="{FF2B5EF4-FFF2-40B4-BE49-F238E27FC236}">
-                <a16:creationId xmlns:a16="http://schemas.microsoft.com/office/drawing/2014/main" xmlns="" id="{3101410B-4D12-422F-B98B-D38CFF7D5334}"/>
+                <a16:creationId xmlns="" xmlns:a16="http://schemas.microsoft.com/office/drawing/2014/main" id="{3101410B-4D12-422F-B98B-D38CFF7D5334}"/>
               </a:ext>
             </a:extLst>
           </p:cNvPr>
@@ -22828,7 +22870,7 @@
           <p:cNvPr id="7" name="Group 6">
             <a:extLst>
               <a:ext uri="{FF2B5EF4-FFF2-40B4-BE49-F238E27FC236}">
-                <a16:creationId xmlns:a16="http://schemas.microsoft.com/office/drawing/2014/main" xmlns="" id="{D020B265-BF6B-40E4-B76C-77519FD68172}"/>
+                <a16:creationId xmlns="" xmlns:a16="http://schemas.microsoft.com/office/drawing/2014/main" id="{D020B265-BF6B-40E4-B76C-77519FD68172}"/>
               </a:ext>
             </a:extLst>
           </p:cNvPr>
@@ -22848,7 +22890,7 @@
             <p:cNvPr id="4" name="Oval 3">
               <a:extLst>
                 <a:ext uri="{FF2B5EF4-FFF2-40B4-BE49-F238E27FC236}">
-                  <a16:creationId xmlns:a16="http://schemas.microsoft.com/office/drawing/2014/main" xmlns="" id="{4D458EBB-5B35-4391-8BF2-99C410B5C56E}"/>
+                  <a16:creationId xmlns="" xmlns:a16="http://schemas.microsoft.com/office/drawing/2014/main" id="{4D458EBB-5B35-4391-8BF2-99C410B5C56E}"/>
                 </a:ext>
               </a:extLst>
             </p:cNvPr>
@@ -22906,7 +22948,7 @@
             <p:cNvPr id="6" name="Speech Bubble: Rectangle with Corners Rounded 5">
               <a:extLst>
                 <a:ext uri="{FF2B5EF4-FFF2-40B4-BE49-F238E27FC236}">
-                  <a16:creationId xmlns:a16="http://schemas.microsoft.com/office/drawing/2014/main" xmlns="" id="{36130E7F-235F-42D0-A9FA-86591749D944}"/>
+                  <a16:creationId xmlns="" xmlns:a16="http://schemas.microsoft.com/office/drawing/2014/main" id="{36130E7F-235F-42D0-A9FA-86591749D944}"/>
                 </a:ext>
               </a:extLst>
             </p:cNvPr>
@@ -22967,7 +23009,7 @@
           <p:cNvPr id="10" name="Slide Number Placeholder 9">
             <a:extLst>
               <a:ext uri="{FF2B5EF4-FFF2-40B4-BE49-F238E27FC236}">
-                <a16:creationId xmlns:a16="http://schemas.microsoft.com/office/drawing/2014/main" xmlns="" id="{E11656A2-85FD-401F-8228-B777A563C32E}"/>
+                <a16:creationId xmlns="" xmlns:a16="http://schemas.microsoft.com/office/drawing/2014/main" id="{E11656A2-85FD-401F-8228-B777A563C32E}"/>
               </a:ext>
             </a:extLst>
           </p:cNvPr>
@@ -22992,6 +23034,79 @@
           </a:p>
         </p:txBody>
       </p:sp>
+      <p:grpSp>
+        <p:nvGrpSpPr>
+          <p:cNvPr id="11" name="Group 10"/>
+          <p:cNvGrpSpPr/>
+          <p:nvPr/>
+        </p:nvGrpSpPr>
+        <p:grpSpPr>
+          <a:xfrm>
+            <a:off x="4731271" y="6515100"/>
+            <a:ext cx="3073266" cy="307777"/>
+            <a:chOff x="4731271" y="6515100"/>
+            <a:chExt cx="3073266" cy="307777"/>
+          </a:xfrm>
+        </p:grpSpPr>
+        <p:sp>
+          <p:nvSpPr>
+            <p:cNvPr id="9" name="TextBox 8"/>
+            <p:cNvSpPr txBox="1"/>
+            <p:nvPr/>
+          </p:nvSpPr>
+          <p:spPr>
+            <a:xfrm>
+              <a:off x="5067300" y="6629400"/>
+              <a:ext cx="2628900" cy="142212"/>
+            </a:xfrm>
+            <a:prstGeom prst="rect">
+              <a:avLst/>
+            </a:prstGeom>
+            <a:solidFill>
+              <a:schemeClr val="bg1"/>
+            </a:solidFill>
+          </p:spPr>
+          <p:txBody>
+            <a:bodyPr wrap="square" rtlCol="0">
+              <a:spAutoFit/>
+            </a:bodyPr>
+            <a:lstStyle/>
+            <a:p>
+              <a:endParaRPr lang="en-US" dirty="0"/>
+            </a:p>
+          </p:txBody>
+        </p:sp>
+        <p:sp>
+          <p:nvSpPr>
+            <p:cNvPr id="8" name="TextBox 7"/>
+            <p:cNvSpPr txBox="1"/>
+            <p:nvPr/>
+          </p:nvSpPr>
+          <p:spPr>
+            <a:xfrm>
+              <a:off x="4731271" y="6515100"/>
+              <a:ext cx="3073266" cy="307777"/>
+            </a:xfrm>
+            <a:prstGeom prst="rect">
+              <a:avLst/>
+            </a:prstGeom>
+            <a:noFill/>
+          </p:spPr>
+          <p:txBody>
+            <a:bodyPr wrap="square" rtlCol="0">
+              <a:spAutoFit/>
+            </a:bodyPr>
+            <a:lstStyle/>
+            <a:p>
+              <a:r>
+                <a:rPr lang="en-US" sz="1400" dirty="0" smtClean="0"/>
+                <a:t>Number of principal components</a:t>
+              </a:r>
+              <a:endParaRPr lang="en-US" sz="1400" dirty="0"/>
+            </a:p>
+          </p:txBody>
+        </p:sp>
+      </p:grpSp>
     </p:spTree>
     <p:extLst>
       <p:ext uri="{BB962C8B-B14F-4D97-AF65-F5344CB8AC3E}">
@@ -23156,6 +23271,41 @@
                                   </p:childTnLst>
                                 </p:cTn>
                               </p:par>
+                              <p:par>
+                                <p:cTn id="15" presetID="10" presetClass="entr" presetSubtype="0" fill="hold" nodeType="withEffect">
+                                  <p:stCondLst>
+                                    <p:cond delay="0"/>
+                                  </p:stCondLst>
+                                  <p:childTnLst>
+                                    <p:set>
+                                      <p:cBhvr>
+                                        <p:cTn id="16" dur="1" fill="hold">
+                                          <p:stCondLst>
+                                            <p:cond delay="0"/>
+                                          </p:stCondLst>
+                                        </p:cTn>
+                                        <p:tgtEl>
+                                          <p:spTgt spid="11"/>
+                                        </p:tgtEl>
+                                        <p:attrNameLst>
+                                          <p:attrName>style.visibility</p:attrName>
+                                        </p:attrNameLst>
+                                      </p:cBhvr>
+                                      <p:to>
+                                        <p:strVal val="visible"/>
+                                      </p:to>
+                                    </p:set>
+                                    <p:animEffect transition="in" filter="fade">
+                                      <p:cBhvr>
+                                        <p:cTn id="17" dur="500"/>
+                                        <p:tgtEl>
+                                          <p:spTgt spid="11"/>
+                                        </p:tgtEl>
+                                      </p:cBhvr>
+                                    </p:animEffect>
+                                  </p:childTnLst>
+                                </p:cTn>
+                              </p:par>
                             </p:childTnLst>
                           </p:cTn>
                         </p:par>
@@ -23163,26 +23313,26 @@
                     </p:cTn>
                   </p:par>
                   <p:par>
-                    <p:cTn id="15" fill="hold">
+                    <p:cTn id="18" fill="hold">
                       <p:stCondLst>
                         <p:cond delay="indefinite"/>
                       </p:stCondLst>
                       <p:childTnLst>
                         <p:par>
-                          <p:cTn id="16" fill="hold">
+                          <p:cTn id="19" fill="hold">
                             <p:stCondLst>
                               <p:cond delay="0"/>
                             </p:stCondLst>
                             <p:childTnLst>
                               <p:par>
-                                <p:cTn id="17" presetID="42" presetClass="entr" presetSubtype="0" fill="hold" nodeType="clickEffect">
+                                <p:cTn id="20" presetID="42" presetClass="entr" presetSubtype="0" fill="hold" nodeType="clickEffect">
                                   <p:stCondLst>
                                     <p:cond delay="0"/>
                                   </p:stCondLst>
                                   <p:childTnLst>
                                     <p:set>
                                       <p:cBhvr>
-                                        <p:cTn id="18" dur="1" fill="hold">
+                                        <p:cTn id="21" dur="1" fill="hold">
                                           <p:stCondLst>
                                             <p:cond delay="0"/>
                                           </p:stCondLst>
@@ -23200,7 +23350,7 @@
                                     </p:set>
                                     <p:animEffect transition="in" filter="fade">
                                       <p:cBhvr>
-                                        <p:cTn id="19" dur="1000"/>
+                                        <p:cTn id="22" dur="1000"/>
                                         <p:tgtEl>
                                           <p:spTgt spid="3"/>
                                         </p:tgtEl>
@@ -23208,7 +23358,7 @@
                                     </p:animEffect>
                                     <p:anim calcmode="lin" valueType="num">
                                       <p:cBhvr>
-                                        <p:cTn id="20" dur="1000" fill="hold"/>
+                                        <p:cTn id="23" dur="1000" fill="hold"/>
                                         <p:tgtEl>
                                           <p:spTgt spid="3"/>
                                         </p:tgtEl>
@@ -23231,7 +23381,7 @@
                                     </p:anim>
                                     <p:anim calcmode="lin" valueType="num">
                                       <p:cBhvr>
-                                        <p:cTn id="21" dur="1000" fill="hold"/>
+                                        <p:cTn id="24" dur="1000" fill="hold"/>
                                         <p:tgtEl>
                                           <p:spTgt spid="3"/>
                                         </p:tgtEl>
@@ -23262,26 +23412,26 @@
                     </p:cTn>
                   </p:par>
                   <p:par>
-                    <p:cTn id="22" fill="hold">
+                    <p:cTn id="25" fill="hold">
                       <p:stCondLst>
                         <p:cond delay="indefinite"/>
                       </p:stCondLst>
                       <p:childTnLst>
                         <p:par>
-                          <p:cTn id="23" fill="hold">
+                          <p:cTn id="26" fill="hold">
                             <p:stCondLst>
                               <p:cond delay="0"/>
                             </p:stCondLst>
                             <p:childTnLst>
                               <p:par>
-                                <p:cTn id="24" presetID="42" presetClass="entr" presetSubtype="0" fill="hold" nodeType="clickEffect">
+                                <p:cTn id="27" presetID="42" presetClass="entr" presetSubtype="0" fill="hold" nodeType="clickEffect">
                                   <p:stCondLst>
                                     <p:cond delay="0"/>
                                   </p:stCondLst>
                                   <p:childTnLst>
                                     <p:set>
                                       <p:cBhvr>
-                                        <p:cTn id="25" dur="1" fill="hold">
+                                        <p:cTn id="28" dur="1" fill="hold">
                                           <p:stCondLst>
                                             <p:cond delay="0"/>
                                           </p:stCondLst>
@@ -23299,7 +23449,7 @@
                                     </p:set>
                                     <p:animEffect transition="in" filter="fade">
                                       <p:cBhvr>
-                                        <p:cTn id="26" dur="1000"/>
+                                        <p:cTn id="29" dur="1000"/>
                                         <p:tgtEl>
                                           <p:spTgt spid="23"/>
                                         </p:tgtEl>
@@ -23307,7 +23457,7 @@
                                     </p:animEffect>
                                     <p:anim calcmode="lin" valueType="num">
                                       <p:cBhvr>
-                                        <p:cTn id="27" dur="1000" fill="hold"/>
+                                        <p:cTn id="30" dur="1000" fill="hold"/>
                                         <p:tgtEl>
                                           <p:spTgt spid="23"/>
                                         </p:tgtEl>
@@ -23330,7 +23480,7 @@
                                     </p:anim>
                                     <p:anim calcmode="lin" valueType="num">
                                       <p:cBhvr>
-                                        <p:cTn id="28" dur="1000" fill="hold"/>
+                                        <p:cTn id="31" dur="1000" fill="hold"/>
                                         <p:tgtEl>
                                           <p:spTgt spid="23"/>
                                         </p:tgtEl>
@@ -23361,26 +23511,26 @@
                     </p:cTn>
                   </p:par>
                   <p:par>
-                    <p:cTn id="29" fill="hold">
+                    <p:cTn id="32" fill="hold">
                       <p:stCondLst>
                         <p:cond delay="indefinite"/>
                       </p:stCondLst>
                       <p:childTnLst>
                         <p:par>
-                          <p:cTn id="30" fill="hold">
+                          <p:cTn id="33" fill="hold">
                             <p:stCondLst>
                               <p:cond delay="0"/>
                             </p:stCondLst>
                             <p:childTnLst>
                               <p:par>
-                                <p:cTn id="31" presetID="42" presetClass="entr" presetSubtype="0" fill="hold" grpId="0" nodeType="clickEffect">
+                                <p:cTn id="34" presetID="42" presetClass="entr" presetSubtype="0" fill="hold" grpId="0" nodeType="clickEffect">
                                   <p:stCondLst>
                                     <p:cond delay="0"/>
                                   </p:stCondLst>
                                   <p:childTnLst>
                                     <p:set>
                                       <p:cBhvr>
-                                        <p:cTn id="32" dur="1" fill="hold">
+                                        <p:cTn id="35" dur="1" fill="hold">
                                           <p:stCondLst>
                                             <p:cond delay="0"/>
                                           </p:stCondLst>
@@ -23398,7 +23548,7 @@
                                     </p:set>
                                     <p:animEffect transition="in" filter="fade">
                                       <p:cBhvr>
-                                        <p:cTn id="33" dur="1000"/>
+                                        <p:cTn id="36" dur="1000"/>
                                         <p:tgtEl>
                                           <p:spTgt spid="21"/>
                                         </p:tgtEl>
@@ -23406,7 +23556,7 @@
                                     </p:animEffect>
                                     <p:anim calcmode="lin" valueType="num">
                                       <p:cBhvr>
-                                        <p:cTn id="34" dur="1000" fill="hold"/>
+                                        <p:cTn id="37" dur="1000" fill="hold"/>
                                         <p:tgtEl>
                                           <p:spTgt spid="21"/>
                                         </p:tgtEl>
@@ -23429,7 +23579,7 @@
                                     </p:anim>
                                     <p:anim calcmode="lin" valueType="num">
                                       <p:cBhvr>
-                                        <p:cTn id="35" dur="1000" fill="hold"/>
+                                        <p:cTn id="38" dur="1000" fill="hold"/>
                                         <p:tgtEl>
                                           <p:spTgt spid="21"/>
                                         </p:tgtEl>
@@ -23460,26 +23610,26 @@
                     </p:cTn>
                   </p:par>
                   <p:par>
-                    <p:cTn id="36" fill="hold">
+                    <p:cTn id="39" fill="hold">
                       <p:stCondLst>
                         <p:cond delay="indefinite"/>
                       </p:stCondLst>
                       <p:childTnLst>
                         <p:par>
-                          <p:cTn id="37" fill="hold">
+                          <p:cTn id="40" fill="hold">
                             <p:stCondLst>
                               <p:cond delay="0"/>
                             </p:stCondLst>
                             <p:childTnLst>
                               <p:par>
-                                <p:cTn id="38" presetID="42" presetClass="entr" presetSubtype="0" fill="hold" nodeType="clickEffect">
+                                <p:cTn id="41" presetID="42" presetClass="entr" presetSubtype="0" fill="hold" nodeType="clickEffect">
                                   <p:stCondLst>
                                     <p:cond delay="0"/>
                                   </p:stCondLst>
                                   <p:childTnLst>
                                     <p:set>
                                       <p:cBhvr>
-                                        <p:cTn id="39" dur="1" fill="hold">
+                                        <p:cTn id="42" dur="1" fill="hold">
                                           <p:stCondLst>
                                             <p:cond delay="0"/>
                                           </p:stCondLst>
@@ -23497,7 +23647,7 @@
                                     </p:set>
                                     <p:animEffect transition="in" filter="fade">
                                       <p:cBhvr>
-                                        <p:cTn id="40" dur="1000"/>
+                                        <p:cTn id="43" dur="1000"/>
                                         <p:tgtEl>
                                           <p:spTgt spid="7"/>
                                         </p:tgtEl>
@@ -23505,7 +23655,7 @@
                                     </p:animEffect>
                                     <p:anim calcmode="lin" valueType="num">
                                       <p:cBhvr>
-                                        <p:cTn id="41" dur="1000" fill="hold"/>
+                                        <p:cTn id="44" dur="1000" fill="hold"/>
                                         <p:tgtEl>
                                           <p:spTgt spid="7"/>
                                         </p:tgtEl>
@@ -23528,7 +23678,7 @@
                                     </p:anim>
                                     <p:anim calcmode="lin" valueType="num">
                                       <p:cBhvr>
-                                        <p:cTn id="42" dur="1000" fill="hold"/>
+                                        <p:cTn id="45" dur="1000" fill="hold"/>
                                         <p:tgtEl>
                                           <p:spTgt spid="7"/>
                                         </p:tgtEl>
@@ -23609,7 +23759,7 @@
           <p:cNvPr id="16" name="Picture 15">
             <a:extLst>
               <a:ext uri="{FF2B5EF4-FFF2-40B4-BE49-F238E27FC236}">
-                <a16:creationId xmlns:a16="http://schemas.microsoft.com/office/drawing/2014/main" xmlns="" id="{75044DBC-9455-41CC-91D8-EA3508CC5869}"/>
+                <a16:creationId xmlns="" xmlns:a16="http://schemas.microsoft.com/office/drawing/2014/main" id="{75044DBC-9455-41CC-91D8-EA3508CC5869}"/>
               </a:ext>
             </a:extLst>
           </p:cNvPr>
@@ -23639,7 +23789,7 @@
           <p:cNvPr id="27" name="Group 26">
             <a:extLst>
               <a:ext uri="{FF2B5EF4-FFF2-40B4-BE49-F238E27FC236}">
-                <a16:creationId xmlns:a16="http://schemas.microsoft.com/office/drawing/2014/main" xmlns="" id="{0649C811-8FC9-44B4-8F1D-013E85A748DD}"/>
+                <a16:creationId xmlns="" xmlns:a16="http://schemas.microsoft.com/office/drawing/2014/main" id="{0649C811-8FC9-44B4-8F1D-013E85A748DD}"/>
               </a:ext>
             </a:extLst>
           </p:cNvPr>
@@ -23659,7 +23809,7 @@
             <p:cNvPr id="4" name="Picture 3">
               <a:extLst>
                 <a:ext uri="{FF2B5EF4-FFF2-40B4-BE49-F238E27FC236}">
-                  <a16:creationId xmlns:a16="http://schemas.microsoft.com/office/drawing/2014/main" xmlns="" id="{393BD330-B0D0-4624-977B-59F8F69B16B9}"/>
+                  <a16:creationId xmlns="" xmlns:a16="http://schemas.microsoft.com/office/drawing/2014/main" id="{393BD330-B0D0-4624-977B-59F8F69B16B9}"/>
                 </a:ext>
               </a:extLst>
             </p:cNvPr>
@@ -23689,7 +23839,7 @@
             <p:cNvPr id="10" name="Rectangle 9">
               <a:extLst>
                 <a:ext uri="{FF2B5EF4-FFF2-40B4-BE49-F238E27FC236}">
-                  <a16:creationId xmlns:a16="http://schemas.microsoft.com/office/drawing/2014/main" xmlns="" id="{15F41219-5081-4320-AA15-A4523E7FD80A}"/>
+                  <a16:creationId xmlns="" xmlns:a16="http://schemas.microsoft.com/office/drawing/2014/main" id="{15F41219-5081-4320-AA15-A4523E7FD80A}"/>
                 </a:ext>
               </a:extLst>
             </p:cNvPr>
@@ -23742,7 +23892,7 @@
           <p:cNvPr id="2" name="Title 1">
             <a:extLst>
               <a:ext uri="{FF2B5EF4-FFF2-40B4-BE49-F238E27FC236}">
-                <a16:creationId xmlns:a16="http://schemas.microsoft.com/office/drawing/2014/main" xmlns="" id="{74BDEF2B-CF04-4FC7-B45D-7BFB4D26ED44}"/>
+                <a16:creationId xmlns="" xmlns:a16="http://schemas.microsoft.com/office/drawing/2014/main" id="{74BDEF2B-CF04-4FC7-B45D-7BFB4D26ED44}"/>
               </a:ext>
             </a:extLst>
           </p:cNvPr>
@@ -23853,7 +24003,7 @@
           <p:cNvPr id="5" name="Slide Number Placeholder 4">
             <a:extLst>
               <a:ext uri="{FF2B5EF4-FFF2-40B4-BE49-F238E27FC236}">
-                <a16:creationId xmlns:a16="http://schemas.microsoft.com/office/drawing/2014/main" xmlns="" id="{6C7AC4C2-311E-4220-AFEE-F95E8983AB3B}"/>
+                <a16:creationId xmlns="" xmlns:a16="http://schemas.microsoft.com/office/drawing/2014/main" id="{6C7AC4C2-311E-4220-AFEE-F95E8983AB3B}"/>
               </a:ext>
             </a:extLst>
           </p:cNvPr>
@@ -23883,7 +24033,7 @@
           <p:cNvPr id="28" name="Group 27">
             <a:extLst>
               <a:ext uri="{FF2B5EF4-FFF2-40B4-BE49-F238E27FC236}">
-                <a16:creationId xmlns:a16="http://schemas.microsoft.com/office/drawing/2014/main" xmlns="" id="{1AA134A0-7FAC-44C7-ADD1-1AB80686D524}"/>
+                <a16:creationId xmlns="" xmlns:a16="http://schemas.microsoft.com/office/drawing/2014/main" id="{1AA134A0-7FAC-44C7-ADD1-1AB80686D524}"/>
               </a:ext>
             </a:extLst>
           </p:cNvPr>
@@ -23903,7 +24053,7 @@
             <p:cNvPr id="7" name="TextBox 6">
               <a:extLst>
                 <a:ext uri="{FF2B5EF4-FFF2-40B4-BE49-F238E27FC236}">
-                  <a16:creationId xmlns:a16="http://schemas.microsoft.com/office/drawing/2014/main" xmlns="" id="{A1CB4040-B930-4C77-85A7-14277601F045}"/>
+                  <a16:creationId xmlns="" xmlns:a16="http://schemas.microsoft.com/office/drawing/2014/main" id="{A1CB4040-B930-4C77-85A7-14277601F045}"/>
                 </a:ext>
               </a:extLst>
             </p:cNvPr>
@@ -23949,7 +24099,7 @@
             <p:cNvPr id="13" name="Straight Connector 12">
               <a:extLst>
                 <a:ext uri="{FF2B5EF4-FFF2-40B4-BE49-F238E27FC236}">
-                  <a16:creationId xmlns:a16="http://schemas.microsoft.com/office/drawing/2014/main" xmlns="" id="{FAE9083E-9AE0-4ADB-A366-68C48294E971}"/>
+                  <a16:creationId xmlns="" xmlns:a16="http://schemas.microsoft.com/office/drawing/2014/main" id="{FAE9083E-9AE0-4ADB-A366-68C48294E971}"/>
                 </a:ext>
               </a:extLst>
             </p:cNvPr>
@@ -23993,7 +24143,7 @@
             <p:cNvPr id="12" name="Straight Connector 11">
               <a:extLst>
                 <a:ext uri="{FF2B5EF4-FFF2-40B4-BE49-F238E27FC236}">
-                  <a16:creationId xmlns:a16="http://schemas.microsoft.com/office/drawing/2014/main" xmlns="" id="{B83E3D3C-92F3-412F-822C-30C8140EA2D5}"/>
+                  <a16:creationId xmlns="" xmlns:a16="http://schemas.microsoft.com/office/drawing/2014/main" id="{B83E3D3C-92F3-412F-822C-30C8140EA2D5}"/>
                 </a:ext>
               </a:extLst>
             </p:cNvPr>
@@ -24037,7 +24187,7 @@
             <p:cNvPr id="14" name="Straight Connector 13">
               <a:extLst>
                 <a:ext uri="{FF2B5EF4-FFF2-40B4-BE49-F238E27FC236}">
-                  <a16:creationId xmlns:a16="http://schemas.microsoft.com/office/drawing/2014/main" xmlns="" id="{DA139436-6896-45B8-9AE8-1945DFAEACCF}"/>
+                  <a16:creationId xmlns="" xmlns:a16="http://schemas.microsoft.com/office/drawing/2014/main" id="{DA139436-6896-45B8-9AE8-1945DFAEACCF}"/>
                 </a:ext>
               </a:extLst>
             </p:cNvPr>

</xml_diff>